<commit_message>
class03-ntfs: better highlight the need for $ATTRIBUTE_LIST.
</commit_message>
<xml_diff>
--- a/talks/src/class03-ntfs.pptx
+++ b/talks/src/class03-ntfs.pptx
@@ -5,7 +5,7 @@
     <p:sldMasterId id="2147483660" r:id="rId1"/>
   </p:sldMasterIdLst>
   <p:notesMasterIdLst>
-    <p:notesMasterId r:id="rId40"/>
+    <p:notesMasterId r:id="rId41"/>
   </p:notesMasterIdLst>
   <p:sldIdLst>
     <p:sldId id="398" r:id="rId2"/>
@@ -21,31 +21,32 @@
     <p:sldId id="352" r:id="rId12"/>
     <p:sldId id="336" r:id="rId13"/>
     <p:sldId id="359" r:id="rId14"/>
-    <p:sldId id="360" r:id="rId15"/>
-    <p:sldId id="361" r:id="rId16"/>
-    <p:sldId id="362" r:id="rId17"/>
-    <p:sldId id="364" r:id="rId18"/>
-    <p:sldId id="363" r:id="rId19"/>
-    <p:sldId id="402" r:id="rId20"/>
-    <p:sldId id="342" r:id="rId21"/>
-    <p:sldId id="365" r:id="rId22"/>
-    <p:sldId id="366" r:id="rId23"/>
-    <p:sldId id="367" r:id="rId24"/>
-    <p:sldId id="368" r:id="rId25"/>
-    <p:sldId id="369" r:id="rId26"/>
-    <p:sldId id="370" r:id="rId27"/>
-    <p:sldId id="343" r:id="rId28"/>
-    <p:sldId id="372" r:id="rId29"/>
-    <p:sldId id="373" r:id="rId30"/>
-    <p:sldId id="379" r:id="rId31"/>
-    <p:sldId id="375" r:id="rId32"/>
-    <p:sldId id="376" r:id="rId33"/>
-    <p:sldId id="377" r:id="rId34"/>
-    <p:sldId id="378" r:id="rId35"/>
-    <p:sldId id="403" r:id="rId36"/>
-    <p:sldId id="380" r:id="rId37"/>
-    <p:sldId id="310" r:id="rId38"/>
-    <p:sldId id="349" r:id="rId39"/>
+    <p:sldId id="404" r:id="rId15"/>
+    <p:sldId id="360" r:id="rId16"/>
+    <p:sldId id="361" r:id="rId17"/>
+    <p:sldId id="362" r:id="rId18"/>
+    <p:sldId id="364" r:id="rId19"/>
+    <p:sldId id="363" r:id="rId20"/>
+    <p:sldId id="402" r:id="rId21"/>
+    <p:sldId id="342" r:id="rId22"/>
+    <p:sldId id="365" r:id="rId23"/>
+    <p:sldId id="366" r:id="rId24"/>
+    <p:sldId id="367" r:id="rId25"/>
+    <p:sldId id="368" r:id="rId26"/>
+    <p:sldId id="369" r:id="rId27"/>
+    <p:sldId id="370" r:id="rId28"/>
+    <p:sldId id="343" r:id="rId29"/>
+    <p:sldId id="372" r:id="rId30"/>
+    <p:sldId id="373" r:id="rId31"/>
+    <p:sldId id="379" r:id="rId32"/>
+    <p:sldId id="375" r:id="rId33"/>
+    <p:sldId id="376" r:id="rId34"/>
+    <p:sldId id="377" r:id="rId35"/>
+    <p:sldId id="378" r:id="rId36"/>
+    <p:sldId id="403" r:id="rId37"/>
+    <p:sldId id="380" r:id="rId38"/>
+    <p:sldId id="310" r:id="rId39"/>
+    <p:sldId id="349" r:id="rId40"/>
   </p:sldIdLst>
   <p:sldSz cx="12192000" cy="6858000"/>
   <p:notesSz cx="6858000" cy="9144000"/>
@@ -234,7 +235,7 @@
           <a:p>
             <a:fld id="{F378FDCC-6E3B-8447-A84A-C1F15F2E44EA}" type="datetimeFigureOut">
               <a:rPr lang="ru-RU" smtClean="0"/>
-              <a:t>29.10.2024</a:t>
+              <a:t>06.11.2025</a:t>
             </a:fld>
             <a:endParaRPr lang="ru-RU"/>
           </a:p>
@@ -1037,7 +1038,13 @@
   <p:cSld>
     <p:spTree>
       <p:nvGrpSpPr>
-        <p:cNvPr id="1" name=""/>
+        <p:cNvPr id="1" name="">
+          <a:extLst>
+            <a:ext uri="{FF2B5EF4-FFF2-40B4-BE49-F238E27FC236}">
+              <a16:creationId xmlns:a16="http://schemas.microsoft.com/office/drawing/2014/main" id="{462B5604-4016-FC0C-6706-7BC2E4CDF8A6}"/>
+            </a:ext>
+          </a:extLst>
+        </p:cNvPr>
         <p:cNvGrpSpPr/>
         <p:nvPr/>
       </p:nvGrpSpPr>
@@ -1051,7 +1058,13 @@
       </p:grpSpPr>
       <p:sp>
         <p:nvSpPr>
-          <p:cNvPr id="2" name="Slide Image Placeholder 1"/>
+          <p:cNvPr id="2" name="Slide Image Placeholder 1">
+            <a:extLst>
+              <a:ext uri="{FF2B5EF4-FFF2-40B4-BE49-F238E27FC236}">
+                <a16:creationId xmlns:a16="http://schemas.microsoft.com/office/drawing/2014/main" id="{DACB2339-0720-8FD9-DF48-BB1B31859561}"/>
+              </a:ext>
+            </a:extLst>
+          </p:cNvPr>
           <p:cNvSpPr>
             <a:spLocks noGrp="1" noRot="1" noChangeAspect="1"/>
           </p:cNvSpPr>
@@ -1063,7 +1076,13 @@
       </p:sp>
       <p:sp>
         <p:nvSpPr>
-          <p:cNvPr id="3" name="Notes Placeholder 2"/>
+          <p:cNvPr id="3" name="Notes Placeholder 2">
+            <a:extLst>
+              <a:ext uri="{FF2B5EF4-FFF2-40B4-BE49-F238E27FC236}">
+                <a16:creationId xmlns:a16="http://schemas.microsoft.com/office/drawing/2014/main" id="{C44FE1B1-42C3-52C1-D0AB-190B5E306307}"/>
+              </a:ext>
+            </a:extLst>
+          </p:cNvPr>
           <p:cNvSpPr>
             <a:spLocks noGrp="1"/>
           </p:cNvSpPr>
@@ -1082,7 +1101,13 @@
       </p:sp>
       <p:sp>
         <p:nvSpPr>
-          <p:cNvPr id="4" name="Slide Number Placeholder 3"/>
+          <p:cNvPr id="4" name="Slide Number Placeholder 3">
+            <a:extLst>
+              <a:ext uri="{FF2B5EF4-FFF2-40B4-BE49-F238E27FC236}">
+                <a16:creationId xmlns:a16="http://schemas.microsoft.com/office/drawing/2014/main" id="{2F842C0B-0A67-9206-6307-6E7B936F3AAE}"/>
+              </a:ext>
+            </a:extLst>
+          </p:cNvPr>
           <p:cNvSpPr>
             <a:spLocks noGrp="1"/>
           </p:cNvSpPr>
@@ -1105,7 +1130,13 @@
       </p:sp>
       <p:sp>
         <p:nvSpPr>
-          <p:cNvPr id="5" name="Header Placeholder 4"/>
+          <p:cNvPr id="5" name="Header Placeholder 4">
+            <a:extLst>
+              <a:ext uri="{FF2B5EF4-FFF2-40B4-BE49-F238E27FC236}">
+                <a16:creationId xmlns:a16="http://schemas.microsoft.com/office/drawing/2014/main" id="{E8DADB1B-D59B-C5FB-A349-2D1E173E89DD}"/>
+              </a:ext>
+            </a:extLst>
+          </p:cNvPr>
           <p:cNvSpPr>
             <a:spLocks noGrp="1"/>
           </p:cNvSpPr>
@@ -1128,7 +1159,7 @@
     </p:spTree>
     <p:extLst>
       <p:ext uri="{BB962C8B-B14F-4D97-AF65-F5344CB8AC3E}">
-        <p14:creationId xmlns:p14="http://schemas.microsoft.com/office/powerpoint/2010/main" val="3525722841"/>
+        <p14:creationId xmlns:p14="http://schemas.microsoft.com/office/powerpoint/2010/main" val="2908684917"/>
       </p:ext>
     </p:extLst>
   </p:cSld>
@@ -1234,7 +1265,7 @@
     </p:spTree>
     <p:extLst>
       <p:ext uri="{BB962C8B-B14F-4D97-AF65-F5344CB8AC3E}">
-        <p14:creationId xmlns:p14="http://schemas.microsoft.com/office/powerpoint/2010/main" val="4093940740"/>
+        <p14:creationId xmlns:p14="http://schemas.microsoft.com/office/powerpoint/2010/main" val="3525722841"/>
       </p:ext>
     </p:extLst>
   </p:cSld>
@@ -1340,7 +1371,7 @@
     </p:spTree>
     <p:extLst>
       <p:ext uri="{BB962C8B-B14F-4D97-AF65-F5344CB8AC3E}">
-        <p14:creationId xmlns:p14="http://schemas.microsoft.com/office/powerpoint/2010/main" val="3419938252"/>
+        <p14:creationId xmlns:p14="http://schemas.microsoft.com/office/powerpoint/2010/main" val="4093940740"/>
       </p:ext>
     </p:extLst>
   </p:cSld>
@@ -1446,7 +1477,7 @@
     </p:spTree>
     <p:extLst>
       <p:ext uri="{BB962C8B-B14F-4D97-AF65-F5344CB8AC3E}">
-        <p14:creationId xmlns:p14="http://schemas.microsoft.com/office/powerpoint/2010/main" val="3190067101"/>
+        <p14:creationId xmlns:p14="http://schemas.microsoft.com/office/powerpoint/2010/main" val="3419938252"/>
       </p:ext>
     </p:extLst>
   </p:cSld>
@@ -1552,7 +1583,7 @@
     </p:spTree>
     <p:extLst>
       <p:ext uri="{BB962C8B-B14F-4D97-AF65-F5344CB8AC3E}">
-        <p14:creationId xmlns:p14="http://schemas.microsoft.com/office/powerpoint/2010/main" val="1233598447"/>
+        <p14:creationId xmlns:p14="http://schemas.microsoft.com/office/powerpoint/2010/main" val="3190067101"/>
       </p:ext>
     </p:extLst>
   </p:cSld>
@@ -1567,13 +1598,7 @@
   <p:cSld>
     <p:spTree>
       <p:nvGrpSpPr>
-        <p:cNvPr id="1" name="">
-          <a:extLst>
-            <a:ext uri="{FF2B5EF4-FFF2-40B4-BE49-F238E27FC236}">
-              <a16:creationId xmlns:a16="http://schemas.microsoft.com/office/drawing/2014/main" id="{7F43355F-8BF7-A440-E22E-43F5E6650E7B}"/>
-            </a:ext>
-          </a:extLst>
-        </p:cNvPr>
+        <p:cNvPr id="1" name=""/>
         <p:cNvGrpSpPr/>
         <p:nvPr/>
       </p:nvGrpSpPr>
@@ -1587,13 +1612,7 @@
       </p:grpSpPr>
       <p:sp>
         <p:nvSpPr>
-          <p:cNvPr id="2" name="Slide Image Placeholder 1">
-            <a:extLst>
-              <a:ext uri="{FF2B5EF4-FFF2-40B4-BE49-F238E27FC236}">
-                <a16:creationId xmlns:a16="http://schemas.microsoft.com/office/drawing/2014/main" id="{CD54509E-5DCB-6FD6-4450-E91A421DDFAD}"/>
-              </a:ext>
-            </a:extLst>
-          </p:cNvPr>
+          <p:cNvPr id="2" name="Slide Image Placeholder 1"/>
           <p:cNvSpPr>
             <a:spLocks noGrp="1" noRot="1" noChangeAspect="1"/>
           </p:cNvSpPr>
@@ -1605,13 +1624,7 @@
       </p:sp>
       <p:sp>
         <p:nvSpPr>
-          <p:cNvPr id="3" name="Notes Placeholder 2">
-            <a:extLst>
-              <a:ext uri="{FF2B5EF4-FFF2-40B4-BE49-F238E27FC236}">
-                <a16:creationId xmlns:a16="http://schemas.microsoft.com/office/drawing/2014/main" id="{853E48F7-FB88-0BC2-5FCA-2B85A73F3110}"/>
-              </a:ext>
-            </a:extLst>
-          </p:cNvPr>
+          <p:cNvPr id="3" name="Notes Placeholder 2"/>
           <p:cNvSpPr>
             <a:spLocks noGrp="1"/>
           </p:cNvSpPr>
@@ -1630,13 +1643,7 @@
       </p:sp>
       <p:sp>
         <p:nvSpPr>
-          <p:cNvPr id="4" name="Slide Number Placeholder 3">
-            <a:extLst>
-              <a:ext uri="{FF2B5EF4-FFF2-40B4-BE49-F238E27FC236}">
-                <a16:creationId xmlns:a16="http://schemas.microsoft.com/office/drawing/2014/main" id="{1D2FF75E-3DA3-0363-A2A4-3F310BE956BF}"/>
-              </a:ext>
-            </a:extLst>
-          </p:cNvPr>
+          <p:cNvPr id="4" name="Slide Number Placeholder 3"/>
           <p:cNvSpPr>
             <a:spLocks noGrp="1"/>
           </p:cNvSpPr>
@@ -1659,13 +1666,7 @@
       </p:sp>
       <p:sp>
         <p:nvSpPr>
-          <p:cNvPr id="5" name="Header Placeholder 4">
-            <a:extLst>
-              <a:ext uri="{FF2B5EF4-FFF2-40B4-BE49-F238E27FC236}">
-                <a16:creationId xmlns:a16="http://schemas.microsoft.com/office/drawing/2014/main" id="{DEB5B01F-F24E-6030-3A39-36B05C68D251}"/>
-              </a:ext>
-            </a:extLst>
-          </p:cNvPr>
+          <p:cNvPr id="5" name="Header Placeholder 4"/>
           <p:cNvSpPr>
             <a:spLocks noGrp="1"/>
           </p:cNvSpPr>
@@ -1688,7 +1689,7 @@
     </p:spTree>
     <p:extLst>
       <p:ext uri="{BB962C8B-B14F-4D97-AF65-F5344CB8AC3E}">
-        <p14:creationId xmlns:p14="http://schemas.microsoft.com/office/powerpoint/2010/main" val="3744475564"/>
+        <p14:creationId xmlns:p14="http://schemas.microsoft.com/office/powerpoint/2010/main" val="1233598447"/>
       </p:ext>
     </p:extLst>
   </p:cSld>
@@ -1839,7 +1840,13 @@
   <p:cSld>
     <p:spTree>
       <p:nvGrpSpPr>
-        <p:cNvPr id="1" name=""/>
+        <p:cNvPr id="1" name="">
+          <a:extLst>
+            <a:ext uri="{FF2B5EF4-FFF2-40B4-BE49-F238E27FC236}">
+              <a16:creationId xmlns:a16="http://schemas.microsoft.com/office/drawing/2014/main" id="{7F43355F-8BF7-A440-E22E-43F5E6650E7B}"/>
+            </a:ext>
+          </a:extLst>
+        </p:cNvPr>
         <p:cNvGrpSpPr/>
         <p:nvPr/>
       </p:nvGrpSpPr>
@@ -1853,7 +1860,13 @@
       </p:grpSpPr>
       <p:sp>
         <p:nvSpPr>
-          <p:cNvPr id="2" name="Slide Image Placeholder 1"/>
+          <p:cNvPr id="2" name="Slide Image Placeholder 1">
+            <a:extLst>
+              <a:ext uri="{FF2B5EF4-FFF2-40B4-BE49-F238E27FC236}">
+                <a16:creationId xmlns:a16="http://schemas.microsoft.com/office/drawing/2014/main" id="{CD54509E-5DCB-6FD6-4450-E91A421DDFAD}"/>
+              </a:ext>
+            </a:extLst>
+          </p:cNvPr>
           <p:cNvSpPr>
             <a:spLocks noGrp="1" noRot="1" noChangeAspect="1"/>
           </p:cNvSpPr>
@@ -1865,7 +1878,13 @@
       </p:sp>
       <p:sp>
         <p:nvSpPr>
-          <p:cNvPr id="3" name="Notes Placeholder 2"/>
+          <p:cNvPr id="3" name="Notes Placeholder 2">
+            <a:extLst>
+              <a:ext uri="{FF2B5EF4-FFF2-40B4-BE49-F238E27FC236}">
+                <a16:creationId xmlns:a16="http://schemas.microsoft.com/office/drawing/2014/main" id="{853E48F7-FB88-0BC2-5FCA-2B85A73F3110}"/>
+              </a:ext>
+            </a:extLst>
+          </p:cNvPr>
           <p:cNvSpPr>
             <a:spLocks noGrp="1"/>
           </p:cNvSpPr>
@@ -1884,7 +1903,13 @@
       </p:sp>
       <p:sp>
         <p:nvSpPr>
-          <p:cNvPr id="4" name="Slide Number Placeholder 3"/>
+          <p:cNvPr id="4" name="Slide Number Placeholder 3">
+            <a:extLst>
+              <a:ext uri="{FF2B5EF4-FFF2-40B4-BE49-F238E27FC236}">
+                <a16:creationId xmlns:a16="http://schemas.microsoft.com/office/drawing/2014/main" id="{1D2FF75E-3DA3-0363-A2A4-3F310BE956BF}"/>
+              </a:ext>
+            </a:extLst>
+          </p:cNvPr>
           <p:cNvSpPr>
             <a:spLocks noGrp="1"/>
           </p:cNvSpPr>
@@ -1907,7 +1932,13 @@
       </p:sp>
       <p:sp>
         <p:nvSpPr>
-          <p:cNvPr id="5" name="Header Placeholder 4"/>
+          <p:cNvPr id="5" name="Header Placeholder 4">
+            <a:extLst>
+              <a:ext uri="{FF2B5EF4-FFF2-40B4-BE49-F238E27FC236}">
+                <a16:creationId xmlns:a16="http://schemas.microsoft.com/office/drawing/2014/main" id="{DEB5B01F-F24E-6030-3A39-36B05C68D251}"/>
+              </a:ext>
+            </a:extLst>
+          </p:cNvPr>
           <p:cNvSpPr>
             <a:spLocks noGrp="1"/>
           </p:cNvSpPr>
@@ -1930,7 +1961,7 @@
     </p:spTree>
     <p:extLst>
       <p:ext uri="{BB962C8B-B14F-4D97-AF65-F5344CB8AC3E}">
-        <p14:creationId xmlns:p14="http://schemas.microsoft.com/office/powerpoint/2010/main" val="98450390"/>
+        <p14:creationId xmlns:p14="http://schemas.microsoft.com/office/powerpoint/2010/main" val="3744475564"/>
       </p:ext>
     </p:extLst>
   </p:cSld>
@@ -2036,7 +2067,7 @@
     </p:spTree>
     <p:extLst>
       <p:ext uri="{BB962C8B-B14F-4D97-AF65-F5344CB8AC3E}">
-        <p14:creationId xmlns:p14="http://schemas.microsoft.com/office/powerpoint/2010/main" val="1334071962"/>
+        <p14:creationId xmlns:p14="http://schemas.microsoft.com/office/powerpoint/2010/main" val="98450390"/>
       </p:ext>
     </p:extLst>
   </p:cSld>
@@ -2142,7 +2173,7 @@
     </p:spTree>
     <p:extLst>
       <p:ext uri="{BB962C8B-B14F-4D97-AF65-F5344CB8AC3E}">
-        <p14:creationId xmlns:p14="http://schemas.microsoft.com/office/powerpoint/2010/main" val="2608322405"/>
+        <p14:creationId xmlns:p14="http://schemas.microsoft.com/office/powerpoint/2010/main" val="1334071962"/>
       </p:ext>
     </p:extLst>
   </p:cSld>
@@ -2248,7 +2279,7 @@
     </p:spTree>
     <p:extLst>
       <p:ext uri="{BB962C8B-B14F-4D97-AF65-F5344CB8AC3E}">
-        <p14:creationId xmlns:p14="http://schemas.microsoft.com/office/powerpoint/2010/main" val="1938141025"/>
+        <p14:creationId xmlns:p14="http://schemas.microsoft.com/office/powerpoint/2010/main" val="2608322405"/>
       </p:ext>
     </p:extLst>
   </p:cSld>
@@ -2354,7 +2385,7 @@
     </p:spTree>
     <p:extLst>
       <p:ext uri="{BB962C8B-B14F-4D97-AF65-F5344CB8AC3E}">
-        <p14:creationId xmlns:p14="http://schemas.microsoft.com/office/powerpoint/2010/main" val="2207396834"/>
+        <p14:creationId xmlns:p14="http://schemas.microsoft.com/office/powerpoint/2010/main" val="1938141025"/>
       </p:ext>
     </p:extLst>
   </p:cSld>
@@ -2460,7 +2491,7 @@
     </p:spTree>
     <p:extLst>
       <p:ext uri="{BB962C8B-B14F-4D97-AF65-F5344CB8AC3E}">
-        <p14:creationId xmlns:p14="http://schemas.microsoft.com/office/powerpoint/2010/main" val="4290798987"/>
+        <p14:creationId xmlns:p14="http://schemas.microsoft.com/office/powerpoint/2010/main" val="2207396834"/>
       </p:ext>
     </p:extLst>
   </p:cSld>
@@ -2566,7 +2597,7 @@
     </p:spTree>
     <p:extLst>
       <p:ext uri="{BB962C8B-B14F-4D97-AF65-F5344CB8AC3E}">
-        <p14:creationId xmlns:p14="http://schemas.microsoft.com/office/powerpoint/2010/main" val="4045412743"/>
+        <p14:creationId xmlns:p14="http://schemas.microsoft.com/office/powerpoint/2010/main" val="4290798987"/>
       </p:ext>
     </p:extLst>
   </p:cSld>
@@ -2672,7 +2703,7 @@
     </p:spTree>
     <p:extLst>
       <p:ext uri="{BB962C8B-B14F-4D97-AF65-F5344CB8AC3E}">
-        <p14:creationId xmlns:p14="http://schemas.microsoft.com/office/powerpoint/2010/main" val="4103837002"/>
+        <p14:creationId xmlns:p14="http://schemas.microsoft.com/office/powerpoint/2010/main" val="4045412743"/>
       </p:ext>
     </p:extLst>
   </p:cSld>
@@ -2778,7 +2809,7 @@
     </p:spTree>
     <p:extLst>
       <p:ext uri="{BB962C8B-B14F-4D97-AF65-F5344CB8AC3E}">
-        <p14:creationId xmlns:p14="http://schemas.microsoft.com/office/powerpoint/2010/main" val="406690204"/>
+        <p14:creationId xmlns:p14="http://schemas.microsoft.com/office/powerpoint/2010/main" val="4103837002"/>
       </p:ext>
     </p:extLst>
   </p:cSld>
@@ -2884,7 +2915,7 @@
     </p:spTree>
     <p:extLst>
       <p:ext uri="{BB962C8B-B14F-4D97-AF65-F5344CB8AC3E}">
-        <p14:creationId xmlns:p14="http://schemas.microsoft.com/office/powerpoint/2010/main" val="417962869"/>
+        <p14:creationId xmlns:p14="http://schemas.microsoft.com/office/powerpoint/2010/main" val="406690204"/>
       </p:ext>
     </p:extLst>
   </p:cSld>
@@ -3126,7 +3157,7 @@
     </p:spTree>
     <p:extLst>
       <p:ext uri="{BB962C8B-B14F-4D97-AF65-F5344CB8AC3E}">
-        <p14:creationId xmlns:p14="http://schemas.microsoft.com/office/powerpoint/2010/main" val="1981498020"/>
+        <p14:creationId xmlns:p14="http://schemas.microsoft.com/office/powerpoint/2010/main" val="417962869"/>
       </p:ext>
     </p:extLst>
   </p:cSld>
@@ -3232,7 +3263,7 @@
     </p:spTree>
     <p:extLst>
       <p:ext uri="{BB962C8B-B14F-4D97-AF65-F5344CB8AC3E}">
-        <p14:creationId xmlns:p14="http://schemas.microsoft.com/office/powerpoint/2010/main" val="1419527883"/>
+        <p14:creationId xmlns:p14="http://schemas.microsoft.com/office/powerpoint/2010/main" val="1981498020"/>
       </p:ext>
     </p:extLst>
   </p:cSld>
@@ -3338,7 +3369,7 @@
     </p:spTree>
     <p:extLst>
       <p:ext uri="{BB962C8B-B14F-4D97-AF65-F5344CB8AC3E}">
-        <p14:creationId xmlns:p14="http://schemas.microsoft.com/office/powerpoint/2010/main" val="113872651"/>
+        <p14:creationId xmlns:p14="http://schemas.microsoft.com/office/powerpoint/2010/main" val="1419527883"/>
       </p:ext>
     </p:extLst>
   </p:cSld>
@@ -3444,7 +3475,7 @@
     </p:spTree>
     <p:extLst>
       <p:ext uri="{BB962C8B-B14F-4D97-AF65-F5344CB8AC3E}">
-        <p14:creationId xmlns:p14="http://schemas.microsoft.com/office/powerpoint/2010/main" val="643369375"/>
+        <p14:creationId xmlns:p14="http://schemas.microsoft.com/office/powerpoint/2010/main" val="113872651"/>
       </p:ext>
     </p:extLst>
   </p:cSld>
@@ -3550,6 +3581,112 @@
     </p:spTree>
     <p:extLst>
       <p:ext uri="{BB962C8B-B14F-4D97-AF65-F5344CB8AC3E}">
+        <p14:creationId xmlns:p14="http://schemas.microsoft.com/office/powerpoint/2010/main" val="643369375"/>
+      </p:ext>
+    </p:extLst>
+  </p:cSld>
+  <p:clrMapOvr>
+    <a:masterClrMapping/>
+  </p:clrMapOvr>
+</p:notes>
+</file>
+
+<file path=ppt/notesSlides/notesSlide35.xml><?xml version="1.0" encoding="utf-8"?>
+<p:notes xmlns:a="http://schemas.openxmlformats.org/drawingml/2006/main" xmlns:r="http://schemas.openxmlformats.org/officeDocument/2006/relationships" xmlns:p="http://schemas.openxmlformats.org/presentationml/2006/main">
+  <p:cSld>
+    <p:spTree>
+      <p:nvGrpSpPr>
+        <p:cNvPr id="1" name=""/>
+        <p:cNvGrpSpPr/>
+        <p:nvPr/>
+      </p:nvGrpSpPr>
+      <p:grpSpPr>
+        <a:xfrm>
+          <a:off x="0" y="0"/>
+          <a:ext cx="0" cy="0"/>
+          <a:chOff x="0" y="0"/>
+          <a:chExt cx="0" cy="0"/>
+        </a:xfrm>
+      </p:grpSpPr>
+      <p:sp>
+        <p:nvSpPr>
+          <p:cNvPr id="2" name="Slide Image Placeholder 1"/>
+          <p:cNvSpPr>
+            <a:spLocks noGrp="1" noRot="1" noChangeAspect="1"/>
+          </p:cNvSpPr>
+          <p:nvPr>
+            <p:ph type="sldImg"/>
+          </p:nvPr>
+        </p:nvSpPr>
+        <p:spPr/>
+      </p:sp>
+      <p:sp>
+        <p:nvSpPr>
+          <p:cNvPr id="3" name="Notes Placeholder 2"/>
+          <p:cNvSpPr>
+            <a:spLocks noGrp="1"/>
+          </p:cNvSpPr>
+          <p:nvPr>
+            <p:ph type="body" idx="1"/>
+          </p:nvPr>
+        </p:nvSpPr>
+        <p:spPr/>
+        <p:txBody>
+          <a:bodyPr/>
+          <a:lstStyle/>
+          <a:p>
+            <a:endParaRPr lang="ru-RU"/>
+          </a:p>
+        </p:txBody>
+      </p:sp>
+      <p:sp>
+        <p:nvSpPr>
+          <p:cNvPr id="4" name="Slide Number Placeholder 3"/>
+          <p:cNvSpPr>
+            <a:spLocks noGrp="1"/>
+          </p:cNvSpPr>
+          <p:nvPr>
+            <p:ph type="sldNum" sz="quarter" idx="10"/>
+          </p:nvPr>
+        </p:nvSpPr>
+        <p:spPr/>
+        <p:txBody>
+          <a:bodyPr/>
+          <a:lstStyle/>
+          <a:p>
+            <a:fld id="{7F33120B-582B-4354-977D-A474A534F6B9}" type="slidenum">
+              <a:rPr lang="ru-RU" smtClean="0"/>
+              <a:t>35</a:t>
+            </a:fld>
+            <a:endParaRPr lang="ru-RU"/>
+          </a:p>
+        </p:txBody>
+      </p:sp>
+      <p:sp>
+        <p:nvSpPr>
+          <p:cNvPr id="5" name="Header Placeholder 4"/>
+          <p:cNvSpPr>
+            <a:spLocks noGrp="1"/>
+          </p:cNvSpPr>
+          <p:nvPr>
+            <p:ph type="hdr" sz="quarter" idx="11"/>
+          </p:nvPr>
+        </p:nvSpPr>
+        <p:spPr/>
+        <p:txBody>
+          <a:bodyPr/>
+          <a:lstStyle/>
+          <a:p>
+            <a:r>
+              <a:rPr lang="ru-RU"/>
+              <a:t>Основы построения файловых систем</a:t>
+            </a:r>
+          </a:p>
+        </p:txBody>
+      </p:sp>
+    </p:spTree>
+    <p:extLst>
+      <p:ext uri="{BB962C8B-B14F-4D97-AF65-F5344CB8AC3E}">
         <p14:creationId xmlns:p14="http://schemas.microsoft.com/office/powerpoint/2010/main" val="3665097325"/>
       </p:ext>
     </p:extLst>
@@ -3560,7 +3697,7 @@
 </p:notes>
 </file>
 
-<file path=ppt/notesSlides/notesSlide35.xml><?xml version="1.0" encoding="utf-8"?>
+<file path=ppt/notesSlides/notesSlide36.xml><?xml version="1.0" encoding="utf-8"?>
 <p:notes xmlns:a="http://schemas.openxmlformats.org/drawingml/2006/main" xmlns:r="http://schemas.openxmlformats.org/officeDocument/2006/relationships" xmlns:p="http://schemas.openxmlformats.org/presentationml/2006/main">
   <p:cSld>
     <p:spTree>
@@ -3649,7 +3786,7 @@
           <a:p>
             <a:fld id="{7F33120B-582B-4354-977D-A474A534F6B9}" type="slidenum">
               <a:rPr lang="ru-RU" smtClean="0"/>
-              <a:t>35</a:t>
+              <a:t>36</a:t>
             </a:fld>
             <a:endParaRPr lang="ru-RU"/>
           </a:p>
@@ -3687,112 +3824,6 @@
     <p:extLst>
       <p:ext uri="{BB962C8B-B14F-4D97-AF65-F5344CB8AC3E}">
         <p14:creationId xmlns:p14="http://schemas.microsoft.com/office/powerpoint/2010/main" val="191020468"/>
-      </p:ext>
-    </p:extLst>
-  </p:cSld>
-  <p:clrMapOvr>
-    <a:masterClrMapping/>
-  </p:clrMapOvr>
-</p:notes>
-</file>
-
-<file path=ppt/notesSlides/notesSlide36.xml><?xml version="1.0" encoding="utf-8"?>
-<p:notes xmlns:a="http://schemas.openxmlformats.org/drawingml/2006/main" xmlns:r="http://schemas.openxmlformats.org/officeDocument/2006/relationships" xmlns:p="http://schemas.openxmlformats.org/presentationml/2006/main">
-  <p:cSld>
-    <p:spTree>
-      <p:nvGrpSpPr>
-        <p:cNvPr id="1" name=""/>
-        <p:cNvGrpSpPr/>
-        <p:nvPr/>
-      </p:nvGrpSpPr>
-      <p:grpSpPr>
-        <a:xfrm>
-          <a:off x="0" y="0"/>
-          <a:ext cx="0" cy="0"/>
-          <a:chOff x="0" y="0"/>
-          <a:chExt cx="0" cy="0"/>
-        </a:xfrm>
-      </p:grpSpPr>
-      <p:sp>
-        <p:nvSpPr>
-          <p:cNvPr id="2" name="Slide Image Placeholder 1"/>
-          <p:cNvSpPr>
-            <a:spLocks noGrp="1" noRot="1" noChangeAspect="1"/>
-          </p:cNvSpPr>
-          <p:nvPr>
-            <p:ph type="sldImg"/>
-          </p:nvPr>
-        </p:nvSpPr>
-        <p:spPr/>
-      </p:sp>
-      <p:sp>
-        <p:nvSpPr>
-          <p:cNvPr id="3" name="Notes Placeholder 2"/>
-          <p:cNvSpPr>
-            <a:spLocks noGrp="1"/>
-          </p:cNvSpPr>
-          <p:nvPr>
-            <p:ph type="body" idx="1"/>
-          </p:nvPr>
-        </p:nvSpPr>
-        <p:spPr/>
-        <p:txBody>
-          <a:bodyPr/>
-          <a:lstStyle/>
-          <a:p>
-            <a:endParaRPr lang="ru-RU"/>
-          </a:p>
-        </p:txBody>
-      </p:sp>
-      <p:sp>
-        <p:nvSpPr>
-          <p:cNvPr id="4" name="Slide Number Placeholder 3"/>
-          <p:cNvSpPr>
-            <a:spLocks noGrp="1"/>
-          </p:cNvSpPr>
-          <p:nvPr>
-            <p:ph type="sldNum" sz="quarter" idx="10"/>
-          </p:nvPr>
-        </p:nvSpPr>
-        <p:spPr/>
-        <p:txBody>
-          <a:bodyPr/>
-          <a:lstStyle/>
-          <a:p>
-            <a:fld id="{7F33120B-582B-4354-977D-A474A534F6B9}" type="slidenum">
-              <a:rPr lang="ru-RU" smtClean="0"/>
-              <a:t>36</a:t>
-            </a:fld>
-            <a:endParaRPr lang="ru-RU"/>
-          </a:p>
-        </p:txBody>
-      </p:sp>
-      <p:sp>
-        <p:nvSpPr>
-          <p:cNvPr id="5" name="Header Placeholder 4"/>
-          <p:cNvSpPr>
-            <a:spLocks noGrp="1"/>
-          </p:cNvSpPr>
-          <p:nvPr>
-            <p:ph type="hdr" sz="quarter" idx="11"/>
-          </p:nvPr>
-        </p:nvSpPr>
-        <p:spPr/>
-        <p:txBody>
-          <a:bodyPr/>
-          <a:lstStyle/>
-          <a:p>
-            <a:r>
-              <a:rPr lang="ru-RU"/>
-              <a:t>Основы построения файловых систем</a:t>
-            </a:r>
-          </a:p>
-        </p:txBody>
-      </p:sp>
-    </p:spTree>
-    <p:extLst>
-      <p:ext uri="{BB962C8B-B14F-4D97-AF65-F5344CB8AC3E}">
-        <p14:creationId xmlns:p14="http://schemas.microsoft.com/office/powerpoint/2010/main" val="1948873476"/>
       </p:ext>
     </p:extLst>
   </p:cSld>
@@ -3898,7 +3929,7 @@
     </p:spTree>
     <p:extLst>
       <p:ext uri="{BB962C8B-B14F-4D97-AF65-F5344CB8AC3E}">
-        <p14:creationId xmlns:p14="http://schemas.microsoft.com/office/powerpoint/2010/main" val="1863544739"/>
+        <p14:creationId xmlns:p14="http://schemas.microsoft.com/office/powerpoint/2010/main" val="1948873476"/>
       </p:ext>
     </p:extLst>
   </p:cSld>
@@ -3974,6 +4005,112 @@
             <a:fld id="{7F33120B-582B-4354-977D-A474A534F6B9}" type="slidenum">
               <a:rPr lang="ru-RU" smtClean="0"/>
               <a:t>38</a:t>
+            </a:fld>
+            <a:endParaRPr lang="ru-RU"/>
+          </a:p>
+        </p:txBody>
+      </p:sp>
+      <p:sp>
+        <p:nvSpPr>
+          <p:cNvPr id="5" name="Header Placeholder 4"/>
+          <p:cNvSpPr>
+            <a:spLocks noGrp="1"/>
+          </p:cNvSpPr>
+          <p:nvPr>
+            <p:ph type="hdr" sz="quarter" idx="11"/>
+          </p:nvPr>
+        </p:nvSpPr>
+        <p:spPr/>
+        <p:txBody>
+          <a:bodyPr/>
+          <a:lstStyle/>
+          <a:p>
+            <a:r>
+              <a:rPr lang="ru-RU"/>
+              <a:t>Основы построения файловых систем</a:t>
+            </a:r>
+          </a:p>
+        </p:txBody>
+      </p:sp>
+    </p:spTree>
+    <p:extLst>
+      <p:ext uri="{BB962C8B-B14F-4D97-AF65-F5344CB8AC3E}">
+        <p14:creationId xmlns:p14="http://schemas.microsoft.com/office/powerpoint/2010/main" val="1863544739"/>
+      </p:ext>
+    </p:extLst>
+  </p:cSld>
+  <p:clrMapOvr>
+    <a:masterClrMapping/>
+  </p:clrMapOvr>
+</p:notes>
+</file>
+
+<file path=ppt/notesSlides/notesSlide39.xml><?xml version="1.0" encoding="utf-8"?>
+<p:notes xmlns:a="http://schemas.openxmlformats.org/drawingml/2006/main" xmlns:r="http://schemas.openxmlformats.org/officeDocument/2006/relationships" xmlns:p="http://schemas.openxmlformats.org/presentationml/2006/main">
+  <p:cSld>
+    <p:spTree>
+      <p:nvGrpSpPr>
+        <p:cNvPr id="1" name=""/>
+        <p:cNvGrpSpPr/>
+        <p:nvPr/>
+      </p:nvGrpSpPr>
+      <p:grpSpPr>
+        <a:xfrm>
+          <a:off x="0" y="0"/>
+          <a:ext cx="0" cy="0"/>
+          <a:chOff x="0" y="0"/>
+          <a:chExt cx="0" cy="0"/>
+        </a:xfrm>
+      </p:grpSpPr>
+      <p:sp>
+        <p:nvSpPr>
+          <p:cNvPr id="2" name="Slide Image Placeholder 1"/>
+          <p:cNvSpPr>
+            <a:spLocks noGrp="1" noRot="1" noChangeAspect="1"/>
+          </p:cNvSpPr>
+          <p:nvPr>
+            <p:ph type="sldImg"/>
+          </p:nvPr>
+        </p:nvSpPr>
+        <p:spPr/>
+      </p:sp>
+      <p:sp>
+        <p:nvSpPr>
+          <p:cNvPr id="3" name="Notes Placeholder 2"/>
+          <p:cNvSpPr>
+            <a:spLocks noGrp="1"/>
+          </p:cNvSpPr>
+          <p:nvPr>
+            <p:ph type="body" idx="1"/>
+          </p:nvPr>
+        </p:nvSpPr>
+        <p:spPr/>
+        <p:txBody>
+          <a:bodyPr/>
+          <a:lstStyle/>
+          <a:p>
+            <a:endParaRPr lang="ru-RU"/>
+          </a:p>
+        </p:txBody>
+      </p:sp>
+      <p:sp>
+        <p:nvSpPr>
+          <p:cNvPr id="4" name="Slide Number Placeholder 3"/>
+          <p:cNvSpPr>
+            <a:spLocks noGrp="1"/>
+          </p:cNvSpPr>
+          <p:nvPr>
+            <p:ph type="sldNum" sz="quarter" idx="10"/>
+          </p:nvPr>
+        </p:nvSpPr>
+        <p:spPr/>
+        <p:txBody>
+          <a:bodyPr/>
+          <a:lstStyle/>
+          <a:p>
+            <a:fld id="{7F33120B-582B-4354-977D-A474A534F6B9}" type="slidenum">
+              <a:rPr lang="ru-RU" smtClean="0"/>
+              <a:t>39</a:t>
             </a:fld>
             <a:endParaRPr lang="ru-RU"/>
           </a:p>
@@ -4811,7 +4948,7 @@
           <a:p>
             <a:fld id="{4427D850-C269-5040-9E1D-5D50C477E825}" type="datetimeFigureOut">
               <a:rPr lang="ru-RU" smtClean="0"/>
-              <a:t>29.10.2024</a:t>
+              <a:t>06.11.2025</a:t>
             </a:fld>
             <a:endParaRPr lang="ru-RU"/>
           </a:p>
@@ -4981,7 +5118,7 @@
           <a:p>
             <a:fld id="{4427D850-C269-5040-9E1D-5D50C477E825}" type="datetimeFigureOut">
               <a:rPr lang="ru-RU" smtClean="0"/>
-              <a:t>29.10.2024</a:t>
+              <a:t>06.11.2025</a:t>
             </a:fld>
             <a:endParaRPr lang="ru-RU"/>
           </a:p>
@@ -5161,7 +5298,7 @@
           <a:p>
             <a:fld id="{4427D850-C269-5040-9E1D-5D50C477E825}" type="datetimeFigureOut">
               <a:rPr lang="ru-RU" smtClean="0"/>
-              <a:t>29.10.2024</a:t>
+              <a:t>06.11.2025</a:t>
             </a:fld>
             <a:endParaRPr lang="ru-RU"/>
           </a:p>
@@ -5331,7 +5468,7 @@
           <a:p>
             <a:fld id="{4427D850-C269-5040-9E1D-5D50C477E825}" type="datetimeFigureOut">
               <a:rPr lang="ru-RU" smtClean="0"/>
-              <a:t>29.10.2024</a:t>
+              <a:t>06.11.2025</a:t>
             </a:fld>
             <a:endParaRPr lang="ru-RU"/>
           </a:p>
@@ -5577,7 +5714,7 @@
           <a:p>
             <a:fld id="{4427D850-C269-5040-9E1D-5D50C477E825}" type="datetimeFigureOut">
               <a:rPr lang="ru-RU" smtClean="0"/>
-              <a:t>29.10.2024</a:t>
+              <a:t>06.11.2025</a:t>
             </a:fld>
             <a:endParaRPr lang="ru-RU"/>
           </a:p>
@@ -5817,7 +5954,7 @@
           <a:p>
             <a:fld id="{4427D850-C269-5040-9E1D-5D50C477E825}" type="datetimeFigureOut">
               <a:rPr lang="ru-RU" smtClean="0"/>
-              <a:t>29.10.2024</a:t>
+              <a:t>06.11.2025</a:t>
             </a:fld>
             <a:endParaRPr lang="ru-RU"/>
           </a:p>
@@ -6184,7 +6321,7 @@
           <a:p>
             <a:fld id="{4427D850-C269-5040-9E1D-5D50C477E825}" type="datetimeFigureOut">
               <a:rPr lang="ru-RU" smtClean="0"/>
-              <a:t>29.10.2024</a:t>
+              <a:t>06.11.2025</a:t>
             </a:fld>
             <a:endParaRPr lang="ru-RU"/>
           </a:p>
@@ -6302,7 +6439,7 @@
           <a:p>
             <a:fld id="{4427D850-C269-5040-9E1D-5D50C477E825}" type="datetimeFigureOut">
               <a:rPr lang="ru-RU" smtClean="0"/>
-              <a:t>29.10.2024</a:t>
+              <a:t>06.11.2025</a:t>
             </a:fld>
             <a:endParaRPr lang="ru-RU"/>
           </a:p>
@@ -6397,7 +6534,7 @@
           <a:p>
             <a:fld id="{4427D850-C269-5040-9E1D-5D50C477E825}" type="datetimeFigureOut">
               <a:rPr lang="ru-RU" smtClean="0"/>
-              <a:t>29.10.2024</a:t>
+              <a:t>06.11.2025</a:t>
             </a:fld>
             <a:endParaRPr lang="ru-RU"/>
           </a:p>
@@ -6674,7 +6811,7 @@
           <a:p>
             <a:fld id="{4427D850-C269-5040-9E1D-5D50C477E825}" type="datetimeFigureOut">
               <a:rPr lang="ru-RU" smtClean="0"/>
-              <a:t>29.10.2024</a:t>
+              <a:t>06.11.2025</a:t>
             </a:fld>
             <a:endParaRPr lang="ru-RU"/>
           </a:p>
@@ -6927,7 +7064,7 @@
           <a:p>
             <a:fld id="{4427D850-C269-5040-9E1D-5D50C477E825}" type="datetimeFigureOut">
               <a:rPr lang="ru-RU" smtClean="0"/>
-              <a:t>29.10.2024</a:t>
+              <a:t>06.11.2025</a:t>
             </a:fld>
             <a:endParaRPr lang="ru-RU"/>
           </a:p>
@@ -7140,7 +7277,7 @@
           <a:p>
             <a:fld id="{4427D850-C269-5040-9E1D-5D50C477E825}" type="datetimeFigureOut">
               <a:rPr lang="ru-RU" smtClean="0"/>
-              <a:t>29.10.2024</a:t>
+              <a:t>06.11.2025</a:t>
             </a:fld>
             <a:endParaRPr lang="ru-RU"/>
           </a:p>
@@ -11646,6 +11783,1400 @@
     </p:bg>
     <p:spTree>
       <p:nvGrpSpPr>
+        <p:cNvPr id="1" name="">
+          <a:extLst>
+            <a:ext uri="{FF2B5EF4-FFF2-40B4-BE49-F238E27FC236}">
+              <a16:creationId xmlns:a16="http://schemas.microsoft.com/office/drawing/2014/main" id="{956214D6-5870-A6EB-7E56-FE9D16376544}"/>
+            </a:ext>
+          </a:extLst>
+        </p:cNvPr>
+        <p:cNvGrpSpPr/>
+        <p:nvPr/>
+      </p:nvGrpSpPr>
+      <p:grpSpPr>
+        <a:xfrm>
+          <a:off x="0" y="0"/>
+          <a:ext cx="0" cy="0"/>
+          <a:chOff x="0" y="0"/>
+          <a:chExt cx="0" cy="0"/>
+        </a:xfrm>
+      </p:grpSpPr>
+      <p:graphicFrame>
+        <p:nvGraphicFramePr>
+          <p:cNvPr id="5" name="Table 4">
+            <a:extLst>
+              <a:ext uri="{FF2B5EF4-FFF2-40B4-BE49-F238E27FC236}">
+                <a16:creationId xmlns:a16="http://schemas.microsoft.com/office/drawing/2014/main" id="{68BCCB36-F874-D0CB-6D1A-922C2F922C64}"/>
+              </a:ext>
+            </a:extLst>
+          </p:cNvPr>
+          <p:cNvGraphicFramePr>
+            <a:graphicFrameLocks noGrp="1"/>
+          </p:cNvGraphicFramePr>
+          <p:nvPr/>
+        </p:nvGraphicFramePr>
+        <p:xfrm>
+          <a:off x="0" y="1"/>
+          <a:ext cx="12192000" cy="365760"/>
+        </p:xfrm>
+        <a:graphic>
+          <a:graphicData uri="http://schemas.openxmlformats.org/drawingml/2006/table">
+            <a:tbl>
+              <a:tblPr firstRow="1" bandRow="1">
+                <a:tableStyleId>{5C22544A-7EE6-4342-B048-85BDC9FD1C3A}</a:tableStyleId>
+              </a:tblPr>
+              <a:tblGrid>
+                <a:gridCol w="12192000">
+                  <a:extLst>
+                    <a:ext uri="{9D8B030D-6E8A-4147-A177-3AD203B41FA5}">
+                      <a16:colId xmlns:a16="http://schemas.microsoft.com/office/drawing/2014/main" val="20000"/>
+                    </a:ext>
+                  </a:extLst>
+                </a:gridCol>
+              </a:tblGrid>
+              <a:tr h="321276">
+                <a:tc>
+                  <a:txBody>
+                    <a:bodyPr/>
+                    <a:lstStyle/>
+                    <a:p>
+                      <a:r>
+                        <a:rPr lang="en-US" sz="1800" dirty="0"/>
+                        <a:t>The basics of file systems</a:t>
+                      </a:r>
+                      <a:endParaRPr lang="ru-RU" sz="1800" dirty="0"/>
+                    </a:p>
+                  </a:txBody>
+                  <a:tcPr/>
+                </a:tc>
+                <a:extLst>
+                  <a:ext uri="{0D108BD9-81ED-4DB2-BD59-A6C34878D82A}">
+                    <a16:rowId xmlns:a16="http://schemas.microsoft.com/office/drawing/2014/main" val="10000"/>
+                  </a:ext>
+                </a:extLst>
+              </a:tr>
+            </a:tbl>
+          </a:graphicData>
+        </a:graphic>
+      </p:graphicFrame>
+      <p:graphicFrame>
+        <p:nvGraphicFramePr>
+          <p:cNvPr id="6" name="Table 5">
+            <a:extLst>
+              <a:ext uri="{FF2B5EF4-FFF2-40B4-BE49-F238E27FC236}">
+                <a16:creationId xmlns:a16="http://schemas.microsoft.com/office/drawing/2014/main" id="{324467B9-2E75-65C2-EB70-A006C87EDF45}"/>
+              </a:ext>
+            </a:extLst>
+          </p:cNvPr>
+          <p:cNvGraphicFramePr>
+            <a:graphicFrameLocks noGrp="1"/>
+          </p:cNvGraphicFramePr>
+          <p:nvPr/>
+        </p:nvGraphicFramePr>
+        <p:xfrm>
+          <a:off x="0" y="6532604"/>
+          <a:ext cx="12192000" cy="365760"/>
+        </p:xfrm>
+        <a:graphic>
+          <a:graphicData uri="http://schemas.openxmlformats.org/drawingml/2006/table">
+            <a:tbl>
+              <a:tblPr firstRow="1" bandRow="1">
+                <a:tableStyleId>{5C22544A-7EE6-4342-B048-85BDC9FD1C3A}</a:tableStyleId>
+              </a:tblPr>
+              <a:tblGrid>
+                <a:gridCol w="12192000">
+                  <a:extLst>
+                    <a:ext uri="{9D8B030D-6E8A-4147-A177-3AD203B41FA5}">
+                      <a16:colId xmlns:a16="http://schemas.microsoft.com/office/drawing/2014/main" val="20000"/>
+                    </a:ext>
+                  </a:extLst>
+                </a:gridCol>
+              </a:tblGrid>
+              <a:tr h="308094">
+                <a:tc>
+                  <a:txBody>
+                    <a:bodyPr/>
+                    <a:lstStyle/>
+                    <a:p>
+                      <a:endParaRPr lang="ru-RU" dirty="0"/>
+                    </a:p>
+                  </a:txBody>
+                  <a:tcPr/>
+                </a:tc>
+                <a:extLst>
+                  <a:ext uri="{0D108BD9-81ED-4DB2-BD59-A6C34878D82A}">
+                    <a16:rowId xmlns:a16="http://schemas.microsoft.com/office/drawing/2014/main" val="10000"/>
+                  </a:ext>
+                </a:extLst>
+              </a:tr>
+            </a:tbl>
+          </a:graphicData>
+        </a:graphic>
+      </p:graphicFrame>
+      <p:graphicFrame>
+        <p:nvGraphicFramePr>
+          <p:cNvPr id="3" name="Table 2">
+            <a:extLst>
+              <a:ext uri="{FF2B5EF4-FFF2-40B4-BE49-F238E27FC236}">
+                <a16:creationId xmlns:a16="http://schemas.microsoft.com/office/drawing/2014/main" id="{EF625DD9-EFD5-DCC8-D67A-90D841B40A74}"/>
+              </a:ext>
+            </a:extLst>
+          </p:cNvPr>
+          <p:cNvGraphicFramePr>
+            <a:graphicFrameLocks noGrp="1"/>
+          </p:cNvGraphicFramePr>
+          <p:nvPr>
+            <p:extLst>
+              <p:ext uri="{D42A27DB-BD31-4B8C-83A1-F6EECF244321}">
+                <p14:modId xmlns:p14="http://schemas.microsoft.com/office/powerpoint/2010/main" val="2909911912"/>
+              </p:ext>
+            </p:extLst>
+          </p:nvPr>
+        </p:nvGraphicFramePr>
+        <p:xfrm>
+          <a:off x="1" y="365760"/>
+          <a:ext cx="12192000" cy="5242560"/>
+        </p:xfrm>
+        <a:graphic>
+          <a:graphicData uri="http://schemas.openxmlformats.org/drawingml/2006/table">
+            <a:tbl>
+              <a:tblPr firstRow="1" bandRow="1">
+                <a:tableStyleId>{3B4B98B0-60AC-42C2-AFA5-B58CD77FA1E5}</a:tableStyleId>
+              </a:tblPr>
+              <a:tblGrid>
+                <a:gridCol w="4430485">
+                  <a:extLst>
+                    <a:ext uri="{9D8B030D-6E8A-4147-A177-3AD203B41FA5}">
+                      <a16:colId xmlns:a16="http://schemas.microsoft.com/office/drawing/2014/main" val="20000"/>
+                    </a:ext>
+                  </a:extLst>
+                </a:gridCol>
+                <a:gridCol w="3918857">
+                  <a:extLst>
+                    <a:ext uri="{9D8B030D-6E8A-4147-A177-3AD203B41FA5}">
+                      <a16:colId xmlns:a16="http://schemas.microsoft.com/office/drawing/2014/main" val="2704726091"/>
+                    </a:ext>
+                  </a:extLst>
+                </a:gridCol>
+                <a:gridCol w="3842658">
+                  <a:extLst>
+                    <a:ext uri="{9D8B030D-6E8A-4147-A177-3AD203B41FA5}">
+                      <a16:colId xmlns:a16="http://schemas.microsoft.com/office/drawing/2014/main" val="2141660679"/>
+                    </a:ext>
+                  </a:extLst>
+                </a:gridCol>
+              </a:tblGrid>
+              <a:tr h="0">
+                <a:tc gridSpan="3">
+                  <a:txBody>
+                    <a:bodyPr/>
+                    <a:lstStyle/>
+                    <a:p>
+                      <a:r>
+                        <a:rPr lang="ru-RU" sz="2400" dirty="0"/>
+                        <a:t>Атрибуты файлов</a:t>
+                      </a:r>
+                      <a:r>
+                        <a:rPr lang="en-US" sz="2400" dirty="0"/>
+                        <a:t> (</a:t>
+                      </a:r>
+                      <a:r>
+                        <a:rPr lang="en-US" sz="2400" dirty="0" err="1"/>
+                        <a:t>src</a:t>
+                      </a:r>
+                      <a:r>
+                        <a:rPr lang="en-US" sz="2400" dirty="0"/>
+                        <a:t>/</a:t>
+                      </a:r>
+                      <a:r>
+                        <a:rPr lang="en-US" sz="2400" dirty="0" err="1"/>
+                        <a:t>linux</a:t>
+                      </a:r>
+                      <a:r>
+                        <a:rPr lang="en-US" sz="2400" dirty="0"/>
+                        <a:t>/fs/ntfs3/</a:t>
+                      </a:r>
+                      <a:r>
+                        <a:rPr lang="en-US" sz="2400" dirty="0" err="1"/>
+                        <a:t>ntfs.h</a:t>
+                      </a:r>
+                      <a:r>
+                        <a:rPr lang="en-US" sz="2400" dirty="0"/>
+                        <a:t>)</a:t>
+                      </a:r>
+                      <a:endParaRPr lang="ru-RU" sz="2400" dirty="0"/>
+                    </a:p>
+                  </a:txBody>
+                  <a:tcPr/>
+                </a:tc>
+                <a:tc hMerge="1">
+                  <a:txBody>
+                    <a:bodyPr/>
+                    <a:lstStyle/>
+                    <a:p>
+                      <a:endParaRPr lang="en-RU"/>
+                    </a:p>
+                  </a:txBody>
+                  <a:tcPr/>
+                </a:tc>
+                <a:tc hMerge="1">
+                  <a:txBody>
+                    <a:bodyPr/>
+                    <a:lstStyle/>
+                    <a:p>
+                      <a:endParaRPr lang="en-RU"/>
+                    </a:p>
+                  </a:txBody>
+                  <a:tcPr/>
+                </a:tc>
+                <a:extLst>
+                  <a:ext uri="{0D108BD9-81ED-4DB2-BD59-A6C34878D82A}">
+                    <a16:rowId xmlns:a16="http://schemas.microsoft.com/office/drawing/2014/main" val="10000"/>
+                  </a:ext>
+                </a:extLst>
+              </a:tr>
+              <a:tr h="0">
+                <a:tc gridSpan="3">
+                  <a:txBody>
+                    <a:bodyPr/>
+                    <a:lstStyle/>
+                    <a:p>
+                      <a:endParaRPr lang="en-US" sz="1800" dirty="0"/>
+                    </a:p>
+                    <a:p>
+                      <a:endParaRPr lang="en-US" sz="1800" dirty="0"/>
+                    </a:p>
+                  </a:txBody>
+                  <a:tcPr/>
+                </a:tc>
+                <a:tc hMerge="1">
+                  <a:txBody>
+                    <a:bodyPr/>
+                    <a:lstStyle/>
+                    <a:p>
+                      <a:endParaRPr lang="ru-RU" sz="1800" dirty="0"/>
+                    </a:p>
+                  </a:txBody>
+                  <a:tcPr/>
+                </a:tc>
+                <a:tc hMerge="1">
+                  <a:txBody>
+                    <a:bodyPr/>
+                    <a:lstStyle/>
+                    <a:p>
+                      <a:endParaRPr lang="ru-RU" sz="1800" dirty="0"/>
+                    </a:p>
+                  </a:txBody>
+                  <a:tcPr/>
+                </a:tc>
+                <a:extLst>
+                  <a:ext uri="{0D108BD9-81ED-4DB2-BD59-A6C34878D82A}">
+                    <a16:rowId xmlns:a16="http://schemas.microsoft.com/office/drawing/2014/main" val="2154562321"/>
+                  </a:ext>
+                </a:extLst>
+              </a:tr>
+              <a:tr h="0">
+                <a:tc>
+                  <a:txBody>
+                    <a:bodyPr/>
+                    <a:lstStyle/>
+                    <a:p>
+                      <a:r>
+                        <a:rPr lang="en-GB" sz="1600" dirty="0">
+                          <a:solidFill>
+                            <a:schemeClr val="bg1">
+                              <a:lumMod val="75000"/>
+                            </a:schemeClr>
+                          </a:solidFill>
+                          <a:latin typeface="Consolas" panose="020B0609020204030204" pitchFamily="49" charset="0"/>
+                          <a:cs typeface="Consolas" panose="020B0609020204030204" pitchFamily="49" charset="0"/>
+                        </a:rPr>
+                        <a:t>struct ATTRIB {</a:t>
+                      </a:r>
+                    </a:p>
+                    <a:p>
+                      <a:r>
+                        <a:rPr lang="en-GB" sz="1600" dirty="0">
+                          <a:solidFill>
+                            <a:schemeClr val="bg1">
+                              <a:lumMod val="75000"/>
+                            </a:schemeClr>
+                          </a:solidFill>
+                          <a:latin typeface="Consolas" panose="020B0609020204030204" pitchFamily="49" charset="0"/>
+                          <a:cs typeface="Consolas" panose="020B0609020204030204" pitchFamily="49" charset="0"/>
+                        </a:rPr>
+                        <a:t>    </a:t>
+                      </a:r>
+                      <a:r>
+                        <a:rPr lang="en-GB" sz="1600" dirty="0" err="1">
+                          <a:solidFill>
+                            <a:schemeClr val="bg1">
+                              <a:lumMod val="75000"/>
+                            </a:schemeClr>
+                          </a:solidFill>
+                          <a:latin typeface="Consolas" panose="020B0609020204030204" pitchFamily="49" charset="0"/>
+                          <a:cs typeface="Consolas" panose="020B0609020204030204" pitchFamily="49" charset="0"/>
+                        </a:rPr>
+                        <a:t>enum</a:t>
+                      </a:r>
+                      <a:r>
+                        <a:rPr lang="en-GB" sz="1600" dirty="0">
+                          <a:solidFill>
+                            <a:schemeClr val="bg1">
+                              <a:lumMod val="75000"/>
+                            </a:schemeClr>
+                          </a:solidFill>
+                          <a:latin typeface="Consolas" panose="020B0609020204030204" pitchFamily="49" charset="0"/>
+                          <a:cs typeface="Consolas" panose="020B0609020204030204" pitchFamily="49" charset="0"/>
+                        </a:rPr>
+                        <a:t> ATTR_TYPE type;</a:t>
+                      </a:r>
+                    </a:p>
+                    <a:p>
+                      <a:r>
+                        <a:rPr lang="en-GB" sz="1600" dirty="0">
+                          <a:solidFill>
+                            <a:schemeClr val="bg1">
+                              <a:lumMod val="75000"/>
+                            </a:schemeClr>
+                          </a:solidFill>
+                          <a:latin typeface="Consolas" panose="020B0609020204030204" pitchFamily="49" charset="0"/>
+                          <a:cs typeface="Consolas" panose="020B0609020204030204" pitchFamily="49" charset="0"/>
+                        </a:rPr>
+                        <a:t>    __le32 size;</a:t>
+                      </a:r>
+                    </a:p>
+                    <a:p>
+                      <a:r>
+                        <a:rPr lang="en-GB" sz="1600" dirty="0">
+                          <a:solidFill>
+                            <a:schemeClr val="bg1">
+                              <a:lumMod val="75000"/>
+                            </a:schemeClr>
+                          </a:solidFill>
+                          <a:latin typeface="Consolas" panose="020B0609020204030204" pitchFamily="49" charset="0"/>
+                          <a:cs typeface="Consolas" panose="020B0609020204030204" pitchFamily="49" charset="0"/>
+                        </a:rPr>
+                        <a:t>    u8 </a:t>
+                      </a:r>
+                      <a:r>
+                        <a:rPr lang="en-GB" sz="1600" dirty="0" err="1">
+                          <a:solidFill>
+                            <a:schemeClr val="bg1">
+                              <a:lumMod val="75000"/>
+                            </a:schemeClr>
+                          </a:solidFill>
+                          <a:latin typeface="Consolas" panose="020B0609020204030204" pitchFamily="49" charset="0"/>
+                          <a:cs typeface="Consolas" panose="020B0609020204030204" pitchFamily="49" charset="0"/>
+                        </a:rPr>
+                        <a:t>non_res</a:t>
+                      </a:r>
+                      <a:r>
+                        <a:rPr lang="en-GB" sz="1600" dirty="0">
+                          <a:solidFill>
+                            <a:schemeClr val="bg1">
+                              <a:lumMod val="75000"/>
+                            </a:schemeClr>
+                          </a:solidFill>
+                          <a:latin typeface="Consolas" panose="020B0609020204030204" pitchFamily="49" charset="0"/>
+                          <a:cs typeface="Consolas" panose="020B0609020204030204" pitchFamily="49" charset="0"/>
+                        </a:rPr>
+                        <a:t>;</a:t>
+                      </a:r>
+                    </a:p>
+                    <a:p>
+                      <a:r>
+                        <a:rPr lang="en-GB" sz="1600" dirty="0">
+                          <a:solidFill>
+                            <a:schemeClr val="bg1">
+                              <a:lumMod val="75000"/>
+                            </a:schemeClr>
+                          </a:solidFill>
+                          <a:latin typeface="Consolas" panose="020B0609020204030204" pitchFamily="49" charset="0"/>
+                          <a:cs typeface="Consolas" panose="020B0609020204030204" pitchFamily="49" charset="0"/>
+                        </a:rPr>
+                        <a:t>    u8 </a:t>
+                      </a:r>
+                      <a:r>
+                        <a:rPr lang="en-GB" sz="1600" dirty="0" err="1">
+                          <a:solidFill>
+                            <a:schemeClr val="bg1">
+                              <a:lumMod val="75000"/>
+                            </a:schemeClr>
+                          </a:solidFill>
+                          <a:latin typeface="Consolas" panose="020B0609020204030204" pitchFamily="49" charset="0"/>
+                          <a:cs typeface="Consolas" panose="020B0609020204030204" pitchFamily="49" charset="0"/>
+                        </a:rPr>
+                        <a:t>name_len</a:t>
+                      </a:r>
+                      <a:r>
+                        <a:rPr lang="en-GB" sz="1600" dirty="0">
+                          <a:solidFill>
+                            <a:schemeClr val="bg1">
+                              <a:lumMod val="75000"/>
+                            </a:schemeClr>
+                          </a:solidFill>
+                          <a:latin typeface="Consolas" panose="020B0609020204030204" pitchFamily="49" charset="0"/>
+                          <a:cs typeface="Consolas" panose="020B0609020204030204" pitchFamily="49" charset="0"/>
+                        </a:rPr>
+                        <a:t>;</a:t>
+                      </a:r>
+                    </a:p>
+                    <a:p>
+                      <a:r>
+                        <a:rPr lang="en-GB" sz="1600" dirty="0">
+                          <a:solidFill>
+                            <a:schemeClr val="bg1">
+                              <a:lumMod val="75000"/>
+                            </a:schemeClr>
+                          </a:solidFill>
+                          <a:latin typeface="Consolas" panose="020B0609020204030204" pitchFamily="49" charset="0"/>
+                          <a:cs typeface="Consolas" panose="020B0609020204030204" pitchFamily="49" charset="0"/>
+                        </a:rPr>
+                        <a:t>    __le16 </a:t>
+                      </a:r>
+                      <a:r>
+                        <a:rPr lang="en-GB" sz="1600" dirty="0" err="1">
+                          <a:solidFill>
+                            <a:schemeClr val="bg1">
+                              <a:lumMod val="75000"/>
+                            </a:schemeClr>
+                          </a:solidFill>
+                          <a:latin typeface="Consolas" panose="020B0609020204030204" pitchFamily="49" charset="0"/>
+                          <a:cs typeface="Consolas" panose="020B0609020204030204" pitchFamily="49" charset="0"/>
+                        </a:rPr>
+                        <a:t>name_off</a:t>
+                      </a:r>
+                      <a:r>
+                        <a:rPr lang="en-GB" sz="1600" dirty="0">
+                          <a:solidFill>
+                            <a:schemeClr val="bg1">
+                              <a:lumMod val="75000"/>
+                            </a:schemeClr>
+                          </a:solidFill>
+                          <a:latin typeface="Consolas" panose="020B0609020204030204" pitchFamily="49" charset="0"/>
+                          <a:cs typeface="Consolas" panose="020B0609020204030204" pitchFamily="49" charset="0"/>
+                        </a:rPr>
+                        <a:t>;</a:t>
+                      </a:r>
+                    </a:p>
+                    <a:p>
+                      <a:r>
+                        <a:rPr lang="en-GB" sz="1600" dirty="0">
+                          <a:solidFill>
+                            <a:schemeClr val="bg1">
+                              <a:lumMod val="75000"/>
+                            </a:schemeClr>
+                          </a:solidFill>
+                          <a:latin typeface="Consolas" panose="020B0609020204030204" pitchFamily="49" charset="0"/>
+                          <a:cs typeface="Consolas" panose="020B0609020204030204" pitchFamily="49" charset="0"/>
+                        </a:rPr>
+                        <a:t>    __le16 flags;</a:t>
+                      </a:r>
+                    </a:p>
+                    <a:p>
+                      <a:r>
+                        <a:rPr lang="en-GB" sz="1600" dirty="0">
+                          <a:solidFill>
+                            <a:schemeClr val="bg1">
+                              <a:lumMod val="75000"/>
+                            </a:schemeClr>
+                          </a:solidFill>
+                          <a:latin typeface="Consolas" panose="020B0609020204030204" pitchFamily="49" charset="0"/>
+                          <a:cs typeface="Consolas" panose="020B0609020204030204" pitchFamily="49" charset="0"/>
+                        </a:rPr>
+                        <a:t>    __le16 id;</a:t>
+                      </a:r>
+                    </a:p>
+                    <a:p>
+                      <a:endParaRPr lang="en-GB" sz="1600" dirty="0">
+                        <a:solidFill>
+                          <a:schemeClr val="bg1">
+                            <a:lumMod val="75000"/>
+                          </a:schemeClr>
+                        </a:solidFill>
+                        <a:latin typeface="Consolas" panose="020B0609020204030204" pitchFamily="49" charset="0"/>
+                        <a:cs typeface="Consolas" panose="020B0609020204030204" pitchFamily="49" charset="0"/>
+                      </a:endParaRPr>
+                    </a:p>
+                    <a:p>
+                      <a:r>
+                        <a:rPr lang="en-GB" sz="1600" dirty="0">
+                          <a:solidFill>
+                            <a:schemeClr val="bg1">
+                              <a:lumMod val="75000"/>
+                            </a:schemeClr>
+                          </a:solidFill>
+                          <a:latin typeface="Consolas" panose="020B0609020204030204" pitchFamily="49" charset="0"/>
+                          <a:cs typeface="Consolas" panose="020B0609020204030204" pitchFamily="49" charset="0"/>
+                        </a:rPr>
+                        <a:t>    union {</a:t>
+                      </a:r>
+                    </a:p>
+                    <a:p>
+                      <a:r>
+                        <a:rPr lang="en-GB" sz="1600" dirty="0">
+                          <a:solidFill>
+                            <a:schemeClr val="bg1">
+                              <a:lumMod val="75000"/>
+                            </a:schemeClr>
+                          </a:solidFill>
+                          <a:latin typeface="Consolas" panose="020B0609020204030204" pitchFamily="49" charset="0"/>
+                          <a:cs typeface="Consolas" panose="020B0609020204030204" pitchFamily="49" charset="0"/>
+                        </a:rPr>
+                        <a:t>        struct ATTR_RESIDENT res;</a:t>
+                      </a:r>
+                    </a:p>
+                    <a:p>
+                      <a:r>
+                        <a:rPr lang="en-GB" sz="1600" dirty="0">
+                          <a:solidFill>
+                            <a:schemeClr val="bg1">
+                              <a:lumMod val="75000"/>
+                            </a:schemeClr>
+                          </a:solidFill>
+                          <a:latin typeface="Consolas" panose="020B0609020204030204" pitchFamily="49" charset="0"/>
+                          <a:cs typeface="Consolas" panose="020B0609020204030204" pitchFamily="49" charset="0"/>
+                        </a:rPr>
+                        <a:t>        struct ATTR_NONRESIDENT </a:t>
+                      </a:r>
+                      <a:r>
+                        <a:rPr lang="en-GB" sz="1600" dirty="0" err="1">
+                          <a:solidFill>
+                            <a:schemeClr val="bg1">
+                              <a:lumMod val="75000"/>
+                            </a:schemeClr>
+                          </a:solidFill>
+                          <a:latin typeface="Consolas" panose="020B0609020204030204" pitchFamily="49" charset="0"/>
+                          <a:cs typeface="Consolas" panose="020B0609020204030204" pitchFamily="49" charset="0"/>
+                        </a:rPr>
+                        <a:t>nres</a:t>
+                      </a:r>
+                      <a:r>
+                        <a:rPr lang="en-GB" sz="1600" dirty="0">
+                          <a:solidFill>
+                            <a:schemeClr val="bg1">
+                              <a:lumMod val="75000"/>
+                            </a:schemeClr>
+                          </a:solidFill>
+                          <a:latin typeface="Consolas" panose="020B0609020204030204" pitchFamily="49" charset="0"/>
+                          <a:cs typeface="Consolas" panose="020B0609020204030204" pitchFamily="49" charset="0"/>
+                        </a:rPr>
+                        <a:t>;</a:t>
+                      </a:r>
+                    </a:p>
+                    <a:p>
+                      <a:r>
+                        <a:rPr lang="en-GB" sz="1600" dirty="0">
+                          <a:solidFill>
+                            <a:schemeClr val="bg1">
+                              <a:lumMod val="75000"/>
+                            </a:schemeClr>
+                          </a:solidFill>
+                          <a:latin typeface="Consolas" panose="020B0609020204030204" pitchFamily="49" charset="0"/>
+                          <a:cs typeface="Consolas" panose="020B0609020204030204" pitchFamily="49" charset="0"/>
+                        </a:rPr>
+                        <a:t>    };</a:t>
+                      </a:r>
+                    </a:p>
+                    <a:p>
+                      <a:r>
+                        <a:rPr lang="en-GB" sz="1600" dirty="0">
+                          <a:solidFill>
+                            <a:schemeClr val="bg1">
+                              <a:lumMod val="75000"/>
+                            </a:schemeClr>
+                          </a:solidFill>
+                          <a:latin typeface="Consolas" panose="020B0609020204030204" pitchFamily="49" charset="0"/>
+                          <a:cs typeface="Consolas" panose="020B0609020204030204" pitchFamily="49" charset="0"/>
+                        </a:rPr>
+                        <a:t>};</a:t>
+                      </a:r>
+                      <a:endParaRPr lang="ru-RU" sz="1800" dirty="0">
+                        <a:solidFill>
+                          <a:schemeClr val="bg1">
+                            <a:lumMod val="75000"/>
+                          </a:schemeClr>
+                        </a:solidFill>
+                      </a:endParaRPr>
+                    </a:p>
+                  </a:txBody>
+                  <a:tcPr/>
+                </a:tc>
+                <a:tc>
+                  <a:txBody>
+                    <a:bodyPr/>
+                    <a:lstStyle/>
+                    <a:p>
+                      <a:r>
+                        <a:rPr lang="en-US" sz="1600" dirty="0">
+                          <a:solidFill>
+                            <a:schemeClr val="bg1">
+                              <a:lumMod val="75000"/>
+                            </a:schemeClr>
+                          </a:solidFill>
+                          <a:latin typeface="Consolas" panose="020B0609020204030204" pitchFamily="49" charset="0"/>
+                          <a:cs typeface="Consolas" panose="020B0609020204030204" pitchFamily="49" charset="0"/>
+                        </a:rPr>
+                        <a:t>struct ATTR_RESIDENT {</a:t>
+                      </a:r>
+                    </a:p>
+                    <a:p>
+                      <a:r>
+                        <a:rPr lang="en-US" sz="1600" dirty="0">
+                          <a:solidFill>
+                            <a:schemeClr val="bg1">
+                              <a:lumMod val="75000"/>
+                            </a:schemeClr>
+                          </a:solidFill>
+                          <a:latin typeface="Consolas" panose="020B0609020204030204" pitchFamily="49" charset="0"/>
+                          <a:cs typeface="Consolas" panose="020B0609020204030204" pitchFamily="49" charset="0"/>
+                        </a:rPr>
+                        <a:t>    __le32 </a:t>
+                      </a:r>
+                      <a:r>
+                        <a:rPr lang="en-US" sz="1600" dirty="0" err="1">
+                          <a:solidFill>
+                            <a:schemeClr val="bg1">
+                              <a:lumMod val="75000"/>
+                            </a:schemeClr>
+                          </a:solidFill>
+                          <a:latin typeface="Consolas" panose="020B0609020204030204" pitchFamily="49" charset="0"/>
+                          <a:cs typeface="Consolas" panose="020B0609020204030204" pitchFamily="49" charset="0"/>
+                        </a:rPr>
+                        <a:t>data_size</a:t>
+                      </a:r>
+                      <a:r>
+                        <a:rPr lang="en-US" sz="1600" dirty="0">
+                          <a:solidFill>
+                            <a:schemeClr val="bg1">
+                              <a:lumMod val="75000"/>
+                            </a:schemeClr>
+                          </a:solidFill>
+                          <a:latin typeface="Consolas" panose="020B0609020204030204" pitchFamily="49" charset="0"/>
+                          <a:cs typeface="Consolas" panose="020B0609020204030204" pitchFamily="49" charset="0"/>
+                        </a:rPr>
+                        <a:t>;</a:t>
+                      </a:r>
+                    </a:p>
+                    <a:p>
+                      <a:r>
+                        <a:rPr lang="en-US" sz="1600" dirty="0">
+                          <a:solidFill>
+                            <a:schemeClr val="bg1">
+                              <a:lumMod val="75000"/>
+                            </a:schemeClr>
+                          </a:solidFill>
+                          <a:latin typeface="Consolas" panose="020B0609020204030204" pitchFamily="49" charset="0"/>
+                          <a:cs typeface="Consolas" panose="020B0609020204030204" pitchFamily="49" charset="0"/>
+                        </a:rPr>
+                        <a:t>    __le16 </a:t>
+                      </a:r>
+                      <a:r>
+                        <a:rPr lang="en-US" sz="1600" dirty="0" err="1">
+                          <a:solidFill>
+                            <a:schemeClr val="bg1">
+                              <a:lumMod val="75000"/>
+                            </a:schemeClr>
+                          </a:solidFill>
+                          <a:latin typeface="Consolas" panose="020B0609020204030204" pitchFamily="49" charset="0"/>
+                          <a:cs typeface="Consolas" panose="020B0609020204030204" pitchFamily="49" charset="0"/>
+                        </a:rPr>
+                        <a:t>data_off</a:t>
+                      </a:r>
+                      <a:r>
+                        <a:rPr lang="en-US" sz="1600" dirty="0">
+                          <a:solidFill>
+                            <a:schemeClr val="bg1">
+                              <a:lumMod val="75000"/>
+                            </a:schemeClr>
+                          </a:solidFill>
+                          <a:latin typeface="Consolas" panose="020B0609020204030204" pitchFamily="49" charset="0"/>
+                          <a:cs typeface="Consolas" panose="020B0609020204030204" pitchFamily="49" charset="0"/>
+                        </a:rPr>
+                        <a:t>;</a:t>
+                      </a:r>
+                    </a:p>
+                    <a:p>
+                      <a:r>
+                        <a:rPr lang="en-US" sz="1600" dirty="0">
+                          <a:solidFill>
+                            <a:schemeClr val="bg1">
+                              <a:lumMod val="75000"/>
+                            </a:schemeClr>
+                          </a:solidFill>
+                          <a:latin typeface="Consolas" panose="020B0609020204030204" pitchFamily="49" charset="0"/>
+                          <a:cs typeface="Consolas" panose="020B0609020204030204" pitchFamily="49" charset="0"/>
+                        </a:rPr>
+                        <a:t>    u8 flags;</a:t>
+                      </a:r>
+                    </a:p>
+                    <a:p>
+                      <a:r>
+                        <a:rPr lang="en-US" sz="1600" dirty="0">
+                          <a:solidFill>
+                            <a:schemeClr val="bg1">
+                              <a:lumMod val="75000"/>
+                            </a:schemeClr>
+                          </a:solidFill>
+                          <a:latin typeface="Consolas" panose="020B0609020204030204" pitchFamily="49" charset="0"/>
+                          <a:cs typeface="Consolas" panose="020B0609020204030204" pitchFamily="49" charset="0"/>
+                        </a:rPr>
+                        <a:t>    u8 res;</a:t>
+                      </a:r>
+                    </a:p>
+                    <a:p>
+                      <a:r>
+                        <a:rPr lang="en-US" sz="1600" dirty="0">
+                          <a:solidFill>
+                            <a:schemeClr val="bg1">
+                              <a:lumMod val="75000"/>
+                            </a:schemeClr>
+                          </a:solidFill>
+                          <a:latin typeface="Consolas" panose="020B0609020204030204" pitchFamily="49" charset="0"/>
+                          <a:cs typeface="Consolas" panose="020B0609020204030204" pitchFamily="49" charset="0"/>
+                        </a:rPr>
+                        <a:t>};</a:t>
+                      </a:r>
+                      <a:endParaRPr lang="ru-RU" sz="1600" dirty="0">
+                        <a:solidFill>
+                          <a:schemeClr val="bg1">
+                            <a:lumMod val="75000"/>
+                          </a:schemeClr>
+                        </a:solidFill>
+                        <a:latin typeface="Consolas" panose="020B0609020204030204" pitchFamily="49" charset="0"/>
+                        <a:cs typeface="Consolas" panose="020B0609020204030204" pitchFamily="49" charset="0"/>
+                      </a:endParaRPr>
+                    </a:p>
+                    <a:p>
+                      <a:endParaRPr lang="ru-RU" sz="1600" dirty="0">
+                        <a:solidFill>
+                          <a:schemeClr val="bg1">
+                            <a:lumMod val="75000"/>
+                          </a:schemeClr>
+                        </a:solidFill>
+                      </a:endParaRPr>
+                    </a:p>
+                  </a:txBody>
+                  <a:tcPr/>
+                </a:tc>
+                <a:tc>
+                  <a:txBody>
+                    <a:bodyPr/>
+                    <a:lstStyle/>
+                    <a:p>
+                      <a:r>
+                        <a:rPr lang="en-US" sz="1600" dirty="0">
+                          <a:solidFill>
+                            <a:schemeClr val="bg1">
+                              <a:lumMod val="75000"/>
+                            </a:schemeClr>
+                          </a:solidFill>
+                          <a:latin typeface="Consolas" panose="020B0609020204030204" pitchFamily="49" charset="0"/>
+                          <a:cs typeface="Consolas" panose="020B0609020204030204" pitchFamily="49" charset="0"/>
+                        </a:rPr>
+                        <a:t>struct ATTR_NONRESIDENT {</a:t>
+                      </a:r>
+                    </a:p>
+                    <a:p>
+                      <a:r>
+                        <a:rPr lang="en-US" sz="1600" dirty="0">
+                          <a:solidFill>
+                            <a:schemeClr val="bg1">
+                              <a:lumMod val="75000"/>
+                            </a:schemeClr>
+                          </a:solidFill>
+                          <a:latin typeface="Consolas" panose="020B0609020204030204" pitchFamily="49" charset="0"/>
+                          <a:cs typeface="Consolas" panose="020B0609020204030204" pitchFamily="49" charset="0"/>
+                        </a:rPr>
+                        <a:t>    __le64 </a:t>
+                      </a:r>
+                      <a:r>
+                        <a:rPr lang="en-US" sz="1600" dirty="0" err="1">
+                          <a:solidFill>
+                            <a:schemeClr val="bg1">
+                              <a:lumMod val="75000"/>
+                            </a:schemeClr>
+                          </a:solidFill>
+                          <a:latin typeface="Consolas" panose="020B0609020204030204" pitchFamily="49" charset="0"/>
+                          <a:cs typeface="Consolas" panose="020B0609020204030204" pitchFamily="49" charset="0"/>
+                        </a:rPr>
+                        <a:t>svcn</a:t>
+                      </a:r>
+                      <a:r>
+                        <a:rPr lang="en-US" sz="1600" dirty="0">
+                          <a:solidFill>
+                            <a:schemeClr val="bg1">
+                              <a:lumMod val="75000"/>
+                            </a:schemeClr>
+                          </a:solidFill>
+                          <a:latin typeface="Consolas" panose="020B0609020204030204" pitchFamily="49" charset="0"/>
+                          <a:cs typeface="Consolas" panose="020B0609020204030204" pitchFamily="49" charset="0"/>
+                        </a:rPr>
+                        <a:t>;</a:t>
+                      </a:r>
+                    </a:p>
+                    <a:p>
+                      <a:r>
+                        <a:rPr lang="en-US" sz="1600" dirty="0">
+                          <a:solidFill>
+                            <a:schemeClr val="bg1">
+                              <a:lumMod val="75000"/>
+                            </a:schemeClr>
+                          </a:solidFill>
+                          <a:latin typeface="Consolas" panose="020B0609020204030204" pitchFamily="49" charset="0"/>
+                          <a:cs typeface="Consolas" panose="020B0609020204030204" pitchFamily="49" charset="0"/>
+                        </a:rPr>
+                        <a:t>    __le64 </a:t>
+                      </a:r>
+                      <a:r>
+                        <a:rPr lang="en-US" sz="1600" dirty="0" err="1">
+                          <a:solidFill>
+                            <a:schemeClr val="bg1">
+                              <a:lumMod val="75000"/>
+                            </a:schemeClr>
+                          </a:solidFill>
+                          <a:latin typeface="Consolas" panose="020B0609020204030204" pitchFamily="49" charset="0"/>
+                          <a:cs typeface="Consolas" panose="020B0609020204030204" pitchFamily="49" charset="0"/>
+                        </a:rPr>
+                        <a:t>evcn</a:t>
+                      </a:r>
+                      <a:r>
+                        <a:rPr lang="en-US" sz="1600" dirty="0">
+                          <a:solidFill>
+                            <a:schemeClr val="bg1">
+                              <a:lumMod val="75000"/>
+                            </a:schemeClr>
+                          </a:solidFill>
+                          <a:latin typeface="Consolas" panose="020B0609020204030204" pitchFamily="49" charset="0"/>
+                          <a:cs typeface="Consolas" panose="020B0609020204030204" pitchFamily="49" charset="0"/>
+                        </a:rPr>
+                        <a:t>;</a:t>
+                      </a:r>
+                    </a:p>
+                    <a:p>
+                      <a:r>
+                        <a:rPr lang="en-US" sz="1600" dirty="0">
+                          <a:solidFill>
+                            <a:schemeClr val="bg1">
+                              <a:lumMod val="75000"/>
+                            </a:schemeClr>
+                          </a:solidFill>
+                          <a:latin typeface="Consolas" panose="020B0609020204030204" pitchFamily="49" charset="0"/>
+                          <a:cs typeface="Consolas" panose="020B0609020204030204" pitchFamily="49" charset="0"/>
+                        </a:rPr>
+                        <a:t>    __le16 </a:t>
+                      </a:r>
+                      <a:r>
+                        <a:rPr lang="en-US" sz="1600" dirty="0" err="1">
+                          <a:solidFill>
+                            <a:schemeClr val="bg1">
+                              <a:lumMod val="75000"/>
+                            </a:schemeClr>
+                          </a:solidFill>
+                          <a:latin typeface="Consolas" panose="020B0609020204030204" pitchFamily="49" charset="0"/>
+                          <a:cs typeface="Consolas" panose="020B0609020204030204" pitchFamily="49" charset="0"/>
+                        </a:rPr>
+                        <a:t>run_off</a:t>
+                      </a:r>
+                      <a:r>
+                        <a:rPr lang="en-US" sz="1600" dirty="0">
+                          <a:solidFill>
+                            <a:schemeClr val="bg1">
+                              <a:lumMod val="75000"/>
+                            </a:schemeClr>
+                          </a:solidFill>
+                          <a:latin typeface="Consolas" panose="020B0609020204030204" pitchFamily="49" charset="0"/>
+                          <a:cs typeface="Consolas" panose="020B0609020204030204" pitchFamily="49" charset="0"/>
+                        </a:rPr>
+                        <a:t>;</a:t>
+                      </a:r>
+                    </a:p>
+                    <a:p>
+                      <a:r>
+                        <a:rPr lang="en-US" sz="1600" dirty="0">
+                          <a:solidFill>
+                            <a:schemeClr val="bg1">
+                              <a:lumMod val="75000"/>
+                            </a:schemeClr>
+                          </a:solidFill>
+                          <a:latin typeface="Consolas" panose="020B0609020204030204" pitchFamily="49" charset="0"/>
+                          <a:cs typeface="Consolas" panose="020B0609020204030204" pitchFamily="49" charset="0"/>
+                        </a:rPr>
+                        <a:t>    u8 </a:t>
+                      </a:r>
+                      <a:r>
+                        <a:rPr lang="en-US" sz="1600" dirty="0" err="1">
+                          <a:solidFill>
+                            <a:schemeClr val="bg1">
+                              <a:lumMod val="75000"/>
+                            </a:schemeClr>
+                          </a:solidFill>
+                          <a:latin typeface="Consolas" panose="020B0609020204030204" pitchFamily="49" charset="0"/>
+                          <a:cs typeface="Consolas" panose="020B0609020204030204" pitchFamily="49" charset="0"/>
+                        </a:rPr>
+                        <a:t>c_unit</a:t>
+                      </a:r>
+                      <a:r>
+                        <a:rPr lang="en-US" sz="1600" dirty="0">
+                          <a:solidFill>
+                            <a:schemeClr val="bg1">
+                              <a:lumMod val="75000"/>
+                            </a:schemeClr>
+                          </a:solidFill>
+                          <a:latin typeface="Consolas" panose="020B0609020204030204" pitchFamily="49" charset="0"/>
+                          <a:cs typeface="Consolas" panose="020B0609020204030204" pitchFamily="49" charset="0"/>
+                        </a:rPr>
+                        <a:t>;</a:t>
+                      </a:r>
+                    </a:p>
+                    <a:p>
+                      <a:r>
+                        <a:rPr lang="en-US" sz="1600" dirty="0">
+                          <a:solidFill>
+                            <a:schemeClr val="bg1">
+                              <a:lumMod val="75000"/>
+                            </a:schemeClr>
+                          </a:solidFill>
+                          <a:latin typeface="Consolas" panose="020B0609020204030204" pitchFamily="49" charset="0"/>
+                          <a:cs typeface="Consolas" panose="020B0609020204030204" pitchFamily="49" charset="0"/>
+                        </a:rPr>
+                        <a:t>    u8 res1[5];</a:t>
+                      </a:r>
+                    </a:p>
+                    <a:p>
+                      <a:r>
+                        <a:rPr lang="en-US" sz="1600" dirty="0">
+                          <a:solidFill>
+                            <a:schemeClr val="bg1">
+                              <a:lumMod val="75000"/>
+                            </a:schemeClr>
+                          </a:solidFill>
+                          <a:latin typeface="Consolas" panose="020B0609020204030204" pitchFamily="49" charset="0"/>
+                          <a:cs typeface="Consolas" panose="020B0609020204030204" pitchFamily="49" charset="0"/>
+                        </a:rPr>
+                        <a:t>    __le64 </a:t>
+                      </a:r>
+                      <a:r>
+                        <a:rPr lang="en-US" sz="1600" dirty="0" err="1">
+                          <a:solidFill>
+                            <a:schemeClr val="bg1">
+                              <a:lumMod val="75000"/>
+                            </a:schemeClr>
+                          </a:solidFill>
+                          <a:latin typeface="Consolas" panose="020B0609020204030204" pitchFamily="49" charset="0"/>
+                          <a:cs typeface="Consolas" panose="020B0609020204030204" pitchFamily="49" charset="0"/>
+                        </a:rPr>
+                        <a:t>alloc_size</a:t>
+                      </a:r>
+                      <a:r>
+                        <a:rPr lang="en-US" sz="1600" dirty="0">
+                          <a:solidFill>
+                            <a:schemeClr val="bg1">
+                              <a:lumMod val="75000"/>
+                            </a:schemeClr>
+                          </a:solidFill>
+                          <a:latin typeface="Consolas" panose="020B0609020204030204" pitchFamily="49" charset="0"/>
+                          <a:cs typeface="Consolas" panose="020B0609020204030204" pitchFamily="49" charset="0"/>
+                        </a:rPr>
+                        <a:t>;</a:t>
+                      </a:r>
+                    </a:p>
+                    <a:p>
+                      <a:r>
+                        <a:rPr lang="en-US" sz="1600" dirty="0">
+                          <a:solidFill>
+                            <a:schemeClr val="bg1">
+                              <a:lumMod val="75000"/>
+                            </a:schemeClr>
+                          </a:solidFill>
+                          <a:latin typeface="Consolas" panose="020B0609020204030204" pitchFamily="49" charset="0"/>
+                          <a:cs typeface="Consolas" panose="020B0609020204030204" pitchFamily="49" charset="0"/>
+                        </a:rPr>
+                        <a:t>    __le64 </a:t>
+                      </a:r>
+                      <a:r>
+                        <a:rPr lang="en-US" sz="1600" dirty="0" err="1">
+                          <a:solidFill>
+                            <a:schemeClr val="bg1">
+                              <a:lumMod val="75000"/>
+                            </a:schemeClr>
+                          </a:solidFill>
+                          <a:latin typeface="Consolas" panose="020B0609020204030204" pitchFamily="49" charset="0"/>
+                          <a:cs typeface="Consolas" panose="020B0609020204030204" pitchFamily="49" charset="0"/>
+                        </a:rPr>
+                        <a:t>data_size</a:t>
+                      </a:r>
+                      <a:r>
+                        <a:rPr lang="en-US" sz="1600" dirty="0">
+                          <a:solidFill>
+                            <a:schemeClr val="bg1">
+                              <a:lumMod val="75000"/>
+                            </a:schemeClr>
+                          </a:solidFill>
+                          <a:latin typeface="Consolas" panose="020B0609020204030204" pitchFamily="49" charset="0"/>
+                          <a:cs typeface="Consolas" panose="020B0609020204030204" pitchFamily="49" charset="0"/>
+                        </a:rPr>
+                        <a:t>;</a:t>
+                      </a:r>
+                    </a:p>
+                    <a:p>
+                      <a:r>
+                        <a:rPr lang="en-US" sz="1600" dirty="0">
+                          <a:solidFill>
+                            <a:schemeClr val="bg1">
+                              <a:lumMod val="75000"/>
+                            </a:schemeClr>
+                          </a:solidFill>
+                          <a:latin typeface="Consolas" panose="020B0609020204030204" pitchFamily="49" charset="0"/>
+                          <a:cs typeface="Consolas" panose="020B0609020204030204" pitchFamily="49" charset="0"/>
+                        </a:rPr>
+                        <a:t>    __le64 </a:t>
+                      </a:r>
+                      <a:r>
+                        <a:rPr lang="en-US" sz="1600" dirty="0" err="1">
+                          <a:solidFill>
+                            <a:schemeClr val="bg1">
+                              <a:lumMod val="75000"/>
+                            </a:schemeClr>
+                          </a:solidFill>
+                          <a:latin typeface="Consolas" panose="020B0609020204030204" pitchFamily="49" charset="0"/>
+                          <a:cs typeface="Consolas" panose="020B0609020204030204" pitchFamily="49" charset="0"/>
+                        </a:rPr>
+                        <a:t>valid_size</a:t>
+                      </a:r>
+                      <a:r>
+                        <a:rPr lang="en-US" sz="1600" dirty="0">
+                          <a:solidFill>
+                            <a:schemeClr val="bg1">
+                              <a:lumMod val="75000"/>
+                            </a:schemeClr>
+                          </a:solidFill>
+                          <a:latin typeface="Consolas" panose="020B0609020204030204" pitchFamily="49" charset="0"/>
+                          <a:cs typeface="Consolas" panose="020B0609020204030204" pitchFamily="49" charset="0"/>
+                        </a:rPr>
+                        <a:t>;</a:t>
+                      </a:r>
+                    </a:p>
+                    <a:p>
+                      <a:r>
+                        <a:rPr lang="en-US" sz="1600" dirty="0">
+                          <a:solidFill>
+                            <a:schemeClr val="bg1">
+                              <a:lumMod val="75000"/>
+                            </a:schemeClr>
+                          </a:solidFill>
+                          <a:latin typeface="Consolas" panose="020B0609020204030204" pitchFamily="49" charset="0"/>
+                          <a:cs typeface="Consolas" panose="020B0609020204030204" pitchFamily="49" charset="0"/>
+                        </a:rPr>
+                        <a:t>    __le64 </a:t>
+                      </a:r>
+                      <a:r>
+                        <a:rPr lang="en-US" sz="1600" dirty="0" err="1">
+                          <a:solidFill>
+                            <a:schemeClr val="bg1">
+                              <a:lumMod val="75000"/>
+                            </a:schemeClr>
+                          </a:solidFill>
+                          <a:latin typeface="Consolas" panose="020B0609020204030204" pitchFamily="49" charset="0"/>
+                          <a:cs typeface="Consolas" panose="020B0609020204030204" pitchFamily="49" charset="0"/>
+                        </a:rPr>
+                        <a:t>total_size</a:t>
+                      </a:r>
+                      <a:r>
+                        <a:rPr lang="en-US" sz="1600" dirty="0">
+                          <a:solidFill>
+                            <a:schemeClr val="bg1">
+                              <a:lumMod val="75000"/>
+                            </a:schemeClr>
+                          </a:solidFill>
+                          <a:latin typeface="Consolas" panose="020B0609020204030204" pitchFamily="49" charset="0"/>
+                          <a:cs typeface="Consolas" panose="020B0609020204030204" pitchFamily="49" charset="0"/>
+                        </a:rPr>
+                        <a:t>;</a:t>
+                      </a:r>
+                    </a:p>
+                    <a:p>
+                      <a:r>
+                        <a:rPr lang="en-US" sz="1600" dirty="0">
+                          <a:solidFill>
+                            <a:schemeClr val="bg1">
+                              <a:lumMod val="75000"/>
+                            </a:schemeClr>
+                          </a:solidFill>
+                          <a:latin typeface="Consolas" panose="020B0609020204030204" pitchFamily="49" charset="0"/>
+                          <a:cs typeface="Consolas" panose="020B0609020204030204" pitchFamily="49" charset="0"/>
+                        </a:rPr>
+                        <a:t>};</a:t>
+                      </a:r>
+                      <a:endParaRPr lang="ru-RU" sz="1600" dirty="0">
+                        <a:solidFill>
+                          <a:schemeClr val="bg1">
+                            <a:lumMod val="75000"/>
+                          </a:schemeClr>
+                        </a:solidFill>
+                      </a:endParaRPr>
+                    </a:p>
+                    <a:p>
+                      <a:endParaRPr lang="ru-RU" sz="1600" dirty="0">
+                        <a:solidFill>
+                          <a:schemeClr val="bg1">
+                            <a:lumMod val="75000"/>
+                          </a:schemeClr>
+                        </a:solidFill>
+                        <a:latin typeface="Consolas" panose="020B0609020204030204" pitchFamily="49" charset="0"/>
+                        <a:cs typeface="Consolas" panose="020B0609020204030204" pitchFamily="49" charset="0"/>
+                      </a:endParaRPr>
+                    </a:p>
+                  </a:txBody>
+                  <a:tcPr/>
+                </a:tc>
+                <a:extLst>
+                  <a:ext uri="{0D108BD9-81ED-4DB2-BD59-A6C34878D82A}">
+                    <a16:rowId xmlns:a16="http://schemas.microsoft.com/office/drawing/2014/main" val="875555429"/>
+                  </a:ext>
+                </a:extLst>
+              </a:tr>
+              <a:tr h="0">
+                <a:tc gridSpan="3">
+                  <a:txBody>
+                    <a:bodyPr/>
+                    <a:lstStyle/>
+                    <a:p>
+                      <a:pPr marL="0" marR="0" lvl="0" indent="0" algn="l" defTabSz="914400" rtl="0" eaLnBrk="1" fontAlgn="auto" latinLnBrk="0" hangingPunct="1">
+                        <a:lnSpc>
+                          <a:spcPct val="100000"/>
+                        </a:lnSpc>
+                        <a:spcBef>
+                          <a:spcPts val="0"/>
+                        </a:spcBef>
+                        <a:spcAft>
+                          <a:spcPts val="0"/>
+                        </a:spcAft>
+                        <a:buClrTx/>
+                        <a:buSzTx/>
+                        <a:buFontTx/>
+                        <a:buNone/>
+                        <a:tabLst/>
+                        <a:defRPr/>
+                      </a:pPr>
+                      <a:r>
+                        <a:rPr lang="en-US" sz="1800" dirty="0"/>
+                        <a:t>If an attribute value is very big and fragmented, it needs many entries in the </a:t>
+                      </a:r>
+                      <a:r>
+                        <a:rPr lang="en-US" sz="1800" dirty="0" err="1"/>
+                        <a:t>runlist</a:t>
+                      </a:r>
+                      <a:r>
+                        <a:rPr lang="en-US" sz="1800" dirty="0"/>
+                        <a:t>. How do we handle long </a:t>
+                      </a:r>
+                      <a:r>
+                        <a:rPr lang="en-US" sz="1800" dirty="0" err="1"/>
+                        <a:t>runlists</a:t>
+                      </a:r>
+                      <a:r>
+                        <a:rPr lang="en-US" sz="1800" dirty="0"/>
+                        <a:t> that can’t fit into an MFT entry?</a:t>
+                      </a:r>
+                    </a:p>
+                  </a:txBody>
+                  <a:tcPr/>
+                </a:tc>
+                <a:tc hMerge="1">
+                  <a:txBody>
+                    <a:bodyPr/>
+                    <a:lstStyle/>
+                    <a:p>
+                      <a:pPr marL="0" marR="0" lvl="0" indent="0" algn="l" defTabSz="914400" rtl="0" eaLnBrk="1" fontAlgn="auto" latinLnBrk="0" hangingPunct="1">
+                        <a:lnSpc>
+                          <a:spcPct val="100000"/>
+                        </a:lnSpc>
+                        <a:spcBef>
+                          <a:spcPts val="0"/>
+                        </a:spcBef>
+                        <a:spcAft>
+                          <a:spcPts val="0"/>
+                        </a:spcAft>
+                        <a:buClrTx/>
+                        <a:buSzTx/>
+                        <a:buFontTx/>
+                        <a:buNone/>
+                        <a:tabLst/>
+                        <a:defRPr/>
+                      </a:pPr>
+                      <a:endParaRPr lang="en-US" sz="1800" dirty="0"/>
+                    </a:p>
+                  </a:txBody>
+                  <a:tcPr/>
+                </a:tc>
+                <a:tc hMerge="1">
+                  <a:txBody>
+                    <a:bodyPr/>
+                    <a:lstStyle/>
+                    <a:p>
+                      <a:pPr marL="0" marR="0" lvl="0" indent="0" algn="l" defTabSz="914400" rtl="0" eaLnBrk="1" fontAlgn="auto" latinLnBrk="0" hangingPunct="1">
+                        <a:lnSpc>
+                          <a:spcPct val="100000"/>
+                        </a:lnSpc>
+                        <a:spcBef>
+                          <a:spcPts val="0"/>
+                        </a:spcBef>
+                        <a:spcAft>
+                          <a:spcPts val="0"/>
+                        </a:spcAft>
+                        <a:buClrTx/>
+                        <a:buSzTx/>
+                        <a:buFontTx/>
+                        <a:buNone/>
+                        <a:tabLst/>
+                        <a:defRPr/>
+                      </a:pPr>
+                      <a:endParaRPr lang="en-RU" sz="1800" dirty="0"/>
+                    </a:p>
+                  </a:txBody>
+                  <a:tcPr/>
+                </a:tc>
+                <a:extLst>
+                  <a:ext uri="{0D108BD9-81ED-4DB2-BD59-A6C34878D82A}">
+                    <a16:rowId xmlns:a16="http://schemas.microsoft.com/office/drawing/2014/main" val="4266673213"/>
+                  </a:ext>
+                </a:extLst>
+              </a:tr>
+            </a:tbl>
+          </a:graphicData>
+        </a:graphic>
+      </p:graphicFrame>
+      <p:graphicFrame>
+        <p:nvGraphicFramePr>
+          <p:cNvPr id="10" name="Table 9">
+            <a:extLst>
+              <a:ext uri="{FF2B5EF4-FFF2-40B4-BE49-F238E27FC236}">
+                <a16:creationId xmlns:a16="http://schemas.microsoft.com/office/drawing/2014/main" id="{5534374F-66F5-85D6-F084-4A5BD68D6352}"/>
+              </a:ext>
+            </a:extLst>
+          </p:cNvPr>
+          <p:cNvGraphicFramePr>
+            <a:graphicFrameLocks noGrp="1"/>
+          </p:cNvGraphicFramePr>
+          <p:nvPr/>
+        </p:nvGraphicFramePr>
+        <p:xfrm>
+          <a:off x="1603963" y="945877"/>
+          <a:ext cx="8984073" cy="365760"/>
+        </p:xfrm>
+        <a:graphic>
+          <a:graphicData uri="http://schemas.openxmlformats.org/drawingml/2006/table">
+            <a:tbl>
+              <a:tblPr firstRow="1" bandRow="1">
+                <a:tableStyleId>{5940675A-B579-460E-94D1-54222C63F5DA}</a:tableStyleId>
+              </a:tblPr>
+              <a:tblGrid>
+                <a:gridCol w="1614445">
+                  <a:extLst>
+                    <a:ext uri="{9D8B030D-6E8A-4147-A177-3AD203B41FA5}">
+                      <a16:colId xmlns:a16="http://schemas.microsoft.com/office/drawing/2014/main" val="20000"/>
+                    </a:ext>
+                  </a:extLst>
+                </a:gridCol>
+                <a:gridCol w="2231571">
+                  <a:extLst>
+                    <a:ext uri="{9D8B030D-6E8A-4147-A177-3AD203B41FA5}">
+                      <a16:colId xmlns:a16="http://schemas.microsoft.com/office/drawing/2014/main" val="20001"/>
+                    </a:ext>
+                  </a:extLst>
+                </a:gridCol>
+                <a:gridCol w="5138057">
+                  <a:extLst>
+                    <a:ext uri="{9D8B030D-6E8A-4147-A177-3AD203B41FA5}">
+                      <a16:colId xmlns:a16="http://schemas.microsoft.com/office/drawing/2014/main" val="1291804775"/>
+                    </a:ext>
+                  </a:extLst>
+                </a:gridCol>
+              </a:tblGrid>
+              <a:tr h="365760">
+                <a:tc>
+                  <a:txBody>
+                    <a:bodyPr/>
+                    <a:lstStyle/>
+                    <a:p>
+                      <a:r>
+                        <a:rPr lang="en-US" dirty="0"/>
+                        <a:t>ATTR header</a:t>
+                      </a:r>
+                    </a:p>
+                  </a:txBody>
+                  <a:tcPr/>
+                </a:tc>
+                <a:tc>
+                  <a:txBody>
+                    <a:bodyPr/>
+                    <a:lstStyle/>
+                    <a:p>
+                      <a:r>
+                        <a:rPr lang="en-US" dirty="0"/>
+                        <a:t>Attribute name</a:t>
+                      </a:r>
+                    </a:p>
+                  </a:txBody>
+                  <a:tcPr/>
+                </a:tc>
+                <a:tc>
+                  <a:txBody>
+                    <a:bodyPr/>
+                    <a:lstStyle/>
+                    <a:p>
+                      <a:r>
+                        <a:rPr lang="en-US" dirty="0"/>
+                        <a:t>Resident attribute value or a</a:t>
+                      </a:r>
+                      <a:r>
+                        <a:rPr lang="ru-RU" dirty="0"/>
+                        <a:t> </a:t>
+                      </a:r>
+                      <a:r>
+                        <a:rPr lang="en-US" dirty="0" err="1"/>
+                        <a:t>runlist</a:t>
+                      </a:r>
+                      <a:endParaRPr lang="en-US" dirty="0"/>
+                    </a:p>
+                  </a:txBody>
+                  <a:tcPr/>
+                </a:tc>
+                <a:extLst>
+                  <a:ext uri="{0D108BD9-81ED-4DB2-BD59-A6C34878D82A}">
+                    <a16:rowId xmlns:a16="http://schemas.microsoft.com/office/drawing/2014/main" val="10000"/>
+                  </a:ext>
+                </a:extLst>
+              </a:tr>
+            </a:tbl>
+          </a:graphicData>
+        </a:graphic>
+      </p:graphicFrame>
+    </p:spTree>
+    <p:extLst>
+      <p:ext uri="{BB962C8B-B14F-4D97-AF65-F5344CB8AC3E}">
+        <p14:creationId xmlns:p14="http://schemas.microsoft.com/office/powerpoint/2010/main" val="805691301"/>
+      </p:ext>
+    </p:extLst>
+  </p:cSld>
+  <p:clrMapOvr>
+    <a:overrideClrMapping bg1="lt1" tx1="dk1" bg2="lt2" tx2="dk2" accent1="accent1" accent2="accent2" accent3="accent3" accent4="accent4" accent5="accent5" accent6="accent6" hlink="hlink" folHlink="folHlink"/>
+  </p:clrMapOvr>
+</p:sld>
+</file>
+
+<file path=ppt/slides/slide15.xml><?xml version="1.0" encoding="utf-8"?>
+<p:sld xmlns:a="http://schemas.openxmlformats.org/drawingml/2006/main" xmlns:r="http://schemas.openxmlformats.org/officeDocument/2006/relationships" xmlns:p="http://schemas.openxmlformats.org/presentationml/2006/main">
+  <p:cSld>
+    <p:bg>
+      <p:bgRef idx="1001">
+        <a:schemeClr val="bg1"/>
+      </p:bgRef>
+    </p:bg>
+    <p:spTree>
+      <p:nvGrpSpPr>
         <p:cNvPr id="1" name=""/>
         <p:cNvGrpSpPr/>
         <p:nvPr/>
@@ -12040,7 +13571,7 @@
 </p:sld>
 </file>
 
-<file path=ppt/slides/slide15.xml><?xml version="1.0" encoding="utf-8"?>
+<file path=ppt/slides/slide16.xml><?xml version="1.0" encoding="utf-8"?>
 <p:sld xmlns:a="http://schemas.openxmlformats.org/drawingml/2006/main" xmlns:r="http://schemas.openxmlformats.org/officeDocument/2006/relationships" xmlns:p="http://schemas.openxmlformats.org/presentationml/2006/main">
   <p:cSld>
     <p:bg>
@@ -12886,7 +14417,7 @@
 </p:sld>
 </file>
 
-<file path=ppt/slides/slide16.xml><?xml version="1.0" encoding="utf-8"?>
+<file path=ppt/slides/slide17.xml><?xml version="1.0" encoding="utf-8"?>
 <p:sld xmlns:a="http://schemas.openxmlformats.org/drawingml/2006/main" xmlns:r="http://schemas.openxmlformats.org/officeDocument/2006/relationships" xmlns:p="http://schemas.openxmlformats.org/presentationml/2006/main">
   <p:cSld>
     <p:bg>
@@ -13388,7 +14919,7 @@
 </p:sld>
 </file>
 
-<file path=ppt/slides/slide17.xml><?xml version="1.0" encoding="utf-8"?>
+<file path=ppt/slides/slide18.xml><?xml version="1.0" encoding="utf-8"?>
 <p:sld xmlns:a="http://schemas.openxmlformats.org/drawingml/2006/main" xmlns:r="http://schemas.openxmlformats.org/officeDocument/2006/relationships" xmlns:p="http://schemas.openxmlformats.org/presentationml/2006/main">
   <p:cSld>
     <p:bg>
@@ -13949,7 +15480,7 @@
 </p:sld>
 </file>
 
-<file path=ppt/slides/slide18.xml><?xml version="1.0" encoding="utf-8"?>
+<file path=ppt/slides/slide19.xml><?xml version="1.0" encoding="utf-8"?>
 <p:sld xmlns:a="http://schemas.openxmlformats.org/drawingml/2006/main" xmlns:r="http://schemas.openxmlformats.org/officeDocument/2006/relationships" xmlns:p="http://schemas.openxmlformats.org/presentationml/2006/main">
   <p:cSld>
     <p:bg>
@@ -14436,381 +15967,6 @@
     <p:extLst>
       <p:ext uri="{BB962C8B-B14F-4D97-AF65-F5344CB8AC3E}">
         <p14:creationId xmlns:p14="http://schemas.microsoft.com/office/powerpoint/2010/main" val="311315443"/>
-      </p:ext>
-    </p:extLst>
-  </p:cSld>
-  <p:clrMapOvr>
-    <a:overrideClrMapping bg1="lt1" tx1="dk1" bg2="lt2" tx2="dk2" accent1="accent1" accent2="accent2" accent3="accent3" accent4="accent4" accent5="accent5" accent6="accent6" hlink="hlink" folHlink="folHlink"/>
-  </p:clrMapOvr>
-</p:sld>
-</file>
-
-<file path=ppt/slides/slide19.xml><?xml version="1.0" encoding="utf-8"?>
-<p:sld xmlns:a="http://schemas.openxmlformats.org/drawingml/2006/main" xmlns:r="http://schemas.openxmlformats.org/officeDocument/2006/relationships" xmlns:p="http://schemas.openxmlformats.org/presentationml/2006/main">
-  <p:cSld>
-    <p:bg>
-      <p:bgRef idx="1001">
-        <a:schemeClr val="bg1"/>
-      </p:bgRef>
-    </p:bg>
-    <p:spTree>
-      <p:nvGrpSpPr>
-        <p:cNvPr id="1" name="">
-          <a:extLst>
-            <a:ext uri="{FF2B5EF4-FFF2-40B4-BE49-F238E27FC236}">
-              <a16:creationId xmlns:a16="http://schemas.microsoft.com/office/drawing/2014/main" id="{C2D4F9FE-3C02-0CBF-F451-BC19639A80BA}"/>
-            </a:ext>
-          </a:extLst>
-        </p:cNvPr>
-        <p:cNvGrpSpPr/>
-        <p:nvPr/>
-      </p:nvGrpSpPr>
-      <p:grpSpPr>
-        <a:xfrm>
-          <a:off x="0" y="0"/>
-          <a:ext cx="0" cy="0"/>
-          <a:chOff x="0" y="0"/>
-          <a:chExt cx="0" cy="0"/>
-        </a:xfrm>
-      </p:grpSpPr>
-      <p:graphicFrame>
-        <p:nvGraphicFramePr>
-          <p:cNvPr id="5" name="Table 4">
-            <a:extLst>
-              <a:ext uri="{FF2B5EF4-FFF2-40B4-BE49-F238E27FC236}">
-                <a16:creationId xmlns:a16="http://schemas.microsoft.com/office/drawing/2014/main" id="{EAAD05C7-2749-3827-2A6A-DAFFF53BC607}"/>
-              </a:ext>
-            </a:extLst>
-          </p:cNvPr>
-          <p:cNvGraphicFramePr>
-            <a:graphicFrameLocks noGrp="1"/>
-          </p:cNvGraphicFramePr>
-          <p:nvPr/>
-        </p:nvGraphicFramePr>
-        <p:xfrm>
-          <a:off x="0" y="1"/>
-          <a:ext cx="12192000" cy="365760"/>
-        </p:xfrm>
-        <a:graphic>
-          <a:graphicData uri="http://schemas.openxmlformats.org/drawingml/2006/table">
-            <a:tbl>
-              <a:tblPr firstRow="1" bandRow="1">
-                <a:tableStyleId>{5C22544A-7EE6-4342-B048-85BDC9FD1C3A}</a:tableStyleId>
-              </a:tblPr>
-              <a:tblGrid>
-                <a:gridCol w="12192000">
-                  <a:extLst>
-                    <a:ext uri="{9D8B030D-6E8A-4147-A177-3AD203B41FA5}">
-                      <a16:colId xmlns:a16="http://schemas.microsoft.com/office/drawing/2014/main" val="20000"/>
-                    </a:ext>
-                  </a:extLst>
-                </a:gridCol>
-              </a:tblGrid>
-              <a:tr h="321276">
-                <a:tc>
-                  <a:txBody>
-                    <a:bodyPr/>
-                    <a:lstStyle/>
-                    <a:p>
-                      <a:r>
-                        <a:rPr lang="en-US" sz="1800" dirty="0"/>
-                        <a:t>The basics of file systems</a:t>
-                      </a:r>
-                      <a:endParaRPr lang="ru-RU" dirty="0"/>
-                    </a:p>
-                  </a:txBody>
-                  <a:tcPr/>
-                </a:tc>
-                <a:extLst>
-                  <a:ext uri="{0D108BD9-81ED-4DB2-BD59-A6C34878D82A}">
-                    <a16:rowId xmlns:a16="http://schemas.microsoft.com/office/drawing/2014/main" val="10000"/>
-                  </a:ext>
-                </a:extLst>
-              </a:tr>
-            </a:tbl>
-          </a:graphicData>
-        </a:graphic>
-      </p:graphicFrame>
-      <p:graphicFrame>
-        <p:nvGraphicFramePr>
-          <p:cNvPr id="6" name="Table 5">
-            <a:extLst>
-              <a:ext uri="{FF2B5EF4-FFF2-40B4-BE49-F238E27FC236}">
-                <a16:creationId xmlns:a16="http://schemas.microsoft.com/office/drawing/2014/main" id="{C892C368-3FA6-A67E-F70F-B9576A0AC80B}"/>
-              </a:ext>
-            </a:extLst>
-          </p:cNvPr>
-          <p:cNvGraphicFramePr>
-            <a:graphicFrameLocks noGrp="1"/>
-          </p:cNvGraphicFramePr>
-          <p:nvPr/>
-        </p:nvGraphicFramePr>
-        <p:xfrm>
-          <a:off x="0" y="6532604"/>
-          <a:ext cx="12192000" cy="365760"/>
-        </p:xfrm>
-        <a:graphic>
-          <a:graphicData uri="http://schemas.openxmlformats.org/drawingml/2006/table">
-            <a:tbl>
-              <a:tblPr firstRow="1" bandRow="1">
-                <a:tableStyleId>{5C22544A-7EE6-4342-B048-85BDC9FD1C3A}</a:tableStyleId>
-              </a:tblPr>
-              <a:tblGrid>
-                <a:gridCol w="12192000">
-                  <a:extLst>
-                    <a:ext uri="{9D8B030D-6E8A-4147-A177-3AD203B41FA5}">
-                      <a16:colId xmlns:a16="http://schemas.microsoft.com/office/drawing/2014/main" val="20000"/>
-                    </a:ext>
-                  </a:extLst>
-                </a:gridCol>
-              </a:tblGrid>
-              <a:tr h="308094">
-                <a:tc>
-                  <a:txBody>
-                    <a:bodyPr/>
-                    <a:lstStyle/>
-                    <a:p>
-                      <a:endParaRPr lang="ru-RU" dirty="0"/>
-                    </a:p>
-                  </a:txBody>
-                  <a:tcPr/>
-                </a:tc>
-                <a:extLst>
-                  <a:ext uri="{0D108BD9-81ED-4DB2-BD59-A6C34878D82A}">
-                    <a16:rowId xmlns:a16="http://schemas.microsoft.com/office/drawing/2014/main" val="10000"/>
-                  </a:ext>
-                </a:extLst>
-              </a:tr>
-            </a:tbl>
-          </a:graphicData>
-        </a:graphic>
-      </p:graphicFrame>
-      <p:graphicFrame>
-        <p:nvGraphicFramePr>
-          <p:cNvPr id="2" name="Table 1">
-            <a:extLst>
-              <a:ext uri="{FF2B5EF4-FFF2-40B4-BE49-F238E27FC236}">
-                <a16:creationId xmlns:a16="http://schemas.microsoft.com/office/drawing/2014/main" id="{8DD77CFF-4918-3675-54C9-226D893F4FC5}"/>
-              </a:ext>
-            </a:extLst>
-          </p:cNvPr>
-          <p:cNvGraphicFramePr>
-            <a:graphicFrameLocks noGrp="1"/>
-          </p:cNvGraphicFramePr>
-          <p:nvPr>
-            <p:extLst>
-              <p:ext uri="{D42A27DB-BD31-4B8C-83A1-F6EECF244321}">
-                <p14:modId xmlns:p14="http://schemas.microsoft.com/office/powerpoint/2010/main" val="747183098"/>
-              </p:ext>
-            </p:extLst>
-          </p:nvPr>
-        </p:nvGraphicFramePr>
-        <p:xfrm>
-          <a:off x="0" y="365762"/>
-          <a:ext cx="12192000" cy="2468880"/>
-        </p:xfrm>
-        <a:graphic>
-          <a:graphicData uri="http://schemas.openxmlformats.org/drawingml/2006/table">
-            <a:tbl>
-              <a:tblPr firstRow="1" bandRow="1">
-                <a:tableStyleId>{3B4B98B0-60AC-42C2-AFA5-B58CD77FA1E5}</a:tableStyleId>
-              </a:tblPr>
-              <a:tblGrid>
-                <a:gridCol w="3657600">
-                  <a:extLst>
-                    <a:ext uri="{9D8B030D-6E8A-4147-A177-3AD203B41FA5}">
-                      <a16:colId xmlns:a16="http://schemas.microsoft.com/office/drawing/2014/main" val="20000"/>
-                    </a:ext>
-                  </a:extLst>
-                </a:gridCol>
-                <a:gridCol w="8534400">
-                  <a:extLst>
-                    <a:ext uri="{9D8B030D-6E8A-4147-A177-3AD203B41FA5}">
-                      <a16:colId xmlns:a16="http://schemas.microsoft.com/office/drawing/2014/main" val="2857868636"/>
-                    </a:ext>
-                  </a:extLst>
-                </a:gridCol>
-              </a:tblGrid>
-              <a:tr h="455826">
-                <a:tc gridSpan="2">
-                  <a:txBody>
-                    <a:bodyPr/>
-                    <a:lstStyle/>
-                    <a:p>
-                      <a:r>
-                        <a:rPr lang="en-US" sz="2400" dirty="0"/>
-                        <a:t>Attributes of regular files</a:t>
-                      </a:r>
-                      <a:endParaRPr lang="ru-RU" sz="2400" dirty="0"/>
-                    </a:p>
-                  </a:txBody>
-                  <a:tcPr/>
-                </a:tc>
-                <a:tc hMerge="1">
-                  <a:txBody>
-                    <a:bodyPr/>
-                    <a:lstStyle/>
-                    <a:p>
-                      <a:endParaRPr lang="en-RU"/>
-                    </a:p>
-                  </a:txBody>
-                  <a:tcPr/>
-                </a:tc>
-                <a:extLst>
-                  <a:ext uri="{0D108BD9-81ED-4DB2-BD59-A6C34878D82A}">
-                    <a16:rowId xmlns:a16="http://schemas.microsoft.com/office/drawing/2014/main" val="10000"/>
-                  </a:ext>
-                </a:extLst>
-              </a:tr>
-              <a:tr h="455826">
-                <a:tc>
-                  <a:txBody>
-                    <a:bodyPr/>
-                    <a:lstStyle/>
-                    <a:p>
-                      <a:pPr marL="285750" indent="-285750">
-                        <a:buFont typeface="Arial" panose="020B0604020202020204" pitchFamily="34" charset="0"/>
-                        <a:buChar char="•"/>
-                      </a:pPr>
-                      <a:r>
-                        <a:rPr lang="en-US" sz="1800" dirty="0"/>
-                        <a:t>$STANDARD_INFORMATION,</a:t>
-                      </a:r>
-                    </a:p>
-                    <a:p>
-                      <a:pPr marL="285750" indent="-285750">
-                        <a:buFont typeface="Arial" panose="020B0604020202020204" pitchFamily="34" charset="0"/>
-                        <a:buChar char="•"/>
-                      </a:pPr>
-                      <a:r>
-                        <a:rPr lang="en-US" sz="1800" dirty="0"/>
-                        <a:t>$FILE_NAME,</a:t>
-                      </a:r>
-                    </a:p>
-                    <a:p>
-                      <a:pPr marL="285750" indent="-285750">
-                        <a:buFont typeface="Arial" panose="020B0604020202020204" pitchFamily="34" charset="0"/>
-                        <a:buChar char="•"/>
-                      </a:pPr>
-                      <a:r>
-                        <a:rPr lang="en-US" sz="1800" b="0" dirty="0"/>
-                        <a:t>$OBJECT_ID,</a:t>
-                      </a:r>
-                    </a:p>
-                    <a:p>
-                      <a:pPr marL="285750" indent="-285750">
-                        <a:buFont typeface="Arial" panose="020B0604020202020204" pitchFamily="34" charset="0"/>
-                        <a:buChar char="•"/>
-                      </a:pPr>
-                      <a:r>
-                        <a:rPr lang="en-US" sz="1800" dirty="0"/>
-                        <a:t>$SECURITY_DESCRITPOR,</a:t>
-                      </a:r>
-                    </a:p>
-                    <a:p>
-                      <a:pPr marL="285750" indent="-285750">
-                        <a:buFont typeface="Arial" panose="020B0604020202020204" pitchFamily="34" charset="0"/>
-                        <a:buChar char="•"/>
-                      </a:pPr>
-                      <a:r>
-                        <a:rPr lang="en-US" sz="1800" b="1" dirty="0"/>
-                        <a:t>$DATA,</a:t>
-                      </a:r>
-                    </a:p>
-                    <a:p>
-                      <a:pPr marL="285750" indent="-285750">
-                        <a:buFont typeface="Arial" panose="020B0604020202020204" pitchFamily="34" charset="0"/>
-                        <a:buChar char="•"/>
-                      </a:pPr>
-                      <a:r>
-                        <a:rPr lang="en-US" sz="1800" dirty="0"/>
-                        <a:t>$EA_INFORMATION,</a:t>
-                      </a:r>
-                    </a:p>
-                    <a:p>
-                      <a:pPr marL="285750" indent="-285750">
-                        <a:buFont typeface="Arial" panose="020B0604020202020204" pitchFamily="34" charset="0"/>
-                        <a:buChar char="•"/>
-                      </a:pPr>
-                      <a:r>
-                        <a:rPr lang="en-US" sz="1800" dirty="0"/>
-                        <a:t>$EA.</a:t>
-                      </a:r>
-                    </a:p>
-                  </a:txBody>
-                  <a:tcPr/>
-                </a:tc>
-                <a:tc>
-                  <a:txBody>
-                    <a:bodyPr/>
-                    <a:lstStyle/>
-                    <a:p>
-                      <a:pPr marL="0" indent="0">
-                        <a:buFont typeface="Arial" panose="020B0604020202020204" pitchFamily="34" charset="0"/>
-                        <a:buNone/>
-                      </a:pPr>
-                      <a:r>
-                        <a:rPr lang="en-US" sz="1600" dirty="0">
-                          <a:latin typeface="+mn-lt"/>
-                          <a:cs typeface="Consolas" panose="020B0609020204030204" pitchFamily="49" charset="0"/>
-                        </a:rPr>
-                        <a:t>This attribute holds the content of the file.</a:t>
-                      </a:r>
-                    </a:p>
-                    <a:p>
-                      <a:pPr marL="0" indent="0">
-                        <a:buFont typeface="Arial" panose="020B0604020202020204" pitchFamily="34" charset="0"/>
-                        <a:buNone/>
-                      </a:pPr>
-                      <a:endParaRPr lang="en-US" sz="1600" dirty="0">
-                        <a:latin typeface="+mn-lt"/>
-                        <a:cs typeface="Consolas" panose="020B0609020204030204" pitchFamily="49" charset="0"/>
-                      </a:endParaRPr>
-                    </a:p>
-                    <a:p>
-                      <a:pPr marL="0" indent="0">
-                        <a:buFont typeface="Arial" panose="020B0604020202020204" pitchFamily="34" charset="0"/>
-                        <a:buNone/>
-                      </a:pPr>
-                      <a:r>
-                        <a:rPr lang="en-US" sz="1600" dirty="0">
-                          <a:latin typeface="+mn-lt"/>
-                          <a:cs typeface="Consolas" panose="020B0609020204030204" pitchFamily="49" charset="0"/>
-                        </a:rPr>
-                        <a:t>There is an important difference from POSIX file systems. There may be multiple attributes </a:t>
-                      </a:r>
-                      <a:r>
-                        <a:rPr lang="en-US" sz="1600" dirty="0">
-                          <a:latin typeface="Consolas" panose="020B0609020204030204" pitchFamily="49" charset="0"/>
-                          <a:cs typeface="Consolas" panose="020B0609020204030204" pitchFamily="49" charset="0"/>
-                        </a:rPr>
-                        <a:t>$DATA</a:t>
-                      </a:r>
-                      <a:r>
-                        <a:rPr lang="en-US" sz="1600" dirty="0">
-                          <a:latin typeface="+mn-lt"/>
-                          <a:cs typeface="Consolas" panose="020B0609020204030204" pitchFamily="49" charset="0"/>
-                        </a:rPr>
-                        <a:t> in a file. The unnamed one holds the file content in the POSIX sense. Named attributes are typically used as extended attributes.</a:t>
-                      </a:r>
-                    </a:p>
-                  </a:txBody>
-                  <a:tcPr/>
-                </a:tc>
-                <a:extLst>
-                  <a:ext uri="{0D108BD9-81ED-4DB2-BD59-A6C34878D82A}">
-                    <a16:rowId xmlns:a16="http://schemas.microsoft.com/office/drawing/2014/main" val="1246859325"/>
-                  </a:ext>
-                </a:extLst>
-              </a:tr>
-            </a:tbl>
-          </a:graphicData>
-        </a:graphic>
-      </p:graphicFrame>
-    </p:spTree>
-    <p:extLst>
-      <p:ext uri="{BB962C8B-B14F-4D97-AF65-F5344CB8AC3E}">
-        <p14:creationId xmlns:p14="http://schemas.microsoft.com/office/powerpoint/2010/main" val="2283017708"/>
       </p:ext>
     </p:extLst>
   </p:cSld>
@@ -15349,6 +16505,381 @@
     </p:bg>
     <p:spTree>
       <p:nvGrpSpPr>
+        <p:cNvPr id="1" name="">
+          <a:extLst>
+            <a:ext uri="{FF2B5EF4-FFF2-40B4-BE49-F238E27FC236}">
+              <a16:creationId xmlns:a16="http://schemas.microsoft.com/office/drawing/2014/main" id="{C2D4F9FE-3C02-0CBF-F451-BC19639A80BA}"/>
+            </a:ext>
+          </a:extLst>
+        </p:cNvPr>
+        <p:cNvGrpSpPr/>
+        <p:nvPr/>
+      </p:nvGrpSpPr>
+      <p:grpSpPr>
+        <a:xfrm>
+          <a:off x="0" y="0"/>
+          <a:ext cx="0" cy="0"/>
+          <a:chOff x="0" y="0"/>
+          <a:chExt cx="0" cy="0"/>
+        </a:xfrm>
+      </p:grpSpPr>
+      <p:graphicFrame>
+        <p:nvGraphicFramePr>
+          <p:cNvPr id="5" name="Table 4">
+            <a:extLst>
+              <a:ext uri="{FF2B5EF4-FFF2-40B4-BE49-F238E27FC236}">
+                <a16:creationId xmlns:a16="http://schemas.microsoft.com/office/drawing/2014/main" id="{EAAD05C7-2749-3827-2A6A-DAFFF53BC607}"/>
+              </a:ext>
+            </a:extLst>
+          </p:cNvPr>
+          <p:cNvGraphicFramePr>
+            <a:graphicFrameLocks noGrp="1"/>
+          </p:cNvGraphicFramePr>
+          <p:nvPr/>
+        </p:nvGraphicFramePr>
+        <p:xfrm>
+          <a:off x="0" y="1"/>
+          <a:ext cx="12192000" cy="365760"/>
+        </p:xfrm>
+        <a:graphic>
+          <a:graphicData uri="http://schemas.openxmlformats.org/drawingml/2006/table">
+            <a:tbl>
+              <a:tblPr firstRow="1" bandRow="1">
+                <a:tableStyleId>{5C22544A-7EE6-4342-B048-85BDC9FD1C3A}</a:tableStyleId>
+              </a:tblPr>
+              <a:tblGrid>
+                <a:gridCol w="12192000">
+                  <a:extLst>
+                    <a:ext uri="{9D8B030D-6E8A-4147-A177-3AD203B41FA5}">
+                      <a16:colId xmlns:a16="http://schemas.microsoft.com/office/drawing/2014/main" val="20000"/>
+                    </a:ext>
+                  </a:extLst>
+                </a:gridCol>
+              </a:tblGrid>
+              <a:tr h="321276">
+                <a:tc>
+                  <a:txBody>
+                    <a:bodyPr/>
+                    <a:lstStyle/>
+                    <a:p>
+                      <a:r>
+                        <a:rPr lang="en-US" sz="1800" dirty="0"/>
+                        <a:t>The basics of file systems</a:t>
+                      </a:r>
+                      <a:endParaRPr lang="ru-RU" dirty="0"/>
+                    </a:p>
+                  </a:txBody>
+                  <a:tcPr/>
+                </a:tc>
+                <a:extLst>
+                  <a:ext uri="{0D108BD9-81ED-4DB2-BD59-A6C34878D82A}">
+                    <a16:rowId xmlns:a16="http://schemas.microsoft.com/office/drawing/2014/main" val="10000"/>
+                  </a:ext>
+                </a:extLst>
+              </a:tr>
+            </a:tbl>
+          </a:graphicData>
+        </a:graphic>
+      </p:graphicFrame>
+      <p:graphicFrame>
+        <p:nvGraphicFramePr>
+          <p:cNvPr id="6" name="Table 5">
+            <a:extLst>
+              <a:ext uri="{FF2B5EF4-FFF2-40B4-BE49-F238E27FC236}">
+                <a16:creationId xmlns:a16="http://schemas.microsoft.com/office/drawing/2014/main" id="{C892C368-3FA6-A67E-F70F-B9576A0AC80B}"/>
+              </a:ext>
+            </a:extLst>
+          </p:cNvPr>
+          <p:cNvGraphicFramePr>
+            <a:graphicFrameLocks noGrp="1"/>
+          </p:cNvGraphicFramePr>
+          <p:nvPr/>
+        </p:nvGraphicFramePr>
+        <p:xfrm>
+          <a:off x="0" y="6532604"/>
+          <a:ext cx="12192000" cy="365760"/>
+        </p:xfrm>
+        <a:graphic>
+          <a:graphicData uri="http://schemas.openxmlformats.org/drawingml/2006/table">
+            <a:tbl>
+              <a:tblPr firstRow="1" bandRow="1">
+                <a:tableStyleId>{5C22544A-7EE6-4342-B048-85BDC9FD1C3A}</a:tableStyleId>
+              </a:tblPr>
+              <a:tblGrid>
+                <a:gridCol w="12192000">
+                  <a:extLst>
+                    <a:ext uri="{9D8B030D-6E8A-4147-A177-3AD203B41FA5}">
+                      <a16:colId xmlns:a16="http://schemas.microsoft.com/office/drawing/2014/main" val="20000"/>
+                    </a:ext>
+                  </a:extLst>
+                </a:gridCol>
+              </a:tblGrid>
+              <a:tr h="308094">
+                <a:tc>
+                  <a:txBody>
+                    <a:bodyPr/>
+                    <a:lstStyle/>
+                    <a:p>
+                      <a:endParaRPr lang="ru-RU" dirty="0"/>
+                    </a:p>
+                  </a:txBody>
+                  <a:tcPr/>
+                </a:tc>
+                <a:extLst>
+                  <a:ext uri="{0D108BD9-81ED-4DB2-BD59-A6C34878D82A}">
+                    <a16:rowId xmlns:a16="http://schemas.microsoft.com/office/drawing/2014/main" val="10000"/>
+                  </a:ext>
+                </a:extLst>
+              </a:tr>
+            </a:tbl>
+          </a:graphicData>
+        </a:graphic>
+      </p:graphicFrame>
+      <p:graphicFrame>
+        <p:nvGraphicFramePr>
+          <p:cNvPr id="2" name="Table 1">
+            <a:extLst>
+              <a:ext uri="{FF2B5EF4-FFF2-40B4-BE49-F238E27FC236}">
+                <a16:creationId xmlns:a16="http://schemas.microsoft.com/office/drawing/2014/main" id="{8DD77CFF-4918-3675-54C9-226D893F4FC5}"/>
+              </a:ext>
+            </a:extLst>
+          </p:cNvPr>
+          <p:cNvGraphicFramePr>
+            <a:graphicFrameLocks noGrp="1"/>
+          </p:cNvGraphicFramePr>
+          <p:nvPr>
+            <p:extLst>
+              <p:ext uri="{D42A27DB-BD31-4B8C-83A1-F6EECF244321}">
+                <p14:modId xmlns:p14="http://schemas.microsoft.com/office/powerpoint/2010/main" val="747183098"/>
+              </p:ext>
+            </p:extLst>
+          </p:nvPr>
+        </p:nvGraphicFramePr>
+        <p:xfrm>
+          <a:off x="0" y="365762"/>
+          <a:ext cx="12192000" cy="2468880"/>
+        </p:xfrm>
+        <a:graphic>
+          <a:graphicData uri="http://schemas.openxmlformats.org/drawingml/2006/table">
+            <a:tbl>
+              <a:tblPr firstRow="1" bandRow="1">
+                <a:tableStyleId>{3B4B98B0-60AC-42C2-AFA5-B58CD77FA1E5}</a:tableStyleId>
+              </a:tblPr>
+              <a:tblGrid>
+                <a:gridCol w="3657600">
+                  <a:extLst>
+                    <a:ext uri="{9D8B030D-6E8A-4147-A177-3AD203B41FA5}">
+                      <a16:colId xmlns:a16="http://schemas.microsoft.com/office/drawing/2014/main" val="20000"/>
+                    </a:ext>
+                  </a:extLst>
+                </a:gridCol>
+                <a:gridCol w="8534400">
+                  <a:extLst>
+                    <a:ext uri="{9D8B030D-6E8A-4147-A177-3AD203B41FA5}">
+                      <a16:colId xmlns:a16="http://schemas.microsoft.com/office/drawing/2014/main" val="2857868636"/>
+                    </a:ext>
+                  </a:extLst>
+                </a:gridCol>
+              </a:tblGrid>
+              <a:tr h="455826">
+                <a:tc gridSpan="2">
+                  <a:txBody>
+                    <a:bodyPr/>
+                    <a:lstStyle/>
+                    <a:p>
+                      <a:r>
+                        <a:rPr lang="en-US" sz="2400" dirty="0"/>
+                        <a:t>Attributes of regular files</a:t>
+                      </a:r>
+                      <a:endParaRPr lang="ru-RU" sz="2400" dirty="0"/>
+                    </a:p>
+                  </a:txBody>
+                  <a:tcPr/>
+                </a:tc>
+                <a:tc hMerge="1">
+                  <a:txBody>
+                    <a:bodyPr/>
+                    <a:lstStyle/>
+                    <a:p>
+                      <a:endParaRPr lang="en-RU"/>
+                    </a:p>
+                  </a:txBody>
+                  <a:tcPr/>
+                </a:tc>
+                <a:extLst>
+                  <a:ext uri="{0D108BD9-81ED-4DB2-BD59-A6C34878D82A}">
+                    <a16:rowId xmlns:a16="http://schemas.microsoft.com/office/drawing/2014/main" val="10000"/>
+                  </a:ext>
+                </a:extLst>
+              </a:tr>
+              <a:tr h="455826">
+                <a:tc>
+                  <a:txBody>
+                    <a:bodyPr/>
+                    <a:lstStyle/>
+                    <a:p>
+                      <a:pPr marL="285750" indent="-285750">
+                        <a:buFont typeface="Arial" panose="020B0604020202020204" pitchFamily="34" charset="0"/>
+                        <a:buChar char="•"/>
+                      </a:pPr>
+                      <a:r>
+                        <a:rPr lang="en-US" sz="1800" dirty="0"/>
+                        <a:t>$STANDARD_INFORMATION,</a:t>
+                      </a:r>
+                    </a:p>
+                    <a:p>
+                      <a:pPr marL="285750" indent="-285750">
+                        <a:buFont typeface="Arial" panose="020B0604020202020204" pitchFamily="34" charset="0"/>
+                        <a:buChar char="•"/>
+                      </a:pPr>
+                      <a:r>
+                        <a:rPr lang="en-US" sz="1800" dirty="0"/>
+                        <a:t>$FILE_NAME,</a:t>
+                      </a:r>
+                    </a:p>
+                    <a:p>
+                      <a:pPr marL="285750" indent="-285750">
+                        <a:buFont typeface="Arial" panose="020B0604020202020204" pitchFamily="34" charset="0"/>
+                        <a:buChar char="•"/>
+                      </a:pPr>
+                      <a:r>
+                        <a:rPr lang="en-US" sz="1800" b="0" dirty="0"/>
+                        <a:t>$OBJECT_ID,</a:t>
+                      </a:r>
+                    </a:p>
+                    <a:p>
+                      <a:pPr marL="285750" indent="-285750">
+                        <a:buFont typeface="Arial" panose="020B0604020202020204" pitchFamily="34" charset="0"/>
+                        <a:buChar char="•"/>
+                      </a:pPr>
+                      <a:r>
+                        <a:rPr lang="en-US" sz="1800" dirty="0"/>
+                        <a:t>$SECURITY_DESCRITPOR,</a:t>
+                      </a:r>
+                    </a:p>
+                    <a:p>
+                      <a:pPr marL="285750" indent="-285750">
+                        <a:buFont typeface="Arial" panose="020B0604020202020204" pitchFamily="34" charset="0"/>
+                        <a:buChar char="•"/>
+                      </a:pPr>
+                      <a:r>
+                        <a:rPr lang="en-US" sz="1800" b="1" dirty="0"/>
+                        <a:t>$DATA,</a:t>
+                      </a:r>
+                    </a:p>
+                    <a:p>
+                      <a:pPr marL="285750" indent="-285750">
+                        <a:buFont typeface="Arial" panose="020B0604020202020204" pitchFamily="34" charset="0"/>
+                        <a:buChar char="•"/>
+                      </a:pPr>
+                      <a:r>
+                        <a:rPr lang="en-US" sz="1800" dirty="0"/>
+                        <a:t>$EA_INFORMATION,</a:t>
+                      </a:r>
+                    </a:p>
+                    <a:p>
+                      <a:pPr marL="285750" indent="-285750">
+                        <a:buFont typeface="Arial" panose="020B0604020202020204" pitchFamily="34" charset="0"/>
+                        <a:buChar char="•"/>
+                      </a:pPr>
+                      <a:r>
+                        <a:rPr lang="en-US" sz="1800" dirty="0"/>
+                        <a:t>$EA.</a:t>
+                      </a:r>
+                    </a:p>
+                  </a:txBody>
+                  <a:tcPr/>
+                </a:tc>
+                <a:tc>
+                  <a:txBody>
+                    <a:bodyPr/>
+                    <a:lstStyle/>
+                    <a:p>
+                      <a:pPr marL="0" indent="0">
+                        <a:buFont typeface="Arial" panose="020B0604020202020204" pitchFamily="34" charset="0"/>
+                        <a:buNone/>
+                      </a:pPr>
+                      <a:r>
+                        <a:rPr lang="en-US" sz="1600" dirty="0">
+                          <a:latin typeface="+mn-lt"/>
+                          <a:cs typeface="Consolas" panose="020B0609020204030204" pitchFamily="49" charset="0"/>
+                        </a:rPr>
+                        <a:t>This attribute holds the content of the file.</a:t>
+                      </a:r>
+                    </a:p>
+                    <a:p>
+                      <a:pPr marL="0" indent="0">
+                        <a:buFont typeface="Arial" panose="020B0604020202020204" pitchFamily="34" charset="0"/>
+                        <a:buNone/>
+                      </a:pPr>
+                      <a:endParaRPr lang="en-US" sz="1600" dirty="0">
+                        <a:latin typeface="+mn-lt"/>
+                        <a:cs typeface="Consolas" panose="020B0609020204030204" pitchFamily="49" charset="0"/>
+                      </a:endParaRPr>
+                    </a:p>
+                    <a:p>
+                      <a:pPr marL="0" indent="0">
+                        <a:buFont typeface="Arial" panose="020B0604020202020204" pitchFamily="34" charset="0"/>
+                        <a:buNone/>
+                      </a:pPr>
+                      <a:r>
+                        <a:rPr lang="en-US" sz="1600" dirty="0">
+                          <a:latin typeface="+mn-lt"/>
+                          <a:cs typeface="Consolas" panose="020B0609020204030204" pitchFamily="49" charset="0"/>
+                        </a:rPr>
+                        <a:t>There is an important difference from POSIX file systems. There may be multiple attributes </a:t>
+                      </a:r>
+                      <a:r>
+                        <a:rPr lang="en-US" sz="1600" dirty="0">
+                          <a:latin typeface="Consolas" panose="020B0609020204030204" pitchFamily="49" charset="0"/>
+                          <a:cs typeface="Consolas" panose="020B0609020204030204" pitchFamily="49" charset="0"/>
+                        </a:rPr>
+                        <a:t>$DATA</a:t>
+                      </a:r>
+                      <a:r>
+                        <a:rPr lang="en-US" sz="1600" dirty="0">
+                          <a:latin typeface="+mn-lt"/>
+                          <a:cs typeface="Consolas" panose="020B0609020204030204" pitchFamily="49" charset="0"/>
+                        </a:rPr>
+                        <a:t> in a file. The unnamed one holds the file content in the POSIX sense. Named attributes are typically used as extended attributes.</a:t>
+                      </a:r>
+                    </a:p>
+                  </a:txBody>
+                  <a:tcPr/>
+                </a:tc>
+                <a:extLst>
+                  <a:ext uri="{0D108BD9-81ED-4DB2-BD59-A6C34878D82A}">
+                    <a16:rowId xmlns:a16="http://schemas.microsoft.com/office/drawing/2014/main" val="1246859325"/>
+                  </a:ext>
+                </a:extLst>
+              </a:tr>
+            </a:tbl>
+          </a:graphicData>
+        </a:graphic>
+      </p:graphicFrame>
+    </p:spTree>
+    <p:extLst>
+      <p:ext uri="{BB962C8B-B14F-4D97-AF65-F5344CB8AC3E}">
+        <p14:creationId xmlns:p14="http://schemas.microsoft.com/office/powerpoint/2010/main" val="2283017708"/>
+      </p:ext>
+    </p:extLst>
+  </p:cSld>
+  <p:clrMapOvr>
+    <a:overrideClrMapping bg1="lt1" tx1="dk1" bg2="lt2" tx2="dk2" accent1="accent1" accent2="accent2" accent3="accent3" accent4="accent4" accent5="accent5" accent6="accent6" hlink="hlink" folHlink="folHlink"/>
+  </p:clrMapOvr>
+</p:sld>
+</file>
+
+<file path=ppt/slides/slide21.xml><?xml version="1.0" encoding="utf-8"?>
+<p:sld xmlns:a="http://schemas.openxmlformats.org/drawingml/2006/main" xmlns:r="http://schemas.openxmlformats.org/officeDocument/2006/relationships" xmlns:p="http://schemas.openxmlformats.org/presentationml/2006/main">
+  <p:cSld>
+    <p:bg>
+      <p:bgRef idx="1001">
+        <a:schemeClr val="bg1"/>
+      </p:bgRef>
+    </p:bg>
+    <p:spTree>
+      <p:nvGrpSpPr>
         <p:cNvPr id="1" name=""/>
         <p:cNvGrpSpPr/>
         <p:nvPr/>
@@ -15859,7 +17390,7 @@
 </p:sld>
 </file>
 
-<file path=ppt/slides/slide21.xml><?xml version="1.0" encoding="utf-8"?>
+<file path=ppt/slides/slide22.xml><?xml version="1.0" encoding="utf-8"?>
 <p:sld xmlns:a="http://schemas.openxmlformats.org/drawingml/2006/main" xmlns:r="http://schemas.openxmlformats.org/officeDocument/2006/relationships" xmlns:p="http://schemas.openxmlformats.org/presentationml/2006/main">
   <p:cSld>
     <p:bg>
@@ -16092,7 +17623,7 @@
 </p:sld>
 </file>
 
-<file path=ppt/slides/slide22.xml><?xml version="1.0" encoding="utf-8"?>
+<file path=ppt/slides/slide23.xml><?xml version="1.0" encoding="utf-8"?>
 <p:sld xmlns:a="http://schemas.openxmlformats.org/drawingml/2006/main" xmlns:r="http://schemas.openxmlformats.org/officeDocument/2006/relationships" xmlns:p="http://schemas.openxmlformats.org/presentationml/2006/main">
   <p:cSld>
     <p:bg>
@@ -16577,7 +18108,7 @@
 </p:sld>
 </file>
 
-<file path=ppt/slides/slide23.xml><?xml version="1.0" encoding="utf-8"?>
+<file path=ppt/slides/slide24.xml><?xml version="1.0" encoding="utf-8"?>
 <p:sld xmlns:a="http://schemas.openxmlformats.org/drawingml/2006/main" xmlns:r="http://schemas.openxmlformats.org/officeDocument/2006/relationships" xmlns:p="http://schemas.openxmlformats.org/presentationml/2006/main">
   <p:cSld>
     <p:bg>
@@ -17182,7 +18713,7 @@
 </p:sld>
 </file>
 
-<file path=ppt/slides/slide24.xml><?xml version="1.0" encoding="utf-8"?>
+<file path=ppt/slides/slide25.xml><?xml version="1.0" encoding="utf-8"?>
 <p:sld xmlns:a="http://schemas.openxmlformats.org/drawingml/2006/main" xmlns:r="http://schemas.openxmlformats.org/officeDocument/2006/relationships" xmlns:p="http://schemas.openxmlformats.org/presentationml/2006/main">
   <p:cSld>
     <p:bg>
@@ -17644,7 +19175,7 @@
 </p:sld>
 </file>
 
-<file path=ppt/slides/slide25.xml><?xml version="1.0" encoding="utf-8"?>
+<file path=ppt/slides/slide26.xml><?xml version="1.0" encoding="utf-8"?>
 <p:sld xmlns:a="http://schemas.openxmlformats.org/drawingml/2006/main" xmlns:r="http://schemas.openxmlformats.org/officeDocument/2006/relationships" xmlns:p="http://schemas.openxmlformats.org/presentationml/2006/main">
   <p:cSld>
     <p:bg>
@@ -18595,7 +20126,7 @@
 </p:sld>
 </file>
 
-<file path=ppt/slides/slide26.xml><?xml version="1.0" encoding="utf-8"?>
+<file path=ppt/slides/slide27.xml><?xml version="1.0" encoding="utf-8"?>
 <p:sld xmlns:a="http://schemas.openxmlformats.org/drawingml/2006/main" xmlns:r="http://schemas.openxmlformats.org/officeDocument/2006/relationships" xmlns:p="http://schemas.openxmlformats.org/presentationml/2006/main">
   <p:cSld>
     <p:bg>
@@ -20296,7 +21827,7 @@
 </p:sld>
 </file>
 
-<file path=ppt/slides/slide27.xml><?xml version="1.0" encoding="utf-8"?>
+<file path=ppt/slides/slide28.xml><?xml version="1.0" encoding="utf-8"?>
 <p:sld xmlns:a="http://schemas.openxmlformats.org/drawingml/2006/main" xmlns:r="http://schemas.openxmlformats.org/officeDocument/2006/relationships" xmlns:p="http://schemas.openxmlformats.org/presentationml/2006/main">
   <p:cSld>
     <p:bg>
@@ -20660,7 +22191,7 @@
 </p:sld>
 </file>
 
-<file path=ppt/slides/slide28.xml><?xml version="1.0" encoding="utf-8"?>
+<file path=ppt/slides/slide29.xml><?xml version="1.0" encoding="utf-8"?>
 <p:sld xmlns:a="http://schemas.openxmlformats.org/drawingml/2006/main" xmlns:r="http://schemas.openxmlformats.org/officeDocument/2006/relationships" xmlns:p="http://schemas.openxmlformats.org/presentationml/2006/main">
   <p:cSld>
     <p:bg>
@@ -21251,677 +22782,6 @@
     <p:extLst>
       <p:ext uri="{BB962C8B-B14F-4D97-AF65-F5344CB8AC3E}">
         <p14:creationId xmlns:p14="http://schemas.microsoft.com/office/powerpoint/2010/main" val="704093252"/>
-      </p:ext>
-    </p:extLst>
-  </p:cSld>
-  <p:clrMapOvr>
-    <a:overrideClrMapping bg1="lt1" tx1="dk1" bg2="lt2" tx2="dk2" accent1="accent1" accent2="accent2" accent3="accent3" accent4="accent4" accent5="accent5" accent6="accent6" hlink="hlink" folHlink="folHlink"/>
-  </p:clrMapOvr>
-</p:sld>
-</file>
-
-<file path=ppt/slides/slide29.xml><?xml version="1.0" encoding="utf-8"?>
-<p:sld xmlns:a="http://schemas.openxmlformats.org/drawingml/2006/main" xmlns:r="http://schemas.openxmlformats.org/officeDocument/2006/relationships" xmlns:p="http://schemas.openxmlformats.org/presentationml/2006/main">
-  <p:cSld>
-    <p:bg>
-      <p:bgRef idx="1001">
-        <a:schemeClr val="bg1"/>
-      </p:bgRef>
-    </p:bg>
-    <p:spTree>
-      <p:nvGrpSpPr>
-        <p:cNvPr id="1" name=""/>
-        <p:cNvGrpSpPr/>
-        <p:nvPr/>
-      </p:nvGrpSpPr>
-      <p:grpSpPr>
-        <a:xfrm>
-          <a:off x="0" y="0"/>
-          <a:ext cx="0" cy="0"/>
-          <a:chOff x="0" y="0"/>
-          <a:chExt cx="0" cy="0"/>
-        </a:xfrm>
-      </p:grpSpPr>
-      <p:graphicFrame>
-        <p:nvGraphicFramePr>
-          <p:cNvPr id="5" name="Table 4"/>
-          <p:cNvGraphicFramePr>
-            <a:graphicFrameLocks noGrp="1"/>
-          </p:cNvGraphicFramePr>
-          <p:nvPr>
-            <p:extLst>
-              <p:ext uri="{D42A27DB-BD31-4B8C-83A1-F6EECF244321}">
-                <p14:modId xmlns:p14="http://schemas.microsoft.com/office/powerpoint/2010/main" val="1064025585"/>
-              </p:ext>
-            </p:extLst>
-          </p:nvPr>
-        </p:nvGraphicFramePr>
-        <p:xfrm>
-          <a:off x="0" y="1"/>
-          <a:ext cx="12192000" cy="365760"/>
-        </p:xfrm>
-        <a:graphic>
-          <a:graphicData uri="http://schemas.openxmlformats.org/drawingml/2006/table">
-            <a:tbl>
-              <a:tblPr firstRow="1" bandRow="1">
-                <a:tableStyleId>{5C22544A-7EE6-4342-B048-85BDC9FD1C3A}</a:tableStyleId>
-              </a:tblPr>
-              <a:tblGrid>
-                <a:gridCol w="12192000">
-                  <a:extLst>
-                    <a:ext uri="{9D8B030D-6E8A-4147-A177-3AD203B41FA5}">
-                      <a16:colId xmlns:a16="http://schemas.microsoft.com/office/drawing/2014/main" val="20000"/>
-                    </a:ext>
-                  </a:extLst>
-                </a:gridCol>
-              </a:tblGrid>
-              <a:tr h="321276">
-                <a:tc>
-                  <a:txBody>
-                    <a:bodyPr/>
-                    <a:lstStyle/>
-                    <a:p>
-                      <a:r>
-                        <a:rPr lang="en-US" sz="1800" dirty="0"/>
-                        <a:t>The basics of file systems</a:t>
-                      </a:r>
-                      <a:endParaRPr lang="ru-RU" dirty="0"/>
-                    </a:p>
-                  </a:txBody>
-                  <a:tcPr/>
-                </a:tc>
-                <a:extLst>
-                  <a:ext uri="{0D108BD9-81ED-4DB2-BD59-A6C34878D82A}">
-                    <a16:rowId xmlns:a16="http://schemas.microsoft.com/office/drawing/2014/main" val="10000"/>
-                  </a:ext>
-                </a:extLst>
-              </a:tr>
-            </a:tbl>
-          </a:graphicData>
-        </a:graphic>
-      </p:graphicFrame>
-      <p:graphicFrame>
-        <p:nvGraphicFramePr>
-          <p:cNvPr id="6" name="Table 5"/>
-          <p:cNvGraphicFramePr>
-            <a:graphicFrameLocks noGrp="1"/>
-          </p:cNvGraphicFramePr>
-          <p:nvPr>
-            <p:extLst>
-              <p:ext uri="{D42A27DB-BD31-4B8C-83A1-F6EECF244321}">
-                <p14:modId xmlns:p14="http://schemas.microsoft.com/office/powerpoint/2010/main" val="2279371202"/>
-              </p:ext>
-            </p:extLst>
-          </p:nvPr>
-        </p:nvGraphicFramePr>
-        <p:xfrm>
-          <a:off x="0" y="6532604"/>
-          <a:ext cx="12192000" cy="365760"/>
-        </p:xfrm>
-        <a:graphic>
-          <a:graphicData uri="http://schemas.openxmlformats.org/drawingml/2006/table">
-            <a:tbl>
-              <a:tblPr firstRow="1" bandRow="1">
-                <a:tableStyleId>{5C22544A-7EE6-4342-B048-85BDC9FD1C3A}</a:tableStyleId>
-              </a:tblPr>
-              <a:tblGrid>
-                <a:gridCol w="12192000">
-                  <a:extLst>
-                    <a:ext uri="{9D8B030D-6E8A-4147-A177-3AD203B41FA5}">
-                      <a16:colId xmlns:a16="http://schemas.microsoft.com/office/drawing/2014/main" val="20000"/>
-                    </a:ext>
-                  </a:extLst>
-                </a:gridCol>
-              </a:tblGrid>
-              <a:tr h="308094">
-                <a:tc>
-                  <a:txBody>
-                    <a:bodyPr/>
-                    <a:lstStyle/>
-                    <a:p>
-                      <a:endParaRPr lang="ru-RU" dirty="0"/>
-                    </a:p>
-                  </a:txBody>
-                  <a:tcPr/>
-                </a:tc>
-                <a:extLst>
-                  <a:ext uri="{0D108BD9-81ED-4DB2-BD59-A6C34878D82A}">
-                    <a16:rowId xmlns:a16="http://schemas.microsoft.com/office/drawing/2014/main" val="10000"/>
-                  </a:ext>
-                </a:extLst>
-              </a:tr>
-            </a:tbl>
-          </a:graphicData>
-        </a:graphic>
-      </p:graphicFrame>
-      <p:graphicFrame>
-        <p:nvGraphicFramePr>
-          <p:cNvPr id="2" name="Table 1"/>
-          <p:cNvGraphicFramePr>
-            <a:graphicFrameLocks noGrp="1"/>
-          </p:cNvGraphicFramePr>
-          <p:nvPr>
-            <p:extLst>
-              <p:ext uri="{D42A27DB-BD31-4B8C-83A1-F6EECF244321}">
-                <p14:modId xmlns:p14="http://schemas.microsoft.com/office/powerpoint/2010/main" val="1333746103"/>
-              </p:ext>
-            </p:extLst>
-          </p:nvPr>
-        </p:nvGraphicFramePr>
-        <p:xfrm>
-          <a:off x="0" y="365762"/>
-          <a:ext cx="12192000" cy="5486400"/>
-        </p:xfrm>
-        <a:graphic>
-          <a:graphicData uri="http://schemas.openxmlformats.org/drawingml/2006/table">
-            <a:tbl>
-              <a:tblPr firstRow="1" bandRow="1">
-                <a:tableStyleId>{3B4B98B0-60AC-42C2-AFA5-B58CD77FA1E5}</a:tableStyleId>
-              </a:tblPr>
-              <a:tblGrid>
-                <a:gridCol w="12192000">
-                  <a:extLst>
-                    <a:ext uri="{9D8B030D-6E8A-4147-A177-3AD203B41FA5}">
-                      <a16:colId xmlns:a16="http://schemas.microsoft.com/office/drawing/2014/main" val="20000"/>
-                    </a:ext>
-                  </a:extLst>
-                </a:gridCol>
-              </a:tblGrid>
-              <a:tr h="455826">
-                <a:tc>
-                  <a:txBody>
-                    <a:bodyPr/>
-                    <a:lstStyle/>
-                    <a:p>
-                      <a:r>
-                        <a:rPr lang="en-US" sz="2400" dirty="0"/>
-                        <a:t>System files of</a:t>
-                      </a:r>
-                      <a:r>
-                        <a:rPr lang="ru-RU" sz="2400" dirty="0"/>
-                        <a:t> </a:t>
-                      </a:r>
-                      <a:r>
-                        <a:rPr lang="en-US" sz="2400" dirty="0"/>
-                        <a:t>NTFS</a:t>
-                      </a:r>
-                      <a:endParaRPr lang="ru-RU" sz="2400" dirty="0"/>
-                    </a:p>
-                  </a:txBody>
-                  <a:tcPr/>
-                </a:tc>
-                <a:extLst>
-                  <a:ext uri="{0D108BD9-81ED-4DB2-BD59-A6C34878D82A}">
-                    <a16:rowId xmlns:a16="http://schemas.microsoft.com/office/drawing/2014/main" val="10000"/>
-                  </a:ext>
-                </a:extLst>
-              </a:tr>
-              <a:tr h="455826">
-                <a:tc>
-                  <a:txBody>
-                    <a:bodyPr/>
-                    <a:lstStyle/>
-                    <a:p>
-                      <a:pPr marL="0" indent="0">
-                        <a:buNone/>
-                      </a:pPr>
-                      <a:r>
-                        <a:rPr lang="en-US" sz="1800" dirty="0"/>
-                        <a:t>The first </a:t>
-                      </a:r>
-                      <a:r>
-                        <a:rPr lang="ru-RU" sz="1800" dirty="0"/>
-                        <a:t>16 </a:t>
-                      </a:r>
-                      <a:r>
-                        <a:rPr lang="en-US" sz="1800" dirty="0"/>
-                        <a:t>files in a</a:t>
-                      </a:r>
-                      <a:r>
-                        <a:rPr lang="ru-RU" sz="1800" dirty="0"/>
-                        <a:t> </a:t>
-                      </a:r>
-                      <a:r>
-                        <a:rPr lang="en-US" sz="1800" dirty="0"/>
-                        <a:t>NTFS volume are system files that store the metadata of NTFS:</a:t>
-                      </a:r>
-                    </a:p>
-                    <a:p>
-                      <a:pPr marL="0" indent="0">
-                        <a:buNone/>
-                      </a:pPr>
-                      <a:endParaRPr lang="en-US" sz="1800" dirty="0"/>
-                    </a:p>
-                    <a:p>
-                      <a:pPr marL="285750" indent="-285750">
-                        <a:buFont typeface="Arial" panose="020B0604020202020204" pitchFamily="34" charset="0"/>
-                        <a:buChar char="•"/>
-                      </a:pPr>
-                      <a:r>
-                        <a:rPr lang="en-US" sz="1800" b="1" dirty="0">
-                          <a:latin typeface="Menlo" panose="020B0609030804020204" pitchFamily="49" charset="0"/>
-                          <a:ea typeface="Menlo" panose="020B0609030804020204" pitchFamily="49" charset="0"/>
-                          <a:cs typeface="Menlo" panose="020B0609030804020204" pitchFamily="49" charset="0"/>
-                        </a:rPr>
-                        <a:t>$MFT</a:t>
-                      </a:r>
-                      <a:r>
-                        <a:rPr lang="en-US" sz="1800" dirty="0">
-                          <a:latin typeface="Menlo" panose="020B0609030804020204" pitchFamily="49" charset="0"/>
-                          <a:ea typeface="Menlo" panose="020B0609030804020204" pitchFamily="49" charset="0"/>
-                          <a:cs typeface="Menlo" panose="020B0609030804020204" pitchFamily="49" charset="0"/>
-                        </a:rPr>
-                        <a:t>,</a:t>
-                      </a:r>
-                    </a:p>
-                    <a:p>
-                      <a:pPr marL="285750" indent="-285750">
-                        <a:buFont typeface="Arial" panose="020B0604020202020204" pitchFamily="34" charset="0"/>
-                        <a:buChar char="•"/>
-                      </a:pPr>
-                      <a:r>
-                        <a:rPr lang="en-US" sz="1800" dirty="0">
-                          <a:latin typeface="Menlo" panose="020B0609030804020204" pitchFamily="49" charset="0"/>
-                          <a:ea typeface="Menlo" panose="020B0609030804020204" pitchFamily="49" charset="0"/>
-                          <a:cs typeface="Menlo" panose="020B0609030804020204" pitchFamily="49" charset="0"/>
-                        </a:rPr>
-                        <a:t>$</a:t>
-                      </a:r>
-                      <a:r>
-                        <a:rPr lang="en-US" sz="1800" dirty="0" err="1">
-                          <a:latin typeface="Menlo" panose="020B0609030804020204" pitchFamily="49" charset="0"/>
-                          <a:ea typeface="Menlo" panose="020B0609030804020204" pitchFamily="49" charset="0"/>
-                          <a:cs typeface="Menlo" panose="020B0609030804020204" pitchFamily="49" charset="0"/>
-                        </a:rPr>
-                        <a:t>MFTMirr</a:t>
-                      </a:r>
-                      <a:r>
-                        <a:rPr lang="en-US" sz="1800" dirty="0">
-                          <a:latin typeface="Menlo" panose="020B0609030804020204" pitchFamily="49" charset="0"/>
-                          <a:ea typeface="Menlo" panose="020B0609030804020204" pitchFamily="49" charset="0"/>
-                          <a:cs typeface="Menlo" panose="020B0609030804020204" pitchFamily="49" charset="0"/>
-                        </a:rPr>
-                        <a:t>,</a:t>
-                      </a:r>
-                    </a:p>
-                    <a:p>
-                      <a:pPr marL="285750" indent="-285750">
-                        <a:buFont typeface="Arial" panose="020B0604020202020204" pitchFamily="34" charset="0"/>
-                        <a:buChar char="•"/>
-                      </a:pPr>
-                      <a:r>
-                        <a:rPr lang="en-US" sz="1800" dirty="0">
-                          <a:latin typeface="Menlo" panose="020B0609030804020204" pitchFamily="49" charset="0"/>
-                          <a:ea typeface="Menlo" panose="020B0609030804020204" pitchFamily="49" charset="0"/>
-                          <a:cs typeface="Menlo" panose="020B0609030804020204" pitchFamily="49" charset="0"/>
-                        </a:rPr>
-                        <a:t>$</a:t>
-                      </a:r>
-                      <a:r>
-                        <a:rPr lang="en-US" sz="1800" dirty="0" err="1">
-                          <a:latin typeface="Menlo" panose="020B0609030804020204" pitchFamily="49" charset="0"/>
-                          <a:ea typeface="Menlo" panose="020B0609030804020204" pitchFamily="49" charset="0"/>
-                          <a:cs typeface="Menlo" panose="020B0609030804020204" pitchFamily="49" charset="0"/>
-                        </a:rPr>
-                        <a:t>LogFile</a:t>
-                      </a:r>
-                      <a:r>
-                        <a:rPr lang="en-US" sz="1800" dirty="0">
-                          <a:latin typeface="Menlo" panose="020B0609030804020204" pitchFamily="49" charset="0"/>
-                          <a:ea typeface="Menlo" panose="020B0609030804020204" pitchFamily="49" charset="0"/>
-                          <a:cs typeface="Menlo" panose="020B0609030804020204" pitchFamily="49" charset="0"/>
-                        </a:rPr>
-                        <a:t>,</a:t>
-                      </a:r>
-                    </a:p>
-                    <a:p>
-                      <a:pPr marL="285750" indent="-285750">
-                        <a:buFont typeface="Arial" panose="020B0604020202020204" pitchFamily="34" charset="0"/>
-                        <a:buChar char="•"/>
-                      </a:pPr>
-                      <a:r>
-                        <a:rPr lang="en-US" sz="1800" dirty="0">
-                          <a:latin typeface="Menlo" panose="020B0609030804020204" pitchFamily="49" charset="0"/>
-                          <a:ea typeface="Menlo" panose="020B0609030804020204" pitchFamily="49" charset="0"/>
-                          <a:cs typeface="Menlo" panose="020B0609030804020204" pitchFamily="49" charset="0"/>
-                        </a:rPr>
-                        <a:t>$Volume,</a:t>
-                      </a:r>
-                    </a:p>
-                    <a:p>
-                      <a:pPr marL="285750" indent="-285750">
-                        <a:buFont typeface="Arial" panose="020B0604020202020204" pitchFamily="34" charset="0"/>
-                        <a:buChar char="•"/>
-                      </a:pPr>
-                      <a:r>
-                        <a:rPr lang="en-US" sz="1800" dirty="0">
-                          <a:latin typeface="Menlo" panose="020B0609030804020204" pitchFamily="49" charset="0"/>
-                          <a:ea typeface="Menlo" panose="020B0609030804020204" pitchFamily="49" charset="0"/>
-                          <a:cs typeface="Menlo" panose="020B0609030804020204" pitchFamily="49" charset="0"/>
-                        </a:rPr>
-                        <a:t>$</a:t>
-                      </a:r>
-                      <a:r>
-                        <a:rPr lang="en-US" sz="1800" dirty="0" err="1">
-                          <a:latin typeface="Menlo" panose="020B0609030804020204" pitchFamily="49" charset="0"/>
-                          <a:ea typeface="Menlo" panose="020B0609030804020204" pitchFamily="49" charset="0"/>
-                          <a:cs typeface="Menlo" panose="020B0609030804020204" pitchFamily="49" charset="0"/>
-                        </a:rPr>
-                        <a:t>AttrDef</a:t>
-                      </a:r>
-                      <a:r>
-                        <a:rPr lang="en-US" sz="1800" dirty="0">
-                          <a:latin typeface="Menlo" panose="020B0609030804020204" pitchFamily="49" charset="0"/>
-                          <a:ea typeface="Menlo" panose="020B0609030804020204" pitchFamily="49" charset="0"/>
-                          <a:cs typeface="Menlo" panose="020B0609030804020204" pitchFamily="49" charset="0"/>
-                        </a:rPr>
-                        <a:t>,</a:t>
-                      </a:r>
-                    </a:p>
-                    <a:p>
-                      <a:pPr marL="285750" indent="-285750">
-                        <a:buFont typeface="Arial" panose="020B0604020202020204" pitchFamily="34" charset="0"/>
-                        <a:buChar char="•"/>
-                      </a:pPr>
-                      <a:r>
-                        <a:rPr lang="en-US" sz="1800" dirty="0">
-                          <a:latin typeface="Menlo" panose="020B0609030804020204" pitchFamily="49" charset="0"/>
-                          <a:ea typeface="Menlo" panose="020B0609030804020204" pitchFamily="49" charset="0"/>
-                          <a:cs typeface="Menlo" panose="020B0609030804020204" pitchFamily="49" charset="0"/>
-                        </a:rPr>
-                        <a:t>.</a:t>
-                      </a:r>
-                    </a:p>
-                    <a:p>
-                      <a:pPr marL="285750" indent="-285750">
-                        <a:buFont typeface="Arial" panose="020B0604020202020204" pitchFamily="34" charset="0"/>
-                        <a:buChar char="•"/>
-                      </a:pPr>
-                      <a:r>
-                        <a:rPr lang="en-US" sz="1800" dirty="0">
-                          <a:latin typeface="Menlo" panose="020B0609030804020204" pitchFamily="49" charset="0"/>
-                          <a:ea typeface="Menlo" panose="020B0609030804020204" pitchFamily="49" charset="0"/>
-                          <a:cs typeface="Menlo" panose="020B0609030804020204" pitchFamily="49" charset="0"/>
-                        </a:rPr>
-                        <a:t>$Bitmap,</a:t>
-                      </a:r>
-                    </a:p>
-                    <a:p>
-                      <a:pPr marL="285750" indent="-285750">
-                        <a:buFont typeface="Arial" panose="020B0604020202020204" pitchFamily="34" charset="0"/>
-                        <a:buChar char="•"/>
-                      </a:pPr>
-                      <a:r>
-                        <a:rPr lang="en-US" sz="1800" dirty="0">
-                          <a:latin typeface="Menlo" panose="020B0609030804020204" pitchFamily="49" charset="0"/>
-                          <a:ea typeface="Menlo" panose="020B0609030804020204" pitchFamily="49" charset="0"/>
-                          <a:cs typeface="Menlo" panose="020B0609030804020204" pitchFamily="49" charset="0"/>
-                        </a:rPr>
-                        <a:t>$Boot,</a:t>
-                      </a:r>
-                    </a:p>
-                    <a:p>
-                      <a:pPr marL="285750" indent="-285750">
-                        <a:buFont typeface="Arial" panose="020B0604020202020204" pitchFamily="34" charset="0"/>
-                        <a:buChar char="•"/>
-                      </a:pPr>
-                      <a:r>
-                        <a:rPr lang="en-US" sz="1800" dirty="0">
-                          <a:latin typeface="Menlo" panose="020B0609030804020204" pitchFamily="49" charset="0"/>
-                          <a:ea typeface="Menlo" panose="020B0609030804020204" pitchFamily="49" charset="0"/>
-                          <a:cs typeface="Menlo" panose="020B0609030804020204" pitchFamily="49" charset="0"/>
-                        </a:rPr>
-                        <a:t>$</a:t>
-                      </a:r>
-                      <a:r>
-                        <a:rPr lang="en-US" sz="1800" dirty="0" err="1">
-                          <a:latin typeface="Menlo" panose="020B0609030804020204" pitchFamily="49" charset="0"/>
-                          <a:ea typeface="Menlo" panose="020B0609030804020204" pitchFamily="49" charset="0"/>
-                          <a:cs typeface="Menlo" panose="020B0609030804020204" pitchFamily="49" charset="0"/>
-                        </a:rPr>
-                        <a:t>BadClus</a:t>
-                      </a:r>
-                      <a:r>
-                        <a:rPr lang="en-US" sz="1800" dirty="0">
-                          <a:latin typeface="Menlo" panose="020B0609030804020204" pitchFamily="49" charset="0"/>
-                          <a:ea typeface="Menlo" panose="020B0609030804020204" pitchFamily="49" charset="0"/>
-                          <a:cs typeface="Menlo" panose="020B0609030804020204" pitchFamily="49" charset="0"/>
-                        </a:rPr>
-                        <a:t>,</a:t>
-                      </a:r>
-                    </a:p>
-                    <a:p>
-                      <a:pPr marL="285750" indent="-285750">
-                        <a:buFont typeface="Arial" panose="020B0604020202020204" pitchFamily="34" charset="0"/>
-                        <a:buChar char="•"/>
-                      </a:pPr>
-                      <a:r>
-                        <a:rPr lang="en-US" sz="1800" dirty="0">
-                          <a:latin typeface="Menlo" panose="020B0609030804020204" pitchFamily="49" charset="0"/>
-                          <a:ea typeface="Menlo" panose="020B0609030804020204" pitchFamily="49" charset="0"/>
-                          <a:cs typeface="Menlo" panose="020B0609030804020204" pitchFamily="49" charset="0"/>
-                        </a:rPr>
-                        <a:t>$Quota,</a:t>
-                      </a:r>
-                    </a:p>
-                    <a:p>
-                      <a:pPr marL="285750" indent="-285750">
-                        <a:buFont typeface="Arial" panose="020B0604020202020204" pitchFamily="34" charset="0"/>
-                        <a:buChar char="•"/>
-                      </a:pPr>
-                      <a:r>
-                        <a:rPr lang="en-US" sz="1800" dirty="0">
-                          <a:latin typeface="Menlo" panose="020B0609030804020204" pitchFamily="49" charset="0"/>
-                          <a:ea typeface="Menlo" panose="020B0609030804020204" pitchFamily="49" charset="0"/>
-                          <a:cs typeface="Menlo" panose="020B0609030804020204" pitchFamily="49" charset="0"/>
-                        </a:rPr>
-                        <a:t>$Secure,</a:t>
-                      </a:r>
-                    </a:p>
-                    <a:p>
-                      <a:pPr marL="285750" indent="-285750">
-                        <a:buFont typeface="Arial" panose="020B0604020202020204" pitchFamily="34" charset="0"/>
-                        <a:buChar char="•"/>
-                      </a:pPr>
-                      <a:r>
-                        <a:rPr lang="en-US" sz="1800" dirty="0">
-                          <a:latin typeface="Menlo" panose="020B0609030804020204" pitchFamily="49" charset="0"/>
-                          <a:ea typeface="Menlo" panose="020B0609030804020204" pitchFamily="49" charset="0"/>
-                          <a:cs typeface="Menlo" panose="020B0609030804020204" pitchFamily="49" charset="0"/>
-                        </a:rPr>
-                        <a:t>$</a:t>
-                      </a:r>
-                      <a:r>
-                        <a:rPr lang="en-US" sz="1800" dirty="0" err="1">
-                          <a:latin typeface="Menlo" panose="020B0609030804020204" pitchFamily="49" charset="0"/>
-                          <a:ea typeface="Menlo" panose="020B0609030804020204" pitchFamily="49" charset="0"/>
-                          <a:cs typeface="Menlo" panose="020B0609030804020204" pitchFamily="49" charset="0"/>
-                        </a:rPr>
-                        <a:t>UpCase</a:t>
-                      </a:r>
-                      <a:r>
-                        <a:rPr lang="en-US" sz="1800" dirty="0">
-                          <a:latin typeface="Menlo" panose="020B0609030804020204" pitchFamily="49" charset="0"/>
-                          <a:ea typeface="Menlo" panose="020B0609030804020204" pitchFamily="49" charset="0"/>
-                          <a:cs typeface="Menlo" panose="020B0609030804020204" pitchFamily="49" charset="0"/>
-                        </a:rPr>
-                        <a:t>,</a:t>
-                      </a:r>
-                    </a:p>
-                    <a:p>
-                      <a:pPr marL="285750" indent="-285750">
-                        <a:buFont typeface="Arial" panose="020B0604020202020204" pitchFamily="34" charset="0"/>
-                        <a:buChar char="•"/>
-                      </a:pPr>
-                      <a:r>
-                        <a:rPr lang="en-US" sz="1800" dirty="0">
-                          <a:latin typeface="Menlo" panose="020B0609030804020204" pitchFamily="49" charset="0"/>
-                          <a:ea typeface="Menlo" panose="020B0609030804020204" pitchFamily="49" charset="0"/>
-                          <a:cs typeface="Menlo" panose="020B0609030804020204" pitchFamily="49" charset="0"/>
-                        </a:rPr>
-                        <a:t>$Extend,</a:t>
-                      </a:r>
-                    </a:p>
-                    <a:p>
-                      <a:pPr marL="285750" indent="-285750">
-                        <a:buFont typeface="Arial" panose="020B0604020202020204" pitchFamily="34" charset="0"/>
-                        <a:buChar char="•"/>
-                      </a:pPr>
-                      <a:r>
-                        <a:rPr lang="en-US" sz="1800" dirty="0">
-                          <a:latin typeface="Menlo" panose="020B0609030804020204" pitchFamily="49" charset="0"/>
-                          <a:ea typeface="Menlo" panose="020B0609030804020204" pitchFamily="49" charset="0"/>
-                          <a:cs typeface="Menlo" panose="020B0609030804020204" pitchFamily="49" charset="0"/>
-                        </a:rPr>
-                        <a:t>$</a:t>
-                      </a:r>
-                      <a:r>
-                        <a:rPr lang="en-US" sz="1800" dirty="0" err="1">
-                          <a:latin typeface="Menlo" panose="020B0609030804020204" pitchFamily="49" charset="0"/>
-                          <a:ea typeface="Menlo" panose="020B0609030804020204" pitchFamily="49" charset="0"/>
-                          <a:cs typeface="Menlo" panose="020B0609030804020204" pitchFamily="49" charset="0"/>
-                        </a:rPr>
-                        <a:t>ObjId</a:t>
-                      </a:r>
-                      <a:r>
-                        <a:rPr lang="en-US" sz="1800" dirty="0">
-                          <a:latin typeface="Menlo" panose="020B0609030804020204" pitchFamily="49" charset="0"/>
-                          <a:ea typeface="Menlo" panose="020B0609030804020204" pitchFamily="49" charset="0"/>
-                          <a:cs typeface="Menlo" panose="020B0609030804020204" pitchFamily="49" charset="0"/>
-                        </a:rPr>
-                        <a:t>,</a:t>
-                      </a:r>
-                    </a:p>
-                    <a:p>
-                      <a:pPr marL="285750" indent="-285750">
-                        <a:buFont typeface="Arial" panose="020B0604020202020204" pitchFamily="34" charset="0"/>
-                        <a:buChar char="•"/>
-                      </a:pPr>
-                      <a:r>
-                        <a:rPr lang="en-US" sz="1800" dirty="0">
-                          <a:latin typeface="Menlo" panose="020B0609030804020204" pitchFamily="49" charset="0"/>
-                          <a:ea typeface="Menlo" panose="020B0609030804020204" pitchFamily="49" charset="0"/>
-                          <a:cs typeface="Menlo" panose="020B0609030804020204" pitchFamily="49" charset="0"/>
-                        </a:rPr>
-                        <a:t>$Reparse,</a:t>
-                      </a:r>
-                    </a:p>
-                    <a:p>
-                      <a:pPr marL="285750" indent="-285750">
-                        <a:buFont typeface="Arial" panose="020B0604020202020204" pitchFamily="34" charset="0"/>
-                        <a:buChar char="•"/>
-                      </a:pPr>
-                      <a:r>
-                        <a:rPr lang="en-US" sz="1800" dirty="0">
-                          <a:latin typeface="Menlo" panose="020B0609030804020204" pitchFamily="49" charset="0"/>
-                          <a:ea typeface="Menlo" panose="020B0609030804020204" pitchFamily="49" charset="0"/>
-                          <a:cs typeface="Menlo" panose="020B0609030804020204" pitchFamily="49" charset="0"/>
-                        </a:rPr>
-                        <a:t>$</a:t>
-                      </a:r>
-                      <a:r>
-                        <a:rPr lang="en-US" sz="1800" dirty="0" err="1">
-                          <a:latin typeface="Menlo" panose="020B0609030804020204" pitchFamily="49" charset="0"/>
-                          <a:ea typeface="Menlo" panose="020B0609030804020204" pitchFamily="49" charset="0"/>
-                          <a:cs typeface="Menlo" panose="020B0609030804020204" pitchFamily="49" charset="0"/>
-                        </a:rPr>
-                        <a:t>UsnJournal</a:t>
-                      </a:r>
-                      <a:r>
-                        <a:rPr lang="en-US" sz="1800" dirty="0">
-                          <a:latin typeface="Menlo" panose="020B0609030804020204" pitchFamily="49" charset="0"/>
-                          <a:ea typeface="Menlo" panose="020B0609030804020204" pitchFamily="49" charset="0"/>
-                          <a:cs typeface="Menlo" panose="020B0609030804020204" pitchFamily="49" charset="0"/>
-                        </a:rPr>
-                        <a:t>.</a:t>
-                      </a:r>
-                      <a:endParaRPr lang="ru-RU" sz="1800" dirty="0">
-                        <a:latin typeface="Menlo" panose="020B0609030804020204" pitchFamily="49" charset="0"/>
-                        <a:ea typeface="Menlo" panose="020B0609030804020204" pitchFamily="49" charset="0"/>
-                        <a:cs typeface="Menlo" panose="020B0609030804020204" pitchFamily="49" charset="0"/>
-                      </a:endParaRPr>
-                    </a:p>
-                  </a:txBody>
-                  <a:tcPr/>
-                </a:tc>
-                <a:extLst>
-                  <a:ext uri="{0D108BD9-81ED-4DB2-BD59-A6C34878D82A}">
-                    <a16:rowId xmlns:a16="http://schemas.microsoft.com/office/drawing/2014/main" val="1058839663"/>
-                  </a:ext>
-                </a:extLst>
-              </a:tr>
-            </a:tbl>
-          </a:graphicData>
-        </a:graphic>
-      </p:graphicFrame>
-      <p:sp>
-        <p:nvSpPr>
-          <p:cNvPr id="3" name="TextBox 2">
-            <a:extLst>
-              <a:ext uri="{FF2B5EF4-FFF2-40B4-BE49-F238E27FC236}">
-                <a16:creationId xmlns:a16="http://schemas.microsoft.com/office/drawing/2014/main" id="{D15225CB-64F3-1A4B-868A-B11A91B5CE13}"/>
-              </a:ext>
-            </a:extLst>
-          </p:cNvPr>
-          <p:cNvSpPr txBox="1"/>
-          <p:nvPr/>
-        </p:nvSpPr>
-        <p:spPr>
-          <a:xfrm>
-            <a:off x="3788229" y="1320523"/>
-            <a:ext cx="8403771" cy="923330"/>
-          </a:xfrm>
-          <a:prstGeom prst="rect">
-            <a:avLst/>
-          </a:prstGeom>
-          <a:noFill/>
-        </p:spPr>
-        <p:txBody>
-          <a:bodyPr wrap="square" rtlCol="0">
-            <a:spAutoFit/>
-          </a:bodyPr>
-          <a:lstStyle/>
-          <a:p>
-            <a:r>
-              <a:rPr lang="en-US" dirty="0"/>
-              <a:t>Describes an area of the volume that is occupied by</a:t>
-            </a:r>
-            <a:r>
-              <a:rPr lang="ru-RU" dirty="0"/>
-              <a:t> </a:t>
-            </a:r>
-            <a:r>
-              <a:rPr lang="en-US" dirty="0"/>
-              <a:t>MFT itself. This way it possible to</a:t>
-            </a:r>
-          </a:p>
-          <a:p>
-            <a:pPr marL="285750" indent="-285750">
-              <a:buFont typeface="Arial" panose="020B0604020202020204" pitchFamily="34" charset="0"/>
-              <a:buChar char="•"/>
-            </a:pPr>
-            <a:r>
-              <a:rPr lang="en-US" dirty="0"/>
-              <a:t>Increase the size of the MFT when the FS grows.</a:t>
-            </a:r>
-          </a:p>
-          <a:p>
-            <a:pPr marL="285750" indent="-285750">
-              <a:buFont typeface="Arial" panose="020B0604020202020204" pitchFamily="34" charset="0"/>
-              <a:buChar char="•"/>
-            </a:pPr>
-            <a:r>
-              <a:rPr lang="en-US" dirty="0"/>
-              <a:t>Decrease the size of the MFT if there is not enough space for user files.</a:t>
-            </a:r>
-            <a:endParaRPr lang="en-RU" dirty="0"/>
-          </a:p>
-        </p:txBody>
-      </p:sp>
-    </p:spTree>
-    <p:extLst>
-      <p:ext uri="{BB962C8B-B14F-4D97-AF65-F5344CB8AC3E}">
-        <p14:creationId xmlns:p14="http://schemas.microsoft.com/office/powerpoint/2010/main" val="1736911634"/>
       </p:ext>
     </p:extLst>
   </p:cSld>
@@ -22626,6 +23486,677 @@
           <p:nvPr>
             <p:extLst>
               <p:ext uri="{D42A27DB-BD31-4B8C-83A1-F6EECF244321}">
+                <p14:modId xmlns:p14="http://schemas.microsoft.com/office/powerpoint/2010/main" val="1064025585"/>
+              </p:ext>
+            </p:extLst>
+          </p:nvPr>
+        </p:nvGraphicFramePr>
+        <p:xfrm>
+          <a:off x="0" y="1"/>
+          <a:ext cx="12192000" cy="365760"/>
+        </p:xfrm>
+        <a:graphic>
+          <a:graphicData uri="http://schemas.openxmlformats.org/drawingml/2006/table">
+            <a:tbl>
+              <a:tblPr firstRow="1" bandRow="1">
+                <a:tableStyleId>{5C22544A-7EE6-4342-B048-85BDC9FD1C3A}</a:tableStyleId>
+              </a:tblPr>
+              <a:tblGrid>
+                <a:gridCol w="12192000">
+                  <a:extLst>
+                    <a:ext uri="{9D8B030D-6E8A-4147-A177-3AD203B41FA5}">
+                      <a16:colId xmlns:a16="http://schemas.microsoft.com/office/drawing/2014/main" val="20000"/>
+                    </a:ext>
+                  </a:extLst>
+                </a:gridCol>
+              </a:tblGrid>
+              <a:tr h="321276">
+                <a:tc>
+                  <a:txBody>
+                    <a:bodyPr/>
+                    <a:lstStyle/>
+                    <a:p>
+                      <a:r>
+                        <a:rPr lang="en-US" sz="1800" dirty="0"/>
+                        <a:t>The basics of file systems</a:t>
+                      </a:r>
+                      <a:endParaRPr lang="ru-RU" dirty="0"/>
+                    </a:p>
+                  </a:txBody>
+                  <a:tcPr/>
+                </a:tc>
+                <a:extLst>
+                  <a:ext uri="{0D108BD9-81ED-4DB2-BD59-A6C34878D82A}">
+                    <a16:rowId xmlns:a16="http://schemas.microsoft.com/office/drawing/2014/main" val="10000"/>
+                  </a:ext>
+                </a:extLst>
+              </a:tr>
+            </a:tbl>
+          </a:graphicData>
+        </a:graphic>
+      </p:graphicFrame>
+      <p:graphicFrame>
+        <p:nvGraphicFramePr>
+          <p:cNvPr id="6" name="Table 5"/>
+          <p:cNvGraphicFramePr>
+            <a:graphicFrameLocks noGrp="1"/>
+          </p:cNvGraphicFramePr>
+          <p:nvPr>
+            <p:extLst>
+              <p:ext uri="{D42A27DB-BD31-4B8C-83A1-F6EECF244321}">
+                <p14:modId xmlns:p14="http://schemas.microsoft.com/office/powerpoint/2010/main" val="2279371202"/>
+              </p:ext>
+            </p:extLst>
+          </p:nvPr>
+        </p:nvGraphicFramePr>
+        <p:xfrm>
+          <a:off x="0" y="6532604"/>
+          <a:ext cx="12192000" cy="365760"/>
+        </p:xfrm>
+        <a:graphic>
+          <a:graphicData uri="http://schemas.openxmlformats.org/drawingml/2006/table">
+            <a:tbl>
+              <a:tblPr firstRow="1" bandRow="1">
+                <a:tableStyleId>{5C22544A-7EE6-4342-B048-85BDC9FD1C3A}</a:tableStyleId>
+              </a:tblPr>
+              <a:tblGrid>
+                <a:gridCol w="12192000">
+                  <a:extLst>
+                    <a:ext uri="{9D8B030D-6E8A-4147-A177-3AD203B41FA5}">
+                      <a16:colId xmlns:a16="http://schemas.microsoft.com/office/drawing/2014/main" val="20000"/>
+                    </a:ext>
+                  </a:extLst>
+                </a:gridCol>
+              </a:tblGrid>
+              <a:tr h="308094">
+                <a:tc>
+                  <a:txBody>
+                    <a:bodyPr/>
+                    <a:lstStyle/>
+                    <a:p>
+                      <a:endParaRPr lang="ru-RU" dirty="0"/>
+                    </a:p>
+                  </a:txBody>
+                  <a:tcPr/>
+                </a:tc>
+                <a:extLst>
+                  <a:ext uri="{0D108BD9-81ED-4DB2-BD59-A6C34878D82A}">
+                    <a16:rowId xmlns:a16="http://schemas.microsoft.com/office/drawing/2014/main" val="10000"/>
+                  </a:ext>
+                </a:extLst>
+              </a:tr>
+            </a:tbl>
+          </a:graphicData>
+        </a:graphic>
+      </p:graphicFrame>
+      <p:graphicFrame>
+        <p:nvGraphicFramePr>
+          <p:cNvPr id="2" name="Table 1"/>
+          <p:cNvGraphicFramePr>
+            <a:graphicFrameLocks noGrp="1"/>
+          </p:cNvGraphicFramePr>
+          <p:nvPr>
+            <p:extLst>
+              <p:ext uri="{D42A27DB-BD31-4B8C-83A1-F6EECF244321}">
+                <p14:modId xmlns:p14="http://schemas.microsoft.com/office/powerpoint/2010/main" val="1333746103"/>
+              </p:ext>
+            </p:extLst>
+          </p:nvPr>
+        </p:nvGraphicFramePr>
+        <p:xfrm>
+          <a:off x="0" y="365762"/>
+          <a:ext cx="12192000" cy="5486400"/>
+        </p:xfrm>
+        <a:graphic>
+          <a:graphicData uri="http://schemas.openxmlformats.org/drawingml/2006/table">
+            <a:tbl>
+              <a:tblPr firstRow="1" bandRow="1">
+                <a:tableStyleId>{3B4B98B0-60AC-42C2-AFA5-B58CD77FA1E5}</a:tableStyleId>
+              </a:tblPr>
+              <a:tblGrid>
+                <a:gridCol w="12192000">
+                  <a:extLst>
+                    <a:ext uri="{9D8B030D-6E8A-4147-A177-3AD203B41FA5}">
+                      <a16:colId xmlns:a16="http://schemas.microsoft.com/office/drawing/2014/main" val="20000"/>
+                    </a:ext>
+                  </a:extLst>
+                </a:gridCol>
+              </a:tblGrid>
+              <a:tr h="455826">
+                <a:tc>
+                  <a:txBody>
+                    <a:bodyPr/>
+                    <a:lstStyle/>
+                    <a:p>
+                      <a:r>
+                        <a:rPr lang="en-US" sz="2400" dirty="0"/>
+                        <a:t>System files of</a:t>
+                      </a:r>
+                      <a:r>
+                        <a:rPr lang="ru-RU" sz="2400" dirty="0"/>
+                        <a:t> </a:t>
+                      </a:r>
+                      <a:r>
+                        <a:rPr lang="en-US" sz="2400" dirty="0"/>
+                        <a:t>NTFS</a:t>
+                      </a:r>
+                      <a:endParaRPr lang="ru-RU" sz="2400" dirty="0"/>
+                    </a:p>
+                  </a:txBody>
+                  <a:tcPr/>
+                </a:tc>
+                <a:extLst>
+                  <a:ext uri="{0D108BD9-81ED-4DB2-BD59-A6C34878D82A}">
+                    <a16:rowId xmlns:a16="http://schemas.microsoft.com/office/drawing/2014/main" val="10000"/>
+                  </a:ext>
+                </a:extLst>
+              </a:tr>
+              <a:tr h="455826">
+                <a:tc>
+                  <a:txBody>
+                    <a:bodyPr/>
+                    <a:lstStyle/>
+                    <a:p>
+                      <a:pPr marL="0" indent="0">
+                        <a:buNone/>
+                      </a:pPr>
+                      <a:r>
+                        <a:rPr lang="en-US" sz="1800" dirty="0"/>
+                        <a:t>The first </a:t>
+                      </a:r>
+                      <a:r>
+                        <a:rPr lang="ru-RU" sz="1800" dirty="0"/>
+                        <a:t>16 </a:t>
+                      </a:r>
+                      <a:r>
+                        <a:rPr lang="en-US" sz="1800" dirty="0"/>
+                        <a:t>files in a</a:t>
+                      </a:r>
+                      <a:r>
+                        <a:rPr lang="ru-RU" sz="1800" dirty="0"/>
+                        <a:t> </a:t>
+                      </a:r>
+                      <a:r>
+                        <a:rPr lang="en-US" sz="1800" dirty="0"/>
+                        <a:t>NTFS volume are system files that store the metadata of NTFS:</a:t>
+                      </a:r>
+                    </a:p>
+                    <a:p>
+                      <a:pPr marL="0" indent="0">
+                        <a:buNone/>
+                      </a:pPr>
+                      <a:endParaRPr lang="en-US" sz="1800" dirty="0"/>
+                    </a:p>
+                    <a:p>
+                      <a:pPr marL="285750" indent="-285750">
+                        <a:buFont typeface="Arial" panose="020B0604020202020204" pitchFamily="34" charset="0"/>
+                        <a:buChar char="•"/>
+                      </a:pPr>
+                      <a:r>
+                        <a:rPr lang="en-US" sz="1800" b="1" dirty="0">
+                          <a:latin typeface="Menlo" panose="020B0609030804020204" pitchFamily="49" charset="0"/>
+                          <a:ea typeface="Menlo" panose="020B0609030804020204" pitchFamily="49" charset="0"/>
+                          <a:cs typeface="Menlo" panose="020B0609030804020204" pitchFamily="49" charset="0"/>
+                        </a:rPr>
+                        <a:t>$MFT</a:t>
+                      </a:r>
+                      <a:r>
+                        <a:rPr lang="en-US" sz="1800" dirty="0">
+                          <a:latin typeface="Menlo" panose="020B0609030804020204" pitchFamily="49" charset="0"/>
+                          <a:ea typeface="Menlo" panose="020B0609030804020204" pitchFamily="49" charset="0"/>
+                          <a:cs typeface="Menlo" panose="020B0609030804020204" pitchFamily="49" charset="0"/>
+                        </a:rPr>
+                        <a:t>,</a:t>
+                      </a:r>
+                    </a:p>
+                    <a:p>
+                      <a:pPr marL="285750" indent="-285750">
+                        <a:buFont typeface="Arial" panose="020B0604020202020204" pitchFamily="34" charset="0"/>
+                        <a:buChar char="•"/>
+                      </a:pPr>
+                      <a:r>
+                        <a:rPr lang="en-US" sz="1800" dirty="0">
+                          <a:latin typeface="Menlo" panose="020B0609030804020204" pitchFamily="49" charset="0"/>
+                          <a:ea typeface="Menlo" panose="020B0609030804020204" pitchFamily="49" charset="0"/>
+                          <a:cs typeface="Menlo" panose="020B0609030804020204" pitchFamily="49" charset="0"/>
+                        </a:rPr>
+                        <a:t>$</a:t>
+                      </a:r>
+                      <a:r>
+                        <a:rPr lang="en-US" sz="1800" dirty="0" err="1">
+                          <a:latin typeface="Menlo" panose="020B0609030804020204" pitchFamily="49" charset="0"/>
+                          <a:ea typeface="Menlo" panose="020B0609030804020204" pitchFamily="49" charset="0"/>
+                          <a:cs typeface="Menlo" panose="020B0609030804020204" pitchFamily="49" charset="0"/>
+                        </a:rPr>
+                        <a:t>MFTMirr</a:t>
+                      </a:r>
+                      <a:r>
+                        <a:rPr lang="en-US" sz="1800" dirty="0">
+                          <a:latin typeface="Menlo" panose="020B0609030804020204" pitchFamily="49" charset="0"/>
+                          <a:ea typeface="Menlo" panose="020B0609030804020204" pitchFamily="49" charset="0"/>
+                          <a:cs typeface="Menlo" panose="020B0609030804020204" pitchFamily="49" charset="0"/>
+                        </a:rPr>
+                        <a:t>,</a:t>
+                      </a:r>
+                    </a:p>
+                    <a:p>
+                      <a:pPr marL="285750" indent="-285750">
+                        <a:buFont typeface="Arial" panose="020B0604020202020204" pitchFamily="34" charset="0"/>
+                        <a:buChar char="•"/>
+                      </a:pPr>
+                      <a:r>
+                        <a:rPr lang="en-US" sz="1800" dirty="0">
+                          <a:latin typeface="Menlo" panose="020B0609030804020204" pitchFamily="49" charset="0"/>
+                          <a:ea typeface="Menlo" panose="020B0609030804020204" pitchFamily="49" charset="0"/>
+                          <a:cs typeface="Menlo" panose="020B0609030804020204" pitchFamily="49" charset="0"/>
+                        </a:rPr>
+                        <a:t>$</a:t>
+                      </a:r>
+                      <a:r>
+                        <a:rPr lang="en-US" sz="1800" dirty="0" err="1">
+                          <a:latin typeface="Menlo" panose="020B0609030804020204" pitchFamily="49" charset="0"/>
+                          <a:ea typeface="Menlo" panose="020B0609030804020204" pitchFamily="49" charset="0"/>
+                          <a:cs typeface="Menlo" panose="020B0609030804020204" pitchFamily="49" charset="0"/>
+                        </a:rPr>
+                        <a:t>LogFile</a:t>
+                      </a:r>
+                      <a:r>
+                        <a:rPr lang="en-US" sz="1800" dirty="0">
+                          <a:latin typeface="Menlo" panose="020B0609030804020204" pitchFamily="49" charset="0"/>
+                          <a:ea typeface="Menlo" panose="020B0609030804020204" pitchFamily="49" charset="0"/>
+                          <a:cs typeface="Menlo" panose="020B0609030804020204" pitchFamily="49" charset="0"/>
+                        </a:rPr>
+                        <a:t>,</a:t>
+                      </a:r>
+                    </a:p>
+                    <a:p>
+                      <a:pPr marL="285750" indent="-285750">
+                        <a:buFont typeface="Arial" panose="020B0604020202020204" pitchFamily="34" charset="0"/>
+                        <a:buChar char="•"/>
+                      </a:pPr>
+                      <a:r>
+                        <a:rPr lang="en-US" sz="1800" dirty="0">
+                          <a:latin typeface="Menlo" panose="020B0609030804020204" pitchFamily="49" charset="0"/>
+                          <a:ea typeface="Menlo" panose="020B0609030804020204" pitchFamily="49" charset="0"/>
+                          <a:cs typeface="Menlo" panose="020B0609030804020204" pitchFamily="49" charset="0"/>
+                        </a:rPr>
+                        <a:t>$Volume,</a:t>
+                      </a:r>
+                    </a:p>
+                    <a:p>
+                      <a:pPr marL="285750" indent="-285750">
+                        <a:buFont typeface="Arial" panose="020B0604020202020204" pitchFamily="34" charset="0"/>
+                        <a:buChar char="•"/>
+                      </a:pPr>
+                      <a:r>
+                        <a:rPr lang="en-US" sz="1800" dirty="0">
+                          <a:latin typeface="Menlo" panose="020B0609030804020204" pitchFamily="49" charset="0"/>
+                          <a:ea typeface="Menlo" panose="020B0609030804020204" pitchFamily="49" charset="0"/>
+                          <a:cs typeface="Menlo" panose="020B0609030804020204" pitchFamily="49" charset="0"/>
+                        </a:rPr>
+                        <a:t>$</a:t>
+                      </a:r>
+                      <a:r>
+                        <a:rPr lang="en-US" sz="1800" dirty="0" err="1">
+                          <a:latin typeface="Menlo" panose="020B0609030804020204" pitchFamily="49" charset="0"/>
+                          <a:ea typeface="Menlo" panose="020B0609030804020204" pitchFamily="49" charset="0"/>
+                          <a:cs typeface="Menlo" panose="020B0609030804020204" pitchFamily="49" charset="0"/>
+                        </a:rPr>
+                        <a:t>AttrDef</a:t>
+                      </a:r>
+                      <a:r>
+                        <a:rPr lang="en-US" sz="1800" dirty="0">
+                          <a:latin typeface="Menlo" panose="020B0609030804020204" pitchFamily="49" charset="0"/>
+                          <a:ea typeface="Menlo" panose="020B0609030804020204" pitchFamily="49" charset="0"/>
+                          <a:cs typeface="Menlo" panose="020B0609030804020204" pitchFamily="49" charset="0"/>
+                        </a:rPr>
+                        <a:t>,</a:t>
+                      </a:r>
+                    </a:p>
+                    <a:p>
+                      <a:pPr marL="285750" indent="-285750">
+                        <a:buFont typeface="Arial" panose="020B0604020202020204" pitchFamily="34" charset="0"/>
+                        <a:buChar char="•"/>
+                      </a:pPr>
+                      <a:r>
+                        <a:rPr lang="en-US" sz="1800" dirty="0">
+                          <a:latin typeface="Menlo" panose="020B0609030804020204" pitchFamily="49" charset="0"/>
+                          <a:ea typeface="Menlo" panose="020B0609030804020204" pitchFamily="49" charset="0"/>
+                          <a:cs typeface="Menlo" panose="020B0609030804020204" pitchFamily="49" charset="0"/>
+                        </a:rPr>
+                        <a:t>.</a:t>
+                      </a:r>
+                    </a:p>
+                    <a:p>
+                      <a:pPr marL="285750" indent="-285750">
+                        <a:buFont typeface="Arial" panose="020B0604020202020204" pitchFamily="34" charset="0"/>
+                        <a:buChar char="•"/>
+                      </a:pPr>
+                      <a:r>
+                        <a:rPr lang="en-US" sz="1800" dirty="0">
+                          <a:latin typeface="Menlo" panose="020B0609030804020204" pitchFamily="49" charset="0"/>
+                          <a:ea typeface="Menlo" panose="020B0609030804020204" pitchFamily="49" charset="0"/>
+                          <a:cs typeface="Menlo" panose="020B0609030804020204" pitchFamily="49" charset="0"/>
+                        </a:rPr>
+                        <a:t>$Bitmap,</a:t>
+                      </a:r>
+                    </a:p>
+                    <a:p>
+                      <a:pPr marL="285750" indent="-285750">
+                        <a:buFont typeface="Arial" panose="020B0604020202020204" pitchFamily="34" charset="0"/>
+                        <a:buChar char="•"/>
+                      </a:pPr>
+                      <a:r>
+                        <a:rPr lang="en-US" sz="1800" dirty="0">
+                          <a:latin typeface="Menlo" panose="020B0609030804020204" pitchFamily="49" charset="0"/>
+                          <a:ea typeface="Menlo" panose="020B0609030804020204" pitchFamily="49" charset="0"/>
+                          <a:cs typeface="Menlo" panose="020B0609030804020204" pitchFamily="49" charset="0"/>
+                        </a:rPr>
+                        <a:t>$Boot,</a:t>
+                      </a:r>
+                    </a:p>
+                    <a:p>
+                      <a:pPr marL="285750" indent="-285750">
+                        <a:buFont typeface="Arial" panose="020B0604020202020204" pitchFamily="34" charset="0"/>
+                        <a:buChar char="•"/>
+                      </a:pPr>
+                      <a:r>
+                        <a:rPr lang="en-US" sz="1800" dirty="0">
+                          <a:latin typeface="Menlo" panose="020B0609030804020204" pitchFamily="49" charset="0"/>
+                          <a:ea typeface="Menlo" panose="020B0609030804020204" pitchFamily="49" charset="0"/>
+                          <a:cs typeface="Menlo" panose="020B0609030804020204" pitchFamily="49" charset="0"/>
+                        </a:rPr>
+                        <a:t>$</a:t>
+                      </a:r>
+                      <a:r>
+                        <a:rPr lang="en-US" sz="1800" dirty="0" err="1">
+                          <a:latin typeface="Menlo" panose="020B0609030804020204" pitchFamily="49" charset="0"/>
+                          <a:ea typeface="Menlo" panose="020B0609030804020204" pitchFamily="49" charset="0"/>
+                          <a:cs typeface="Menlo" panose="020B0609030804020204" pitchFamily="49" charset="0"/>
+                        </a:rPr>
+                        <a:t>BadClus</a:t>
+                      </a:r>
+                      <a:r>
+                        <a:rPr lang="en-US" sz="1800" dirty="0">
+                          <a:latin typeface="Menlo" panose="020B0609030804020204" pitchFamily="49" charset="0"/>
+                          <a:ea typeface="Menlo" panose="020B0609030804020204" pitchFamily="49" charset="0"/>
+                          <a:cs typeface="Menlo" panose="020B0609030804020204" pitchFamily="49" charset="0"/>
+                        </a:rPr>
+                        <a:t>,</a:t>
+                      </a:r>
+                    </a:p>
+                    <a:p>
+                      <a:pPr marL="285750" indent="-285750">
+                        <a:buFont typeface="Arial" panose="020B0604020202020204" pitchFamily="34" charset="0"/>
+                        <a:buChar char="•"/>
+                      </a:pPr>
+                      <a:r>
+                        <a:rPr lang="en-US" sz="1800" dirty="0">
+                          <a:latin typeface="Menlo" panose="020B0609030804020204" pitchFamily="49" charset="0"/>
+                          <a:ea typeface="Menlo" panose="020B0609030804020204" pitchFamily="49" charset="0"/>
+                          <a:cs typeface="Menlo" panose="020B0609030804020204" pitchFamily="49" charset="0"/>
+                        </a:rPr>
+                        <a:t>$Quota,</a:t>
+                      </a:r>
+                    </a:p>
+                    <a:p>
+                      <a:pPr marL="285750" indent="-285750">
+                        <a:buFont typeface="Arial" panose="020B0604020202020204" pitchFamily="34" charset="0"/>
+                        <a:buChar char="•"/>
+                      </a:pPr>
+                      <a:r>
+                        <a:rPr lang="en-US" sz="1800" dirty="0">
+                          <a:latin typeface="Menlo" panose="020B0609030804020204" pitchFamily="49" charset="0"/>
+                          <a:ea typeface="Menlo" panose="020B0609030804020204" pitchFamily="49" charset="0"/>
+                          <a:cs typeface="Menlo" panose="020B0609030804020204" pitchFamily="49" charset="0"/>
+                        </a:rPr>
+                        <a:t>$Secure,</a:t>
+                      </a:r>
+                    </a:p>
+                    <a:p>
+                      <a:pPr marL="285750" indent="-285750">
+                        <a:buFont typeface="Arial" panose="020B0604020202020204" pitchFamily="34" charset="0"/>
+                        <a:buChar char="•"/>
+                      </a:pPr>
+                      <a:r>
+                        <a:rPr lang="en-US" sz="1800" dirty="0">
+                          <a:latin typeface="Menlo" panose="020B0609030804020204" pitchFamily="49" charset="0"/>
+                          <a:ea typeface="Menlo" panose="020B0609030804020204" pitchFamily="49" charset="0"/>
+                          <a:cs typeface="Menlo" panose="020B0609030804020204" pitchFamily="49" charset="0"/>
+                        </a:rPr>
+                        <a:t>$</a:t>
+                      </a:r>
+                      <a:r>
+                        <a:rPr lang="en-US" sz="1800" dirty="0" err="1">
+                          <a:latin typeface="Menlo" panose="020B0609030804020204" pitchFamily="49" charset="0"/>
+                          <a:ea typeface="Menlo" panose="020B0609030804020204" pitchFamily="49" charset="0"/>
+                          <a:cs typeface="Menlo" panose="020B0609030804020204" pitchFamily="49" charset="0"/>
+                        </a:rPr>
+                        <a:t>UpCase</a:t>
+                      </a:r>
+                      <a:r>
+                        <a:rPr lang="en-US" sz="1800" dirty="0">
+                          <a:latin typeface="Menlo" panose="020B0609030804020204" pitchFamily="49" charset="0"/>
+                          <a:ea typeface="Menlo" panose="020B0609030804020204" pitchFamily="49" charset="0"/>
+                          <a:cs typeface="Menlo" panose="020B0609030804020204" pitchFamily="49" charset="0"/>
+                        </a:rPr>
+                        <a:t>,</a:t>
+                      </a:r>
+                    </a:p>
+                    <a:p>
+                      <a:pPr marL="285750" indent="-285750">
+                        <a:buFont typeface="Arial" panose="020B0604020202020204" pitchFamily="34" charset="0"/>
+                        <a:buChar char="•"/>
+                      </a:pPr>
+                      <a:r>
+                        <a:rPr lang="en-US" sz="1800" dirty="0">
+                          <a:latin typeface="Menlo" panose="020B0609030804020204" pitchFamily="49" charset="0"/>
+                          <a:ea typeface="Menlo" panose="020B0609030804020204" pitchFamily="49" charset="0"/>
+                          <a:cs typeface="Menlo" panose="020B0609030804020204" pitchFamily="49" charset="0"/>
+                        </a:rPr>
+                        <a:t>$Extend,</a:t>
+                      </a:r>
+                    </a:p>
+                    <a:p>
+                      <a:pPr marL="285750" indent="-285750">
+                        <a:buFont typeface="Arial" panose="020B0604020202020204" pitchFamily="34" charset="0"/>
+                        <a:buChar char="•"/>
+                      </a:pPr>
+                      <a:r>
+                        <a:rPr lang="en-US" sz="1800" dirty="0">
+                          <a:latin typeface="Menlo" panose="020B0609030804020204" pitchFamily="49" charset="0"/>
+                          <a:ea typeface="Menlo" panose="020B0609030804020204" pitchFamily="49" charset="0"/>
+                          <a:cs typeface="Menlo" panose="020B0609030804020204" pitchFamily="49" charset="0"/>
+                        </a:rPr>
+                        <a:t>$</a:t>
+                      </a:r>
+                      <a:r>
+                        <a:rPr lang="en-US" sz="1800" dirty="0" err="1">
+                          <a:latin typeface="Menlo" panose="020B0609030804020204" pitchFamily="49" charset="0"/>
+                          <a:ea typeface="Menlo" panose="020B0609030804020204" pitchFamily="49" charset="0"/>
+                          <a:cs typeface="Menlo" panose="020B0609030804020204" pitchFamily="49" charset="0"/>
+                        </a:rPr>
+                        <a:t>ObjId</a:t>
+                      </a:r>
+                      <a:r>
+                        <a:rPr lang="en-US" sz="1800" dirty="0">
+                          <a:latin typeface="Menlo" panose="020B0609030804020204" pitchFamily="49" charset="0"/>
+                          <a:ea typeface="Menlo" panose="020B0609030804020204" pitchFamily="49" charset="0"/>
+                          <a:cs typeface="Menlo" panose="020B0609030804020204" pitchFamily="49" charset="0"/>
+                        </a:rPr>
+                        <a:t>,</a:t>
+                      </a:r>
+                    </a:p>
+                    <a:p>
+                      <a:pPr marL="285750" indent="-285750">
+                        <a:buFont typeface="Arial" panose="020B0604020202020204" pitchFamily="34" charset="0"/>
+                        <a:buChar char="•"/>
+                      </a:pPr>
+                      <a:r>
+                        <a:rPr lang="en-US" sz="1800" dirty="0">
+                          <a:latin typeface="Menlo" panose="020B0609030804020204" pitchFamily="49" charset="0"/>
+                          <a:ea typeface="Menlo" panose="020B0609030804020204" pitchFamily="49" charset="0"/>
+                          <a:cs typeface="Menlo" panose="020B0609030804020204" pitchFamily="49" charset="0"/>
+                        </a:rPr>
+                        <a:t>$Reparse,</a:t>
+                      </a:r>
+                    </a:p>
+                    <a:p>
+                      <a:pPr marL="285750" indent="-285750">
+                        <a:buFont typeface="Arial" panose="020B0604020202020204" pitchFamily="34" charset="0"/>
+                        <a:buChar char="•"/>
+                      </a:pPr>
+                      <a:r>
+                        <a:rPr lang="en-US" sz="1800" dirty="0">
+                          <a:latin typeface="Menlo" panose="020B0609030804020204" pitchFamily="49" charset="0"/>
+                          <a:ea typeface="Menlo" panose="020B0609030804020204" pitchFamily="49" charset="0"/>
+                          <a:cs typeface="Menlo" panose="020B0609030804020204" pitchFamily="49" charset="0"/>
+                        </a:rPr>
+                        <a:t>$</a:t>
+                      </a:r>
+                      <a:r>
+                        <a:rPr lang="en-US" sz="1800" dirty="0" err="1">
+                          <a:latin typeface="Menlo" panose="020B0609030804020204" pitchFamily="49" charset="0"/>
+                          <a:ea typeface="Menlo" panose="020B0609030804020204" pitchFamily="49" charset="0"/>
+                          <a:cs typeface="Menlo" panose="020B0609030804020204" pitchFamily="49" charset="0"/>
+                        </a:rPr>
+                        <a:t>UsnJournal</a:t>
+                      </a:r>
+                      <a:r>
+                        <a:rPr lang="en-US" sz="1800" dirty="0">
+                          <a:latin typeface="Menlo" panose="020B0609030804020204" pitchFamily="49" charset="0"/>
+                          <a:ea typeface="Menlo" panose="020B0609030804020204" pitchFamily="49" charset="0"/>
+                          <a:cs typeface="Menlo" panose="020B0609030804020204" pitchFamily="49" charset="0"/>
+                        </a:rPr>
+                        <a:t>.</a:t>
+                      </a:r>
+                      <a:endParaRPr lang="ru-RU" sz="1800" dirty="0">
+                        <a:latin typeface="Menlo" panose="020B0609030804020204" pitchFamily="49" charset="0"/>
+                        <a:ea typeface="Menlo" panose="020B0609030804020204" pitchFamily="49" charset="0"/>
+                        <a:cs typeface="Menlo" panose="020B0609030804020204" pitchFamily="49" charset="0"/>
+                      </a:endParaRPr>
+                    </a:p>
+                  </a:txBody>
+                  <a:tcPr/>
+                </a:tc>
+                <a:extLst>
+                  <a:ext uri="{0D108BD9-81ED-4DB2-BD59-A6C34878D82A}">
+                    <a16:rowId xmlns:a16="http://schemas.microsoft.com/office/drawing/2014/main" val="1058839663"/>
+                  </a:ext>
+                </a:extLst>
+              </a:tr>
+            </a:tbl>
+          </a:graphicData>
+        </a:graphic>
+      </p:graphicFrame>
+      <p:sp>
+        <p:nvSpPr>
+          <p:cNvPr id="3" name="TextBox 2">
+            <a:extLst>
+              <a:ext uri="{FF2B5EF4-FFF2-40B4-BE49-F238E27FC236}">
+                <a16:creationId xmlns:a16="http://schemas.microsoft.com/office/drawing/2014/main" id="{D15225CB-64F3-1A4B-868A-B11A91B5CE13}"/>
+              </a:ext>
+            </a:extLst>
+          </p:cNvPr>
+          <p:cNvSpPr txBox="1"/>
+          <p:nvPr/>
+        </p:nvSpPr>
+        <p:spPr>
+          <a:xfrm>
+            <a:off x="3788229" y="1320523"/>
+            <a:ext cx="8403771" cy="923330"/>
+          </a:xfrm>
+          <a:prstGeom prst="rect">
+            <a:avLst/>
+          </a:prstGeom>
+          <a:noFill/>
+        </p:spPr>
+        <p:txBody>
+          <a:bodyPr wrap="square" rtlCol="0">
+            <a:spAutoFit/>
+          </a:bodyPr>
+          <a:lstStyle/>
+          <a:p>
+            <a:r>
+              <a:rPr lang="en-US" dirty="0"/>
+              <a:t>Describes an area of the volume that is occupied by</a:t>
+            </a:r>
+            <a:r>
+              <a:rPr lang="ru-RU" dirty="0"/>
+              <a:t> </a:t>
+            </a:r>
+            <a:r>
+              <a:rPr lang="en-US" dirty="0"/>
+              <a:t>MFT itself. This way it possible to</a:t>
+            </a:r>
+          </a:p>
+          <a:p>
+            <a:pPr marL="285750" indent="-285750">
+              <a:buFont typeface="Arial" panose="020B0604020202020204" pitchFamily="34" charset="0"/>
+              <a:buChar char="•"/>
+            </a:pPr>
+            <a:r>
+              <a:rPr lang="en-US" dirty="0"/>
+              <a:t>Increase the size of the MFT when the FS grows.</a:t>
+            </a:r>
+          </a:p>
+          <a:p>
+            <a:pPr marL="285750" indent="-285750">
+              <a:buFont typeface="Arial" panose="020B0604020202020204" pitchFamily="34" charset="0"/>
+              <a:buChar char="•"/>
+            </a:pPr>
+            <a:r>
+              <a:rPr lang="en-US" dirty="0"/>
+              <a:t>Decrease the size of the MFT if there is not enough space for user files.</a:t>
+            </a:r>
+            <a:endParaRPr lang="en-RU" dirty="0"/>
+          </a:p>
+        </p:txBody>
+      </p:sp>
+    </p:spTree>
+    <p:extLst>
+      <p:ext uri="{BB962C8B-B14F-4D97-AF65-F5344CB8AC3E}">
+        <p14:creationId xmlns:p14="http://schemas.microsoft.com/office/powerpoint/2010/main" val="1736911634"/>
+      </p:ext>
+    </p:extLst>
+  </p:cSld>
+  <p:clrMapOvr>
+    <a:overrideClrMapping bg1="lt1" tx1="dk1" bg2="lt2" tx2="dk2" accent1="accent1" accent2="accent2" accent3="accent3" accent4="accent4" accent5="accent5" accent6="accent6" hlink="hlink" folHlink="folHlink"/>
+  </p:clrMapOvr>
+</p:sld>
+</file>
+
+<file path=ppt/slides/slide31.xml><?xml version="1.0" encoding="utf-8"?>
+<p:sld xmlns:a="http://schemas.openxmlformats.org/drawingml/2006/main" xmlns:r="http://schemas.openxmlformats.org/officeDocument/2006/relationships" xmlns:p="http://schemas.openxmlformats.org/presentationml/2006/main">
+  <p:cSld>
+    <p:bg>
+      <p:bgRef idx="1001">
+        <a:schemeClr val="bg1"/>
+      </p:bgRef>
+    </p:bg>
+    <p:spTree>
+      <p:nvGrpSpPr>
+        <p:cNvPr id="1" name=""/>
+        <p:cNvGrpSpPr/>
+        <p:nvPr/>
+      </p:nvGrpSpPr>
+      <p:grpSpPr>
+        <a:xfrm>
+          <a:off x="0" y="0"/>
+          <a:ext cx="0" cy="0"/>
+          <a:chOff x="0" y="0"/>
+          <a:chExt cx="0" cy="0"/>
+        </a:xfrm>
+      </p:grpSpPr>
+      <p:graphicFrame>
+        <p:nvGraphicFramePr>
+          <p:cNvPr id="5" name="Table 4"/>
+          <p:cNvGraphicFramePr>
+            <a:graphicFrameLocks noGrp="1"/>
+          </p:cNvGraphicFramePr>
+          <p:nvPr>
+            <p:extLst>
+              <p:ext uri="{D42A27DB-BD31-4B8C-83A1-F6EECF244321}">
                 <p14:modId xmlns:p14="http://schemas.microsoft.com/office/powerpoint/2010/main" val="1384729306"/>
               </p:ext>
             </p:extLst>
@@ -23411,7 +24942,7 @@
 </p:sld>
 </file>
 
-<file path=ppt/slides/slide31.xml><?xml version="1.0" encoding="utf-8"?>
+<file path=ppt/slides/slide32.xml><?xml version="1.0" encoding="utf-8"?>
 <p:sld xmlns:a="http://schemas.openxmlformats.org/drawingml/2006/main" xmlns:r="http://schemas.openxmlformats.org/officeDocument/2006/relationships" xmlns:p="http://schemas.openxmlformats.org/presentationml/2006/main">
   <p:cSld>
     <p:bg>
@@ -24062,7 +25593,7 @@
 </p:sld>
 </file>
 
-<file path=ppt/slides/slide32.xml><?xml version="1.0" encoding="utf-8"?>
+<file path=ppt/slides/slide33.xml><?xml version="1.0" encoding="utf-8"?>
 <p:sld xmlns:a="http://schemas.openxmlformats.org/drawingml/2006/main" xmlns:r="http://schemas.openxmlformats.org/officeDocument/2006/relationships" xmlns:p="http://schemas.openxmlformats.org/presentationml/2006/main">
   <p:cSld>
     <p:bg>
@@ -24721,7 +26252,7 @@
 </p:sld>
 </file>
 
-<file path=ppt/slides/slide33.xml><?xml version="1.0" encoding="utf-8"?>
+<file path=ppt/slides/slide34.xml><?xml version="1.0" encoding="utf-8"?>
 <p:sld xmlns:a="http://schemas.openxmlformats.org/drawingml/2006/main" xmlns:r="http://schemas.openxmlformats.org/officeDocument/2006/relationships" xmlns:p="http://schemas.openxmlformats.org/presentationml/2006/main">
   <p:cSld>
     <p:bg>
@@ -25367,7 +26898,7 @@
 </p:sld>
 </file>
 
-<file path=ppt/slides/slide34.xml><?xml version="1.0" encoding="utf-8"?>
+<file path=ppt/slides/slide35.xml><?xml version="1.0" encoding="utf-8"?>
 <p:sld xmlns:a="http://schemas.openxmlformats.org/drawingml/2006/main" xmlns:r="http://schemas.openxmlformats.org/officeDocument/2006/relationships" xmlns:p="http://schemas.openxmlformats.org/presentationml/2006/main">
   <p:cSld>
     <p:bg>
@@ -26024,7 +27555,7 @@
 </p:sld>
 </file>
 
-<file path=ppt/slides/slide35.xml><?xml version="1.0" encoding="utf-8"?>
+<file path=ppt/slides/slide36.xml><?xml version="1.0" encoding="utf-8"?>
 <p:sld xmlns:a="http://schemas.openxmlformats.org/drawingml/2006/main" xmlns:r="http://schemas.openxmlformats.org/officeDocument/2006/relationships" xmlns:p="http://schemas.openxmlformats.org/presentationml/2006/main">
   <p:cSld>
     <p:bg>
@@ -26671,7 +28202,7 @@
 </p:sld>
 </file>
 
-<file path=ppt/slides/slide36.xml><?xml version="1.0" encoding="utf-8"?>
+<file path=ppt/slides/slide37.xml><?xml version="1.0" encoding="utf-8"?>
 <p:sld xmlns:a="http://schemas.openxmlformats.org/drawingml/2006/main" xmlns:r="http://schemas.openxmlformats.org/officeDocument/2006/relationships" xmlns:p="http://schemas.openxmlformats.org/presentationml/2006/main">
   <p:cSld>
     <p:bg>
@@ -27390,7 +28921,7 @@
 </p:sld>
 </file>
 
-<file path=ppt/slides/slide37.xml><?xml version="1.0" encoding="utf-8"?>
+<file path=ppt/slides/slide38.xml><?xml version="1.0" encoding="utf-8"?>
 <p:sld xmlns:a="http://schemas.openxmlformats.org/drawingml/2006/main" xmlns:r="http://schemas.openxmlformats.org/officeDocument/2006/relationships" xmlns:p="http://schemas.openxmlformats.org/presentationml/2006/main">
   <p:cSld>
     <p:bg>
@@ -27649,7 +29180,7 @@
 </p:sld>
 </file>
 
-<file path=ppt/slides/slide38.xml><?xml version="1.0" encoding="utf-8"?>
+<file path=ppt/slides/slide39.xml><?xml version="1.0" encoding="utf-8"?>
 <p:sld xmlns:a="http://schemas.openxmlformats.org/drawingml/2006/main" xmlns:r="http://schemas.openxmlformats.org/officeDocument/2006/relationships" xmlns:p="http://schemas.openxmlformats.org/presentationml/2006/main">
   <p:cSld>
     <p:bg>
@@ -34764,6 +36295,49 @@
 </a:themeOverride>
 </file>
 
+<file path=ppt/theme/themeOverride39.xml><?xml version="1.0" encoding="utf-8"?>
+<a:themeOverride xmlns:a="http://schemas.openxmlformats.org/drawingml/2006/main">
+  <a:clrScheme name="Office">
+    <a:dk1>
+      <a:sysClr val="windowText" lastClr="000000"/>
+    </a:dk1>
+    <a:lt1>
+      <a:sysClr val="window" lastClr="FFFFFF"/>
+    </a:lt1>
+    <a:dk2>
+      <a:srgbClr val="44546A"/>
+    </a:dk2>
+    <a:lt2>
+      <a:srgbClr val="E7E6E6"/>
+    </a:lt2>
+    <a:accent1>
+      <a:srgbClr val="5B9BD5"/>
+    </a:accent1>
+    <a:accent2>
+      <a:srgbClr val="ED7D31"/>
+    </a:accent2>
+    <a:accent3>
+      <a:srgbClr val="A5A5A5"/>
+    </a:accent3>
+    <a:accent4>
+      <a:srgbClr val="FFC000"/>
+    </a:accent4>
+    <a:accent5>
+      <a:srgbClr val="4472C4"/>
+    </a:accent5>
+    <a:accent6>
+      <a:srgbClr val="70AD47"/>
+    </a:accent6>
+    <a:hlink>
+      <a:srgbClr val="0563C1"/>
+    </a:hlink>
+    <a:folHlink>
+      <a:srgbClr val="954F72"/>
+    </a:folHlink>
+  </a:clrScheme>
+</a:themeOverride>
+</file>
+
 <file path=ppt/theme/themeOverride4.xml><?xml version="1.0" encoding="utf-8"?>
 <a:themeOverride xmlns:a="http://schemas.openxmlformats.org/drawingml/2006/main">
   <a:clrScheme name="Office">

</xml_diff>